<commit_message>
Add slides about parity bits
</commit_message>
<xml_diff>
--- a/abft-training.pptx
+++ b/abft-training.pptx
@@ -5,10 +5,10 @@
     <p:sldMasterId id="2147483649" r:id="rId3"/>
   </p:sldMasterIdLst>
   <p:notesMasterIdLst>
-    <p:notesMasterId r:id="rId23"/>
+    <p:notesMasterId r:id="rId29"/>
   </p:notesMasterIdLst>
   <p:handoutMasterIdLst>
-    <p:handoutMasterId r:id="rId24"/>
+    <p:handoutMasterId r:id="rId30"/>
   </p:handoutMasterIdLst>
   <p:sldIdLst>
     <p:sldId id="257" r:id="rId4"/>
@@ -28,8 +28,14 @@
     <p:sldId id="575" r:id="rId18"/>
     <p:sldId id="576" r:id="rId19"/>
     <p:sldId id="587" r:id="rId20"/>
-    <p:sldId id="588" r:id="rId21"/>
-    <p:sldId id="589" r:id="rId22"/>
+    <p:sldId id="590" r:id="rId21"/>
+    <p:sldId id="591" r:id="rId22"/>
+    <p:sldId id="596" r:id="rId23"/>
+    <p:sldId id="595" r:id="rId24"/>
+    <p:sldId id="593" r:id="rId25"/>
+    <p:sldId id="594" r:id="rId26"/>
+    <p:sldId id="588" r:id="rId27"/>
+    <p:sldId id="589" r:id="rId28"/>
   </p:sldIdLst>
   <p:sldSz cx="9144000" cy="6858000" type="screen4x3"/>
   <p:notesSz cx="6858000" cy="9144000"/>
@@ -1337,6 +1343,184 @@
     <p:extLst>
       <p:ext uri="{BB962C8B-B14F-4D97-AF65-F5344CB8AC3E}">
         <p14:creationId xmlns:p14="http://schemas.microsoft.com/office/powerpoint/2010/main" val="2209820087"/>
+      </p:ext>
+    </p:extLst>
+  </p:cSld>
+  <p:clrMapOvr>
+    <a:masterClrMapping/>
+  </p:clrMapOvr>
+</p:notes>
+</file>
+
+<file path=ppt/notesSlides/notesSlide12.xml><?xml version="1.0" encoding="utf-8"?>
+<p:notes xmlns:a="http://schemas.openxmlformats.org/drawingml/2006/main" xmlns:r="http://schemas.openxmlformats.org/officeDocument/2006/relationships" xmlns:p="http://schemas.openxmlformats.org/presentationml/2006/main">
+  <p:cSld>
+    <p:spTree>
+      <p:nvGrpSpPr>
+        <p:cNvPr id="1" name=""/>
+        <p:cNvGrpSpPr/>
+        <p:nvPr/>
+      </p:nvGrpSpPr>
+      <p:grpSpPr>
+        <a:xfrm>
+          <a:off x="0" y="0"/>
+          <a:ext cx="0" cy="0"/>
+          <a:chOff x="0" y="0"/>
+          <a:chExt cx="0" cy="0"/>
+        </a:xfrm>
+      </p:grpSpPr>
+      <p:sp>
+        <p:nvSpPr>
+          <p:cNvPr id="2" name="Slide Image Placeholder 1"/>
+          <p:cNvSpPr>
+            <a:spLocks noGrp="1" noRot="1" noChangeAspect="1"/>
+          </p:cNvSpPr>
+          <p:nvPr>
+            <p:ph type="sldImg"/>
+          </p:nvPr>
+        </p:nvSpPr>
+        <p:spPr/>
+      </p:sp>
+      <p:sp>
+        <p:nvSpPr>
+          <p:cNvPr id="3" name="Notes Placeholder 2"/>
+          <p:cNvSpPr>
+            <a:spLocks noGrp="1"/>
+          </p:cNvSpPr>
+          <p:nvPr>
+            <p:ph type="body" idx="1"/>
+          </p:nvPr>
+        </p:nvSpPr>
+        <p:spPr/>
+        <p:txBody>
+          <a:bodyPr/>
+          <a:lstStyle/>
+          <a:p>
+            <a:r>
+              <a:rPr lang="en-GB" dirty="0" smtClean="0"/>
+              <a:t>TODO: Animate</a:t>
+            </a:r>
+            <a:r>
+              <a:rPr lang="en-GB" baseline="0" dirty="0" smtClean="0"/>
+              <a:t> – incremental reveal</a:t>
+            </a:r>
+            <a:endParaRPr lang="en-GB" dirty="0"/>
+          </a:p>
+        </p:txBody>
+      </p:sp>
+      <p:sp>
+        <p:nvSpPr>
+          <p:cNvPr id="4" name="Slide Number Placeholder 3"/>
+          <p:cNvSpPr>
+            <a:spLocks noGrp="1"/>
+          </p:cNvSpPr>
+          <p:nvPr>
+            <p:ph type="sldNum" sz="quarter" idx="10"/>
+          </p:nvPr>
+        </p:nvSpPr>
+        <p:spPr/>
+        <p:txBody>
+          <a:bodyPr/>
+          <a:lstStyle/>
+          <a:p>
+            <a:fld id="{1C811BE7-51AF-BD41-88D3-08D74CFB37BF}" type="slidenum">
+              <a:rPr lang="en-GB" smtClean="0"/>
+              <a:pPr/>
+              <a:t>19</a:t>
+            </a:fld>
+            <a:endParaRPr lang="en-GB"/>
+          </a:p>
+        </p:txBody>
+      </p:sp>
+    </p:spTree>
+    <p:extLst>
+      <p:ext uri="{BB962C8B-B14F-4D97-AF65-F5344CB8AC3E}">
+        <p14:creationId xmlns:p14="http://schemas.microsoft.com/office/powerpoint/2010/main" val="2442681378"/>
+      </p:ext>
+    </p:extLst>
+  </p:cSld>
+  <p:clrMapOvr>
+    <a:masterClrMapping/>
+  </p:clrMapOvr>
+</p:notes>
+</file>
+
+<file path=ppt/notesSlides/notesSlide13.xml><?xml version="1.0" encoding="utf-8"?>
+<p:notes xmlns:a="http://schemas.openxmlformats.org/drawingml/2006/main" xmlns:r="http://schemas.openxmlformats.org/officeDocument/2006/relationships" xmlns:p="http://schemas.openxmlformats.org/presentationml/2006/main">
+  <p:cSld>
+    <p:spTree>
+      <p:nvGrpSpPr>
+        <p:cNvPr id="1" name=""/>
+        <p:cNvGrpSpPr/>
+        <p:nvPr/>
+      </p:nvGrpSpPr>
+      <p:grpSpPr>
+        <a:xfrm>
+          <a:off x="0" y="0"/>
+          <a:ext cx="0" cy="0"/>
+          <a:chOff x="0" y="0"/>
+          <a:chExt cx="0" cy="0"/>
+        </a:xfrm>
+      </p:grpSpPr>
+      <p:sp>
+        <p:nvSpPr>
+          <p:cNvPr id="2" name="Slide Image Placeholder 1"/>
+          <p:cNvSpPr>
+            <a:spLocks noGrp="1" noRot="1" noChangeAspect="1"/>
+          </p:cNvSpPr>
+          <p:nvPr>
+            <p:ph type="sldImg"/>
+          </p:nvPr>
+        </p:nvSpPr>
+        <p:spPr/>
+      </p:sp>
+      <p:sp>
+        <p:nvSpPr>
+          <p:cNvPr id="3" name="Notes Placeholder 2"/>
+          <p:cNvSpPr>
+            <a:spLocks noGrp="1"/>
+          </p:cNvSpPr>
+          <p:nvPr>
+            <p:ph type="body" idx="1"/>
+          </p:nvPr>
+        </p:nvSpPr>
+        <p:spPr/>
+        <p:txBody>
+          <a:bodyPr/>
+          <a:lstStyle/>
+          <a:p>
+            <a:endParaRPr lang="en-GB" dirty="0"/>
+          </a:p>
+        </p:txBody>
+      </p:sp>
+      <p:sp>
+        <p:nvSpPr>
+          <p:cNvPr id="4" name="Slide Number Placeholder 3"/>
+          <p:cNvSpPr>
+            <a:spLocks noGrp="1"/>
+          </p:cNvSpPr>
+          <p:nvPr>
+            <p:ph type="sldNum" sz="quarter" idx="10"/>
+          </p:nvPr>
+        </p:nvSpPr>
+        <p:spPr/>
+        <p:txBody>
+          <a:bodyPr/>
+          <a:lstStyle/>
+          <a:p>
+            <a:fld id="{1C811BE7-51AF-BD41-88D3-08D74CFB37BF}" type="slidenum">
+              <a:rPr lang="en-GB" smtClean="0"/>
+              <a:pPr/>
+              <a:t>21</a:t>
+            </a:fld>
+            <a:endParaRPr lang="en-GB"/>
+          </a:p>
+        </p:txBody>
+      </p:sp>
+    </p:spTree>
+    <p:extLst>
+      <p:ext uri="{BB962C8B-B14F-4D97-AF65-F5344CB8AC3E}">
+        <p14:creationId xmlns:p14="http://schemas.microsoft.com/office/powerpoint/2010/main" val="1269505060"/>
       </p:ext>
     </p:extLst>
   </p:cSld>
@@ -10083,7 +10267,7 @@
           <a:p>
             <a:r>
               <a:rPr lang="en-GB" dirty="0" smtClean="0"/>
-              <a:t>Software ECC exercise</a:t>
+              <a:t>Parity bit</a:t>
             </a:r>
             <a:endParaRPr lang="en-GB" dirty="0"/>
           </a:p>
@@ -10106,9 +10290,81 @@
           <a:p>
             <a:r>
               <a:rPr lang="en-GB" dirty="0" smtClean="0"/>
-              <a:t>TODO: hands-on exercise – implement ECC in simple CG using some library routines</a:t>
-            </a:r>
-            <a:endParaRPr lang="en-GB" dirty="0"/>
+              <a:t>Add an extra bit to data</a:t>
+            </a:r>
+          </a:p>
+          <a:p>
+            <a:r>
+              <a:rPr lang="en-GB" dirty="0" smtClean="0"/>
+              <a:t>Count number of ‘1’ bits in data</a:t>
+            </a:r>
+          </a:p>
+          <a:p>
+            <a:pPr lvl="1"/>
+            <a:r>
+              <a:rPr lang="en-GB" dirty="0" smtClean="0"/>
+              <a:t>If odd number, set parity bit to ‘1’</a:t>
+            </a:r>
+          </a:p>
+          <a:p>
+            <a:pPr lvl="1"/>
+            <a:r>
+              <a:rPr lang="en-GB" dirty="0" smtClean="0"/>
+              <a:t>If event number, set parity bit to ‘1’</a:t>
+            </a:r>
+          </a:p>
+          <a:p>
+            <a:pPr lvl="1"/>
+            <a:r>
+              <a:rPr lang="en-GB" dirty="0" smtClean="0"/>
+              <a:t>This is known as </a:t>
+            </a:r>
+            <a:r>
+              <a:rPr lang="en-GB" b="1" dirty="0" smtClean="0"/>
+              <a:t>even</a:t>
+            </a:r>
+            <a:r>
+              <a:rPr lang="en-GB" dirty="0" smtClean="0"/>
+              <a:t> parity</a:t>
+            </a:r>
+          </a:p>
+          <a:p>
+            <a:r>
+              <a:rPr lang="en-GB" dirty="0" smtClean="0"/>
+              <a:t>Can </a:t>
+            </a:r>
+            <a:r>
+              <a:rPr lang="en-GB" b="1" dirty="0" smtClean="0">
+                <a:solidFill>
+                  <a:srgbClr val="0000FF"/>
+                </a:solidFill>
+              </a:rPr>
+              <a:t>detect</a:t>
+            </a:r>
+            <a:r>
+              <a:rPr lang="en-GB" dirty="0" smtClean="0"/>
+              <a:t> any odd number of bit flips</a:t>
+            </a:r>
+          </a:p>
+          <a:p>
+            <a:r>
+              <a:rPr lang="en-GB" dirty="0" smtClean="0"/>
+              <a:t>Protects any number of data bits</a:t>
+            </a:r>
+          </a:p>
+          <a:p>
+            <a:r>
+              <a:rPr lang="en-GB" b="1" dirty="0" smtClean="0">
+                <a:solidFill>
+                  <a:srgbClr val="FF0000"/>
+                </a:solidFill>
+              </a:rPr>
+              <a:t>Cannot</a:t>
+            </a:r>
+            <a:r>
+              <a:rPr lang="en-GB" dirty="0" smtClean="0"/>
+              <a:t> correct corrupted data</a:t>
+            </a:r>
           </a:p>
         </p:txBody>
       </p:sp>
@@ -10136,10 +10392,33 @@
           </a:p>
         </p:txBody>
       </p:sp>
+      <p:sp>
+        <p:nvSpPr>
+          <p:cNvPr id="5" name="Footer Placeholder 4"/>
+          <p:cNvSpPr>
+            <a:spLocks noGrp="1"/>
+          </p:cNvSpPr>
+          <p:nvPr>
+            <p:ph type="ftr" sz="quarter" idx="3"/>
+          </p:nvPr>
+        </p:nvSpPr>
+        <p:spPr/>
+        <p:txBody>
+          <a:bodyPr/>
+          <a:lstStyle/>
+          <a:p>
+            <a:r>
+              <a:rPr lang="en-US" smtClean="0"/>
+              <a:t>© Simon McIntosh-Smith</a:t>
+            </a:r>
+            <a:endParaRPr lang="en-US"/>
+          </a:p>
+        </p:txBody>
+      </p:sp>
     </p:spTree>
     <p:extLst>
       <p:ext uri="{BB962C8B-B14F-4D97-AF65-F5344CB8AC3E}">
-        <p14:creationId xmlns:p14="http://schemas.microsoft.com/office/powerpoint/2010/main" val="1795682848"/>
+        <p14:creationId xmlns:p14="http://schemas.microsoft.com/office/powerpoint/2010/main" val="2194262835"/>
       </p:ext>
     </p:extLst>
   </p:cSld>
@@ -10191,30 +10470,7 @@
           <a:p>
             <a:r>
               <a:rPr lang="en-GB" dirty="0" smtClean="0"/>
-              <a:t>Conclusions</a:t>
-            </a:r>
-            <a:endParaRPr lang="en-GB" dirty="0"/>
-          </a:p>
-        </p:txBody>
-      </p:sp>
-      <p:sp>
-        <p:nvSpPr>
-          <p:cNvPr id="3" name="Content Placeholder 2"/>
-          <p:cNvSpPr>
-            <a:spLocks noGrp="1"/>
-          </p:cNvSpPr>
-          <p:nvPr>
-            <p:ph idx="1"/>
-          </p:nvPr>
-        </p:nvSpPr>
-        <p:spPr/>
-        <p:txBody>
-          <a:bodyPr/>
-          <a:lstStyle/>
-          <a:p>
-            <a:r>
-              <a:rPr lang="en-GB" dirty="0" smtClean="0"/>
-              <a:t>TODO: Conclusions</a:t>
+              <a:t>Parity bit - example</a:t>
             </a:r>
             <a:endParaRPr lang="en-GB" dirty="0"/>
           </a:p>
@@ -10244,10 +10500,2024 @@
           </a:p>
         </p:txBody>
       </p:sp>
+      <p:sp>
+        <p:nvSpPr>
+          <p:cNvPr id="5" name="Footer Placeholder 4"/>
+          <p:cNvSpPr>
+            <a:spLocks noGrp="1"/>
+          </p:cNvSpPr>
+          <p:nvPr>
+            <p:ph type="ftr" sz="quarter" idx="3"/>
+          </p:nvPr>
+        </p:nvSpPr>
+        <p:spPr/>
+        <p:txBody>
+          <a:bodyPr/>
+          <a:lstStyle/>
+          <a:p>
+            <a:r>
+              <a:rPr lang="en-US" dirty="0" smtClean="0"/>
+              <a:t>© Simon McIntosh-Smith</a:t>
+            </a:r>
+            <a:endParaRPr lang="en-US" dirty="0"/>
+          </a:p>
+        </p:txBody>
+      </p:sp>
+      <p:grpSp>
+        <p:nvGrpSpPr>
+          <p:cNvPr id="16" name="Group 15"/>
+          <p:cNvGrpSpPr/>
+          <p:nvPr/>
+        </p:nvGrpSpPr>
+        <p:grpSpPr>
+          <a:xfrm>
+            <a:off x="3276998" y="1917493"/>
+            <a:ext cx="2587678" cy="369332"/>
+            <a:chOff x="1795331" y="1680426"/>
+            <a:chExt cx="2587678" cy="369332"/>
+          </a:xfrm>
+        </p:grpSpPr>
+        <p:sp>
+          <p:nvSpPr>
+            <p:cNvPr id="7" name="TextBox 6"/>
+            <p:cNvSpPr txBox="1"/>
+            <p:nvPr/>
+          </p:nvSpPr>
+          <p:spPr>
+            <a:xfrm>
+              <a:off x="1795331" y="1680426"/>
+              <a:ext cx="320729" cy="369332"/>
+            </a:xfrm>
+            <a:prstGeom prst="rect">
+              <a:avLst/>
+            </a:prstGeom>
+          </p:spPr>
+          <p:style>
+            <a:lnRef idx="2">
+              <a:schemeClr val="dk1"/>
+            </a:lnRef>
+            <a:fillRef idx="1">
+              <a:schemeClr val="lt1"/>
+            </a:fillRef>
+            <a:effectRef idx="0">
+              <a:schemeClr val="dk1"/>
+            </a:effectRef>
+            <a:fontRef idx="minor">
+              <a:schemeClr val="dk1"/>
+            </a:fontRef>
+          </p:style>
+          <p:txBody>
+            <a:bodyPr wrap="square" rtlCol="0">
+              <a:spAutoFit/>
+            </a:bodyPr>
+            <a:lstStyle/>
+            <a:p>
+              <a:pPr algn="ctr"/>
+              <a:endParaRPr lang="en-GB" dirty="0"/>
+            </a:p>
+          </p:txBody>
+        </p:sp>
+        <p:sp>
+          <p:nvSpPr>
+            <p:cNvPr id="9" name="TextBox 8"/>
+            <p:cNvSpPr txBox="1"/>
+            <p:nvPr/>
+          </p:nvSpPr>
+          <p:spPr>
+            <a:xfrm>
+              <a:off x="2119181" y="1680426"/>
+              <a:ext cx="320729" cy="369332"/>
+            </a:xfrm>
+            <a:prstGeom prst="rect">
+              <a:avLst/>
+            </a:prstGeom>
+          </p:spPr>
+          <p:style>
+            <a:lnRef idx="2">
+              <a:schemeClr val="dk1"/>
+            </a:lnRef>
+            <a:fillRef idx="1">
+              <a:schemeClr val="lt1"/>
+            </a:fillRef>
+            <a:effectRef idx="0">
+              <a:schemeClr val="dk1"/>
+            </a:effectRef>
+            <a:fontRef idx="minor">
+              <a:schemeClr val="dk1"/>
+            </a:fontRef>
+          </p:style>
+          <p:txBody>
+            <a:bodyPr wrap="square" rtlCol="0">
+              <a:spAutoFit/>
+            </a:bodyPr>
+            <a:lstStyle/>
+            <a:p>
+              <a:pPr algn="ctr"/>
+              <a:r>
+                <a:rPr lang="en-GB" dirty="0"/>
+                <a:t>1</a:t>
+              </a:r>
+              <a:endParaRPr lang="en-GB" dirty="0"/>
+            </a:p>
+          </p:txBody>
+        </p:sp>
+        <p:sp>
+          <p:nvSpPr>
+            <p:cNvPr id="10" name="TextBox 9"/>
+            <p:cNvSpPr txBox="1"/>
+            <p:nvPr/>
+          </p:nvSpPr>
+          <p:spPr>
+            <a:xfrm>
+              <a:off x="2443031" y="1680426"/>
+              <a:ext cx="320729" cy="369332"/>
+            </a:xfrm>
+            <a:prstGeom prst="rect">
+              <a:avLst/>
+            </a:prstGeom>
+          </p:spPr>
+          <p:style>
+            <a:lnRef idx="2">
+              <a:schemeClr val="dk1"/>
+            </a:lnRef>
+            <a:fillRef idx="1">
+              <a:schemeClr val="lt1"/>
+            </a:fillRef>
+            <a:effectRef idx="0">
+              <a:schemeClr val="dk1"/>
+            </a:effectRef>
+            <a:fontRef idx="minor">
+              <a:schemeClr val="dk1"/>
+            </a:fontRef>
+          </p:style>
+          <p:txBody>
+            <a:bodyPr wrap="square" rtlCol="0">
+              <a:spAutoFit/>
+            </a:bodyPr>
+            <a:lstStyle/>
+            <a:p>
+              <a:pPr algn="ctr"/>
+              <a:r>
+                <a:rPr lang="en-GB" dirty="0"/>
+                <a:t>1</a:t>
+              </a:r>
+              <a:endParaRPr lang="en-GB" dirty="0"/>
+            </a:p>
+          </p:txBody>
+        </p:sp>
+        <p:sp>
+          <p:nvSpPr>
+            <p:cNvPr id="11" name="TextBox 10"/>
+            <p:cNvSpPr txBox="1"/>
+            <p:nvPr/>
+          </p:nvSpPr>
+          <p:spPr>
+            <a:xfrm>
+              <a:off x="2766881" y="1680426"/>
+              <a:ext cx="320729" cy="369332"/>
+            </a:xfrm>
+            <a:prstGeom prst="rect">
+              <a:avLst/>
+            </a:prstGeom>
+          </p:spPr>
+          <p:style>
+            <a:lnRef idx="2">
+              <a:schemeClr val="dk1"/>
+            </a:lnRef>
+            <a:fillRef idx="1">
+              <a:schemeClr val="lt1"/>
+            </a:fillRef>
+            <a:effectRef idx="0">
+              <a:schemeClr val="dk1"/>
+            </a:effectRef>
+            <a:fontRef idx="minor">
+              <a:schemeClr val="dk1"/>
+            </a:fontRef>
+          </p:style>
+          <p:txBody>
+            <a:bodyPr wrap="square" rtlCol="0">
+              <a:spAutoFit/>
+            </a:bodyPr>
+            <a:lstStyle/>
+            <a:p>
+              <a:pPr algn="ctr"/>
+              <a:r>
+                <a:rPr lang="en-GB" dirty="0" smtClean="0"/>
+                <a:t>0</a:t>
+              </a:r>
+              <a:endParaRPr lang="en-GB" dirty="0"/>
+            </a:p>
+          </p:txBody>
+        </p:sp>
+        <p:sp>
+          <p:nvSpPr>
+            <p:cNvPr id="12" name="TextBox 11"/>
+            <p:cNvSpPr txBox="1"/>
+            <p:nvPr/>
+          </p:nvSpPr>
+          <p:spPr>
+            <a:xfrm>
+              <a:off x="3090730" y="1680426"/>
+              <a:ext cx="320729" cy="369332"/>
+            </a:xfrm>
+            <a:prstGeom prst="rect">
+              <a:avLst/>
+            </a:prstGeom>
+          </p:spPr>
+          <p:style>
+            <a:lnRef idx="2">
+              <a:schemeClr val="dk1"/>
+            </a:lnRef>
+            <a:fillRef idx="1">
+              <a:schemeClr val="lt1"/>
+            </a:fillRef>
+            <a:effectRef idx="0">
+              <a:schemeClr val="dk1"/>
+            </a:effectRef>
+            <a:fontRef idx="minor">
+              <a:schemeClr val="dk1"/>
+            </a:fontRef>
+          </p:style>
+          <p:txBody>
+            <a:bodyPr wrap="square" rtlCol="0">
+              <a:spAutoFit/>
+            </a:bodyPr>
+            <a:lstStyle/>
+            <a:p>
+              <a:pPr algn="ctr"/>
+              <a:r>
+                <a:rPr lang="en-GB" dirty="0"/>
+                <a:t>1</a:t>
+              </a:r>
+              <a:endParaRPr lang="en-GB" dirty="0"/>
+            </a:p>
+          </p:txBody>
+        </p:sp>
+        <p:sp>
+          <p:nvSpPr>
+            <p:cNvPr id="13" name="TextBox 12"/>
+            <p:cNvSpPr txBox="1"/>
+            <p:nvPr/>
+          </p:nvSpPr>
+          <p:spPr>
+            <a:xfrm>
+              <a:off x="3414580" y="1680426"/>
+              <a:ext cx="320729" cy="369332"/>
+            </a:xfrm>
+            <a:prstGeom prst="rect">
+              <a:avLst/>
+            </a:prstGeom>
+          </p:spPr>
+          <p:style>
+            <a:lnRef idx="2">
+              <a:schemeClr val="dk1"/>
+            </a:lnRef>
+            <a:fillRef idx="1">
+              <a:schemeClr val="lt1"/>
+            </a:fillRef>
+            <a:effectRef idx="0">
+              <a:schemeClr val="dk1"/>
+            </a:effectRef>
+            <a:fontRef idx="minor">
+              <a:schemeClr val="dk1"/>
+            </a:fontRef>
+          </p:style>
+          <p:txBody>
+            <a:bodyPr wrap="square" rtlCol="0">
+              <a:spAutoFit/>
+            </a:bodyPr>
+            <a:lstStyle/>
+            <a:p>
+              <a:pPr algn="ctr"/>
+              <a:r>
+                <a:rPr lang="en-GB" dirty="0"/>
+                <a:t>1</a:t>
+              </a:r>
+              <a:endParaRPr lang="en-GB" dirty="0"/>
+            </a:p>
+          </p:txBody>
+        </p:sp>
+        <p:sp>
+          <p:nvSpPr>
+            <p:cNvPr id="14" name="TextBox 13"/>
+            <p:cNvSpPr txBox="1"/>
+            <p:nvPr/>
+          </p:nvSpPr>
+          <p:spPr>
+            <a:xfrm>
+              <a:off x="3738430" y="1680426"/>
+              <a:ext cx="320729" cy="369332"/>
+            </a:xfrm>
+            <a:prstGeom prst="rect">
+              <a:avLst/>
+            </a:prstGeom>
+          </p:spPr>
+          <p:style>
+            <a:lnRef idx="2">
+              <a:schemeClr val="dk1"/>
+            </a:lnRef>
+            <a:fillRef idx="1">
+              <a:schemeClr val="lt1"/>
+            </a:fillRef>
+            <a:effectRef idx="0">
+              <a:schemeClr val="dk1"/>
+            </a:effectRef>
+            <a:fontRef idx="minor">
+              <a:schemeClr val="dk1"/>
+            </a:fontRef>
+          </p:style>
+          <p:txBody>
+            <a:bodyPr wrap="square" rtlCol="0">
+              <a:spAutoFit/>
+            </a:bodyPr>
+            <a:lstStyle/>
+            <a:p>
+              <a:pPr algn="ctr"/>
+              <a:r>
+                <a:rPr lang="en-GB" dirty="0" smtClean="0"/>
+                <a:t>0</a:t>
+              </a:r>
+              <a:endParaRPr lang="en-GB" dirty="0"/>
+            </a:p>
+          </p:txBody>
+        </p:sp>
+        <p:sp>
+          <p:nvSpPr>
+            <p:cNvPr id="15" name="TextBox 14"/>
+            <p:cNvSpPr txBox="1"/>
+            <p:nvPr/>
+          </p:nvSpPr>
+          <p:spPr>
+            <a:xfrm>
+              <a:off x="4062280" y="1680426"/>
+              <a:ext cx="320729" cy="369332"/>
+            </a:xfrm>
+            <a:prstGeom prst="rect">
+              <a:avLst/>
+            </a:prstGeom>
+          </p:spPr>
+          <p:style>
+            <a:lnRef idx="2">
+              <a:schemeClr val="dk1"/>
+            </a:lnRef>
+            <a:fillRef idx="1">
+              <a:schemeClr val="lt1"/>
+            </a:fillRef>
+            <a:effectRef idx="0">
+              <a:schemeClr val="dk1"/>
+            </a:effectRef>
+            <a:fontRef idx="minor">
+              <a:schemeClr val="dk1"/>
+            </a:fontRef>
+          </p:style>
+          <p:txBody>
+            <a:bodyPr wrap="square" rtlCol="0">
+              <a:spAutoFit/>
+            </a:bodyPr>
+            <a:lstStyle/>
+            <a:p>
+              <a:pPr algn="ctr"/>
+              <a:r>
+                <a:rPr lang="en-GB" dirty="0"/>
+                <a:t>1</a:t>
+              </a:r>
+              <a:endParaRPr lang="en-GB" dirty="0"/>
+            </a:p>
+          </p:txBody>
+        </p:sp>
+      </p:grpSp>
+      <p:grpSp>
+        <p:nvGrpSpPr>
+          <p:cNvPr id="17" name="Group 16"/>
+          <p:cNvGrpSpPr/>
+          <p:nvPr/>
+        </p:nvGrpSpPr>
+        <p:grpSpPr>
+          <a:xfrm>
+            <a:off x="3276998" y="3136693"/>
+            <a:ext cx="2587678" cy="369332"/>
+            <a:chOff x="1795331" y="1680426"/>
+            <a:chExt cx="2587678" cy="369332"/>
+          </a:xfrm>
+        </p:grpSpPr>
+        <p:sp>
+          <p:nvSpPr>
+            <p:cNvPr id="18" name="TextBox 17"/>
+            <p:cNvSpPr txBox="1"/>
+            <p:nvPr/>
+          </p:nvSpPr>
+          <p:spPr>
+            <a:xfrm>
+              <a:off x="1795331" y="1680426"/>
+              <a:ext cx="320729" cy="369332"/>
+            </a:xfrm>
+            <a:prstGeom prst="rect">
+              <a:avLst/>
+            </a:prstGeom>
+          </p:spPr>
+          <p:style>
+            <a:lnRef idx="2">
+              <a:schemeClr val="dk1"/>
+            </a:lnRef>
+            <a:fillRef idx="1">
+              <a:schemeClr val="lt1"/>
+            </a:fillRef>
+            <a:effectRef idx="0">
+              <a:schemeClr val="dk1"/>
+            </a:effectRef>
+            <a:fontRef idx="minor">
+              <a:schemeClr val="dk1"/>
+            </a:fontRef>
+          </p:style>
+          <p:txBody>
+            <a:bodyPr wrap="square" rtlCol="0">
+              <a:spAutoFit/>
+            </a:bodyPr>
+            <a:lstStyle/>
+            <a:p>
+              <a:pPr algn="ctr"/>
+              <a:r>
+                <a:rPr lang="en-GB" b="1" dirty="0" smtClean="0">
+                  <a:solidFill>
+                    <a:srgbClr val="0000FF"/>
+                  </a:solidFill>
+                </a:rPr>
+                <a:t>1</a:t>
+              </a:r>
+              <a:endParaRPr lang="en-GB" b="1" dirty="0">
+                <a:solidFill>
+                  <a:srgbClr val="0000FF"/>
+                </a:solidFill>
+              </a:endParaRPr>
+            </a:p>
+          </p:txBody>
+        </p:sp>
+        <p:sp>
+          <p:nvSpPr>
+            <p:cNvPr id="19" name="TextBox 18"/>
+            <p:cNvSpPr txBox="1"/>
+            <p:nvPr/>
+          </p:nvSpPr>
+          <p:spPr>
+            <a:xfrm>
+              <a:off x="2119181" y="1680426"/>
+              <a:ext cx="320729" cy="369332"/>
+            </a:xfrm>
+            <a:prstGeom prst="rect">
+              <a:avLst/>
+            </a:prstGeom>
+          </p:spPr>
+          <p:style>
+            <a:lnRef idx="2">
+              <a:schemeClr val="dk1"/>
+            </a:lnRef>
+            <a:fillRef idx="1">
+              <a:schemeClr val="lt1"/>
+            </a:fillRef>
+            <a:effectRef idx="0">
+              <a:schemeClr val="dk1"/>
+            </a:effectRef>
+            <a:fontRef idx="minor">
+              <a:schemeClr val="dk1"/>
+            </a:fontRef>
+          </p:style>
+          <p:txBody>
+            <a:bodyPr wrap="square" rtlCol="0">
+              <a:spAutoFit/>
+            </a:bodyPr>
+            <a:lstStyle/>
+            <a:p>
+              <a:pPr algn="ctr"/>
+              <a:r>
+                <a:rPr lang="en-GB" dirty="0"/>
+                <a:t>1</a:t>
+              </a:r>
+              <a:endParaRPr lang="en-GB" dirty="0"/>
+            </a:p>
+          </p:txBody>
+        </p:sp>
+        <p:sp>
+          <p:nvSpPr>
+            <p:cNvPr id="20" name="TextBox 19"/>
+            <p:cNvSpPr txBox="1"/>
+            <p:nvPr/>
+          </p:nvSpPr>
+          <p:spPr>
+            <a:xfrm>
+              <a:off x="2443031" y="1680426"/>
+              <a:ext cx="320729" cy="369332"/>
+            </a:xfrm>
+            <a:prstGeom prst="rect">
+              <a:avLst/>
+            </a:prstGeom>
+          </p:spPr>
+          <p:style>
+            <a:lnRef idx="2">
+              <a:schemeClr val="dk1"/>
+            </a:lnRef>
+            <a:fillRef idx="1">
+              <a:schemeClr val="lt1"/>
+            </a:fillRef>
+            <a:effectRef idx="0">
+              <a:schemeClr val="dk1"/>
+            </a:effectRef>
+            <a:fontRef idx="minor">
+              <a:schemeClr val="dk1"/>
+            </a:fontRef>
+          </p:style>
+          <p:txBody>
+            <a:bodyPr wrap="square" rtlCol="0">
+              <a:spAutoFit/>
+            </a:bodyPr>
+            <a:lstStyle/>
+            <a:p>
+              <a:pPr algn="ctr"/>
+              <a:r>
+                <a:rPr lang="en-GB" dirty="0"/>
+                <a:t>1</a:t>
+              </a:r>
+              <a:endParaRPr lang="en-GB" dirty="0"/>
+            </a:p>
+          </p:txBody>
+        </p:sp>
+        <p:sp>
+          <p:nvSpPr>
+            <p:cNvPr id="21" name="TextBox 20"/>
+            <p:cNvSpPr txBox="1"/>
+            <p:nvPr/>
+          </p:nvSpPr>
+          <p:spPr>
+            <a:xfrm>
+              <a:off x="2766881" y="1680426"/>
+              <a:ext cx="320729" cy="369332"/>
+            </a:xfrm>
+            <a:prstGeom prst="rect">
+              <a:avLst/>
+            </a:prstGeom>
+          </p:spPr>
+          <p:style>
+            <a:lnRef idx="2">
+              <a:schemeClr val="dk1"/>
+            </a:lnRef>
+            <a:fillRef idx="1">
+              <a:schemeClr val="lt1"/>
+            </a:fillRef>
+            <a:effectRef idx="0">
+              <a:schemeClr val="dk1"/>
+            </a:effectRef>
+            <a:fontRef idx="minor">
+              <a:schemeClr val="dk1"/>
+            </a:fontRef>
+          </p:style>
+          <p:txBody>
+            <a:bodyPr wrap="square" rtlCol="0">
+              <a:spAutoFit/>
+            </a:bodyPr>
+            <a:lstStyle/>
+            <a:p>
+              <a:pPr algn="ctr"/>
+              <a:r>
+                <a:rPr lang="en-GB" dirty="0" smtClean="0"/>
+                <a:t>0</a:t>
+              </a:r>
+              <a:endParaRPr lang="en-GB" dirty="0"/>
+            </a:p>
+          </p:txBody>
+        </p:sp>
+        <p:sp>
+          <p:nvSpPr>
+            <p:cNvPr id="22" name="TextBox 21"/>
+            <p:cNvSpPr txBox="1"/>
+            <p:nvPr/>
+          </p:nvSpPr>
+          <p:spPr>
+            <a:xfrm>
+              <a:off x="3090730" y="1680426"/>
+              <a:ext cx="320729" cy="369332"/>
+            </a:xfrm>
+            <a:prstGeom prst="rect">
+              <a:avLst/>
+            </a:prstGeom>
+          </p:spPr>
+          <p:style>
+            <a:lnRef idx="2">
+              <a:schemeClr val="dk1"/>
+            </a:lnRef>
+            <a:fillRef idx="1">
+              <a:schemeClr val="lt1"/>
+            </a:fillRef>
+            <a:effectRef idx="0">
+              <a:schemeClr val="dk1"/>
+            </a:effectRef>
+            <a:fontRef idx="minor">
+              <a:schemeClr val="dk1"/>
+            </a:fontRef>
+          </p:style>
+          <p:txBody>
+            <a:bodyPr wrap="square" rtlCol="0">
+              <a:spAutoFit/>
+            </a:bodyPr>
+            <a:lstStyle/>
+            <a:p>
+              <a:pPr algn="ctr"/>
+              <a:r>
+                <a:rPr lang="en-GB" dirty="0"/>
+                <a:t>1</a:t>
+              </a:r>
+              <a:endParaRPr lang="en-GB" dirty="0"/>
+            </a:p>
+          </p:txBody>
+        </p:sp>
+        <p:sp>
+          <p:nvSpPr>
+            <p:cNvPr id="23" name="TextBox 22"/>
+            <p:cNvSpPr txBox="1"/>
+            <p:nvPr/>
+          </p:nvSpPr>
+          <p:spPr>
+            <a:xfrm>
+              <a:off x="3414580" y="1680426"/>
+              <a:ext cx="320729" cy="369332"/>
+            </a:xfrm>
+            <a:prstGeom prst="rect">
+              <a:avLst/>
+            </a:prstGeom>
+          </p:spPr>
+          <p:style>
+            <a:lnRef idx="2">
+              <a:schemeClr val="dk1"/>
+            </a:lnRef>
+            <a:fillRef idx="1">
+              <a:schemeClr val="lt1"/>
+            </a:fillRef>
+            <a:effectRef idx="0">
+              <a:schemeClr val="dk1"/>
+            </a:effectRef>
+            <a:fontRef idx="minor">
+              <a:schemeClr val="dk1"/>
+            </a:fontRef>
+          </p:style>
+          <p:txBody>
+            <a:bodyPr wrap="square" rtlCol="0">
+              <a:spAutoFit/>
+            </a:bodyPr>
+            <a:lstStyle/>
+            <a:p>
+              <a:pPr algn="ctr"/>
+              <a:r>
+                <a:rPr lang="en-GB" dirty="0"/>
+                <a:t>1</a:t>
+              </a:r>
+              <a:endParaRPr lang="en-GB" dirty="0"/>
+            </a:p>
+          </p:txBody>
+        </p:sp>
+        <p:sp>
+          <p:nvSpPr>
+            <p:cNvPr id="24" name="TextBox 23"/>
+            <p:cNvSpPr txBox="1"/>
+            <p:nvPr/>
+          </p:nvSpPr>
+          <p:spPr>
+            <a:xfrm>
+              <a:off x="3738430" y="1680426"/>
+              <a:ext cx="320729" cy="369332"/>
+            </a:xfrm>
+            <a:prstGeom prst="rect">
+              <a:avLst/>
+            </a:prstGeom>
+          </p:spPr>
+          <p:style>
+            <a:lnRef idx="2">
+              <a:schemeClr val="dk1"/>
+            </a:lnRef>
+            <a:fillRef idx="1">
+              <a:schemeClr val="lt1"/>
+            </a:fillRef>
+            <a:effectRef idx="0">
+              <a:schemeClr val="dk1"/>
+            </a:effectRef>
+            <a:fontRef idx="minor">
+              <a:schemeClr val="dk1"/>
+            </a:fontRef>
+          </p:style>
+          <p:txBody>
+            <a:bodyPr wrap="square" rtlCol="0">
+              <a:spAutoFit/>
+            </a:bodyPr>
+            <a:lstStyle/>
+            <a:p>
+              <a:pPr algn="ctr"/>
+              <a:r>
+                <a:rPr lang="en-GB" dirty="0" smtClean="0"/>
+                <a:t>0</a:t>
+              </a:r>
+              <a:endParaRPr lang="en-GB" dirty="0"/>
+            </a:p>
+          </p:txBody>
+        </p:sp>
+        <p:sp>
+          <p:nvSpPr>
+            <p:cNvPr id="25" name="TextBox 24"/>
+            <p:cNvSpPr txBox="1"/>
+            <p:nvPr/>
+          </p:nvSpPr>
+          <p:spPr>
+            <a:xfrm>
+              <a:off x="4062280" y="1680426"/>
+              <a:ext cx="320729" cy="369332"/>
+            </a:xfrm>
+            <a:prstGeom prst="rect">
+              <a:avLst/>
+            </a:prstGeom>
+          </p:spPr>
+          <p:style>
+            <a:lnRef idx="2">
+              <a:schemeClr val="dk1"/>
+            </a:lnRef>
+            <a:fillRef idx="1">
+              <a:schemeClr val="lt1"/>
+            </a:fillRef>
+            <a:effectRef idx="0">
+              <a:schemeClr val="dk1"/>
+            </a:effectRef>
+            <a:fontRef idx="minor">
+              <a:schemeClr val="dk1"/>
+            </a:fontRef>
+          </p:style>
+          <p:txBody>
+            <a:bodyPr wrap="square" rtlCol="0">
+              <a:spAutoFit/>
+            </a:bodyPr>
+            <a:lstStyle/>
+            <a:p>
+              <a:pPr algn="ctr"/>
+              <a:r>
+                <a:rPr lang="en-GB" dirty="0"/>
+                <a:t>1</a:t>
+              </a:r>
+              <a:endParaRPr lang="en-GB" dirty="0"/>
+            </a:p>
+          </p:txBody>
+        </p:sp>
+      </p:grpSp>
+      <p:grpSp>
+        <p:nvGrpSpPr>
+          <p:cNvPr id="26" name="Group 25"/>
+          <p:cNvGrpSpPr/>
+          <p:nvPr/>
+        </p:nvGrpSpPr>
+        <p:grpSpPr>
+          <a:xfrm>
+            <a:off x="1007931" y="4732659"/>
+            <a:ext cx="2587678" cy="369332"/>
+            <a:chOff x="1795331" y="1680426"/>
+            <a:chExt cx="2587678" cy="369332"/>
+          </a:xfrm>
+        </p:grpSpPr>
+        <p:sp>
+          <p:nvSpPr>
+            <p:cNvPr id="27" name="TextBox 26"/>
+            <p:cNvSpPr txBox="1"/>
+            <p:nvPr/>
+          </p:nvSpPr>
+          <p:spPr>
+            <a:xfrm>
+              <a:off x="1795331" y="1680426"/>
+              <a:ext cx="320729" cy="369332"/>
+            </a:xfrm>
+            <a:prstGeom prst="rect">
+              <a:avLst/>
+            </a:prstGeom>
+          </p:spPr>
+          <p:style>
+            <a:lnRef idx="2">
+              <a:schemeClr val="dk1"/>
+            </a:lnRef>
+            <a:fillRef idx="1">
+              <a:schemeClr val="lt1"/>
+            </a:fillRef>
+            <a:effectRef idx="0">
+              <a:schemeClr val="dk1"/>
+            </a:effectRef>
+            <a:fontRef idx="minor">
+              <a:schemeClr val="dk1"/>
+            </a:fontRef>
+          </p:style>
+          <p:txBody>
+            <a:bodyPr wrap="square" rtlCol="0">
+              <a:spAutoFit/>
+            </a:bodyPr>
+            <a:lstStyle/>
+            <a:p>
+              <a:pPr algn="ctr"/>
+              <a:r>
+                <a:rPr lang="en-GB" b="1" dirty="0" smtClean="0">
+                  <a:solidFill>
+                    <a:srgbClr val="0000FF"/>
+                  </a:solidFill>
+                </a:rPr>
+                <a:t>1</a:t>
+              </a:r>
+              <a:endParaRPr lang="en-GB" b="1" dirty="0">
+                <a:solidFill>
+                  <a:srgbClr val="0000FF"/>
+                </a:solidFill>
+              </a:endParaRPr>
+            </a:p>
+          </p:txBody>
+        </p:sp>
+        <p:sp>
+          <p:nvSpPr>
+            <p:cNvPr id="28" name="TextBox 27"/>
+            <p:cNvSpPr txBox="1"/>
+            <p:nvPr/>
+          </p:nvSpPr>
+          <p:spPr>
+            <a:xfrm>
+              <a:off x="2119181" y="1680426"/>
+              <a:ext cx="320729" cy="369332"/>
+            </a:xfrm>
+            <a:prstGeom prst="rect">
+              <a:avLst/>
+            </a:prstGeom>
+          </p:spPr>
+          <p:style>
+            <a:lnRef idx="2">
+              <a:schemeClr val="dk1"/>
+            </a:lnRef>
+            <a:fillRef idx="1">
+              <a:schemeClr val="lt1"/>
+            </a:fillRef>
+            <a:effectRef idx="0">
+              <a:schemeClr val="dk1"/>
+            </a:effectRef>
+            <a:fontRef idx="minor">
+              <a:schemeClr val="dk1"/>
+            </a:fontRef>
+          </p:style>
+          <p:txBody>
+            <a:bodyPr wrap="square" rtlCol="0">
+              <a:spAutoFit/>
+            </a:bodyPr>
+            <a:lstStyle/>
+            <a:p>
+              <a:pPr algn="ctr"/>
+              <a:r>
+                <a:rPr lang="en-GB" dirty="0"/>
+                <a:t>1</a:t>
+              </a:r>
+              <a:endParaRPr lang="en-GB" dirty="0"/>
+            </a:p>
+          </p:txBody>
+        </p:sp>
+        <p:sp>
+          <p:nvSpPr>
+            <p:cNvPr id="29" name="TextBox 28"/>
+            <p:cNvSpPr txBox="1"/>
+            <p:nvPr/>
+          </p:nvSpPr>
+          <p:spPr>
+            <a:xfrm>
+              <a:off x="2443031" y="1680426"/>
+              <a:ext cx="320729" cy="369332"/>
+            </a:xfrm>
+            <a:prstGeom prst="rect">
+              <a:avLst/>
+            </a:prstGeom>
+          </p:spPr>
+          <p:style>
+            <a:lnRef idx="2">
+              <a:schemeClr val="dk1"/>
+            </a:lnRef>
+            <a:fillRef idx="1">
+              <a:schemeClr val="lt1"/>
+            </a:fillRef>
+            <a:effectRef idx="0">
+              <a:schemeClr val="dk1"/>
+            </a:effectRef>
+            <a:fontRef idx="minor">
+              <a:schemeClr val="dk1"/>
+            </a:fontRef>
+          </p:style>
+          <p:txBody>
+            <a:bodyPr wrap="square" rtlCol="0">
+              <a:spAutoFit/>
+            </a:bodyPr>
+            <a:lstStyle/>
+            <a:p>
+              <a:pPr algn="ctr"/>
+              <a:r>
+                <a:rPr lang="en-GB" dirty="0"/>
+                <a:t>1</a:t>
+              </a:r>
+              <a:endParaRPr lang="en-GB" dirty="0"/>
+            </a:p>
+          </p:txBody>
+        </p:sp>
+        <p:sp>
+          <p:nvSpPr>
+            <p:cNvPr id="30" name="TextBox 29"/>
+            <p:cNvSpPr txBox="1"/>
+            <p:nvPr/>
+          </p:nvSpPr>
+          <p:spPr>
+            <a:xfrm>
+              <a:off x="2766881" y="1680426"/>
+              <a:ext cx="320729" cy="369332"/>
+            </a:xfrm>
+            <a:prstGeom prst="rect">
+              <a:avLst/>
+            </a:prstGeom>
+          </p:spPr>
+          <p:style>
+            <a:lnRef idx="2">
+              <a:schemeClr val="dk1"/>
+            </a:lnRef>
+            <a:fillRef idx="1">
+              <a:schemeClr val="lt1"/>
+            </a:fillRef>
+            <a:effectRef idx="0">
+              <a:schemeClr val="dk1"/>
+            </a:effectRef>
+            <a:fontRef idx="minor">
+              <a:schemeClr val="dk1"/>
+            </a:fontRef>
+          </p:style>
+          <p:txBody>
+            <a:bodyPr wrap="square" rtlCol="0">
+              <a:spAutoFit/>
+            </a:bodyPr>
+            <a:lstStyle/>
+            <a:p>
+              <a:pPr algn="ctr"/>
+              <a:r>
+                <a:rPr lang="en-GB" dirty="0" smtClean="0"/>
+                <a:t>0</a:t>
+              </a:r>
+              <a:endParaRPr lang="en-GB" dirty="0"/>
+            </a:p>
+          </p:txBody>
+        </p:sp>
+        <p:sp>
+          <p:nvSpPr>
+            <p:cNvPr id="31" name="TextBox 30"/>
+            <p:cNvSpPr txBox="1"/>
+            <p:nvPr/>
+          </p:nvSpPr>
+          <p:spPr>
+            <a:xfrm>
+              <a:off x="3090730" y="1680426"/>
+              <a:ext cx="320729" cy="369332"/>
+            </a:xfrm>
+            <a:prstGeom prst="rect">
+              <a:avLst/>
+            </a:prstGeom>
+          </p:spPr>
+          <p:style>
+            <a:lnRef idx="2">
+              <a:schemeClr val="dk1"/>
+            </a:lnRef>
+            <a:fillRef idx="1">
+              <a:schemeClr val="lt1"/>
+            </a:fillRef>
+            <a:effectRef idx="0">
+              <a:schemeClr val="dk1"/>
+            </a:effectRef>
+            <a:fontRef idx="minor">
+              <a:schemeClr val="dk1"/>
+            </a:fontRef>
+          </p:style>
+          <p:txBody>
+            <a:bodyPr wrap="square" rtlCol="0">
+              <a:spAutoFit/>
+            </a:bodyPr>
+            <a:lstStyle/>
+            <a:p>
+              <a:pPr algn="ctr"/>
+              <a:r>
+                <a:rPr lang="en-GB" dirty="0"/>
+                <a:t>1</a:t>
+              </a:r>
+              <a:endParaRPr lang="en-GB" dirty="0"/>
+            </a:p>
+          </p:txBody>
+        </p:sp>
+        <p:sp>
+          <p:nvSpPr>
+            <p:cNvPr id="32" name="TextBox 31"/>
+            <p:cNvSpPr txBox="1"/>
+            <p:nvPr/>
+          </p:nvSpPr>
+          <p:spPr>
+            <a:xfrm>
+              <a:off x="3414580" y="1680426"/>
+              <a:ext cx="320729" cy="369332"/>
+            </a:xfrm>
+            <a:prstGeom prst="rect">
+              <a:avLst/>
+            </a:prstGeom>
+          </p:spPr>
+          <p:style>
+            <a:lnRef idx="2">
+              <a:schemeClr val="dk1"/>
+            </a:lnRef>
+            <a:fillRef idx="1">
+              <a:schemeClr val="lt1"/>
+            </a:fillRef>
+            <a:effectRef idx="0">
+              <a:schemeClr val="dk1"/>
+            </a:effectRef>
+            <a:fontRef idx="minor">
+              <a:schemeClr val="dk1"/>
+            </a:fontRef>
+          </p:style>
+          <p:txBody>
+            <a:bodyPr wrap="square" rtlCol="0">
+              <a:spAutoFit/>
+            </a:bodyPr>
+            <a:lstStyle/>
+            <a:p>
+              <a:pPr algn="ctr"/>
+              <a:r>
+                <a:rPr lang="en-GB" dirty="0"/>
+                <a:t>1</a:t>
+              </a:r>
+              <a:endParaRPr lang="en-GB" dirty="0"/>
+            </a:p>
+          </p:txBody>
+        </p:sp>
+        <p:sp>
+          <p:nvSpPr>
+            <p:cNvPr id="33" name="TextBox 32"/>
+            <p:cNvSpPr txBox="1"/>
+            <p:nvPr/>
+          </p:nvSpPr>
+          <p:spPr>
+            <a:xfrm>
+              <a:off x="3738430" y="1680426"/>
+              <a:ext cx="320729" cy="369332"/>
+            </a:xfrm>
+            <a:prstGeom prst="rect">
+              <a:avLst/>
+            </a:prstGeom>
+          </p:spPr>
+          <p:style>
+            <a:lnRef idx="2">
+              <a:schemeClr val="dk1"/>
+            </a:lnRef>
+            <a:fillRef idx="1">
+              <a:schemeClr val="lt1"/>
+            </a:fillRef>
+            <a:effectRef idx="0">
+              <a:schemeClr val="dk1"/>
+            </a:effectRef>
+            <a:fontRef idx="minor">
+              <a:schemeClr val="dk1"/>
+            </a:fontRef>
+          </p:style>
+          <p:txBody>
+            <a:bodyPr wrap="square" rtlCol="0">
+              <a:spAutoFit/>
+            </a:bodyPr>
+            <a:lstStyle/>
+            <a:p>
+              <a:pPr algn="ctr"/>
+              <a:r>
+                <a:rPr lang="en-GB" dirty="0" smtClean="0"/>
+                <a:t>0</a:t>
+              </a:r>
+              <a:endParaRPr lang="en-GB" dirty="0"/>
+            </a:p>
+          </p:txBody>
+        </p:sp>
+        <p:sp>
+          <p:nvSpPr>
+            <p:cNvPr id="34" name="TextBox 33"/>
+            <p:cNvSpPr txBox="1"/>
+            <p:nvPr/>
+          </p:nvSpPr>
+          <p:spPr>
+            <a:xfrm>
+              <a:off x="4062280" y="1680426"/>
+              <a:ext cx="320729" cy="369332"/>
+            </a:xfrm>
+            <a:prstGeom prst="rect">
+              <a:avLst/>
+            </a:prstGeom>
+          </p:spPr>
+          <p:style>
+            <a:lnRef idx="2">
+              <a:schemeClr val="dk1"/>
+            </a:lnRef>
+            <a:fillRef idx="1">
+              <a:schemeClr val="lt1"/>
+            </a:fillRef>
+            <a:effectRef idx="0">
+              <a:schemeClr val="dk1"/>
+            </a:effectRef>
+            <a:fontRef idx="minor">
+              <a:schemeClr val="dk1"/>
+            </a:fontRef>
+          </p:style>
+          <p:txBody>
+            <a:bodyPr wrap="square" rtlCol="0">
+              <a:spAutoFit/>
+            </a:bodyPr>
+            <a:lstStyle/>
+            <a:p>
+              <a:pPr algn="ctr"/>
+              <a:r>
+                <a:rPr lang="en-GB" dirty="0"/>
+                <a:t>1</a:t>
+              </a:r>
+              <a:endParaRPr lang="en-GB" dirty="0"/>
+            </a:p>
+          </p:txBody>
+        </p:sp>
+      </p:grpSp>
+      <p:grpSp>
+        <p:nvGrpSpPr>
+          <p:cNvPr id="35" name="Group 34"/>
+          <p:cNvGrpSpPr/>
+          <p:nvPr/>
+        </p:nvGrpSpPr>
+        <p:grpSpPr>
+          <a:xfrm>
+            <a:off x="5537598" y="4707260"/>
+            <a:ext cx="2587678" cy="369332"/>
+            <a:chOff x="1795331" y="1680426"/>
+            <a:chExt cx="2587678" cy="369332"/>
+          </a:xfrm>
+        </p:grpSpPr>
+        <p:sp>
+          <p:nvSpPr>
+            <p:cNvPr id="36" name="TextBox 35"/>
+            <p:cNvSpPr txBox="1"/>
+            <p:nvPr/>
+          </p:nvSpPr>
+          <p:spPr>
+            <a:xfrm>
+              <a:off x="1795331" y="1680426"/>
+              <a:ext cx="320729" cy="369332"/>
+            </a:xfrm>
+            <a:prstGeom prst="rect">
+              <a:avLst/>
+            </a:prstGeom>
+          </p:spPr>
+          <p:style>
+            <a:lnRef idx="2">
+              <a:schemeClr val="dk1"/>
+            </a:lnRef>
+            <a:fillRef idx="1">
+              <a:schemeClr val="lt1"/>
+            </a:fillRef>
+            <a:effectRef idx="0">
+              <a:schemeClr val="dk1"/>
+            </a:effectRef>
+            <a:fontRef idx="minor">
+              <a:schemeClr val="dk1"/>
+            </a:fontRef>
+          </p:style>
+          <p:txBody>
+            <a:bodyPr wrap="square" rtlCol="0">
+              <a:spAutoFit/>
+            </a:bodyPr>
+            <a:lstStyle/>
+            <a:p>
+              <a:pPr algn="ctr"/>
+              <a:r>
+                <a:rPr lang="en-GB" b="1" dirty="0" smtClean="0">
+                  <a:solidFill>
+                    <a:srgbClr val="0000FF"/>
+                  </a:solidFill>
+                </a:rPr>
+                <a:t>1</a:t>
+              </a:r>
+              <a:endParaRPr lang="en-GB" b="1" dirty="0">
+                <a:solidFill>
+                  <a:srgbClr val="0000FF"/>
+                </a:solidFill>
+              </a:endParaRPr>
+            </a:p>
+          </p:txBody>
+        </p:sp>
+        <p:sp>
+          <p:nvSpPr>
+            <p:cNvPr id="37" name="TextBox 36"/>
+            <p:cNvSpPr txBox="1"/>
+            <p:nvPr/>
+          </p:nvSpPr>
+          <p:spPr>
+            <a:xfrm>
+              <a:off x="2119181" y="1680426"/>
+              <a:ext cx="320729" cy="369332"/>
+            </a:xfrm>
+            <a:prstGeom prst="rect">
+              <a:avLst/>
+            </a:prstGeom>
+          </p:spPr>
+          <p:style>
+            <a:lnRef idx="2">
+              <a:schemeClr val="dk1"/>
+            </a:lnRef>
+            <a:fillRef idx="1">
+              <a:schemeClr val="lt1"/>
+            </a:fillRef>
+            <a:effectRef idx="0">
+              <a:schemeClr val="dk1"/>
+            </a:effectRef>
+            <a:fontRef idx="minor">
+              <a:schemeClr val="dk1"/>
+            </a:fontRef>
+          </p:style>
+          <p:txBody>
+            <a:bodyPr wrap="square" rtlCol="0">
+              <a:spAutoFit/>
+            </a:bodyPr>
+            <a:lstStyle/>
+            <a:p>
+              <a:pPr algn="ctr"/>
+              <a:r>
+                <a:rPr lang="en-GB" dirty="0"/>
+                <a:t>1</a:t>
+              </a:r>
+              <a:endParaRPr lang="en-GB" dirty="0"/>
+            </a:p>
+          </p:txBody>
+        </p:sp>
+        <p:sp>
+          <p:nvSpPr>
+            <p:cNvPr id="38" name="TextBox 37"/>
+            <p:cNvSpPr txBox="1"/>
+            <p:nvPr/>
+          </p:nvSpPr>
+          <p:spPr>
+            <a:xfrm>
+              <a:off x="2443031" y="1680426"/>
+              <a:ext cx="320729" cy="369332"/>
+            </a:xfrm>
+            <a:prstGeom prst="rect">
+              <a:avLst/>
+            </a:prstGeom>
+          </p:spPr>
+          <p:style>
+            <a:lnRef idx="2">
+              <a:schemeClr val="dk1"/>
+            </a:lnRef>
+            <a:fillRef idx="1">
+              <a:schemeClr val="lt1"/>
+            </a:fillRef>
+            <a:effectRef idx="0">
+              <a:schemeClr val="dk1"/>
+            </a:effectRef>
+            <a:fontRef idx="minor">
+              <a:schemeClr val="dk1"/>
+            </a:fontRef>
+          </p:style>
+          <p:txBody>
+            <a:bodyPr wrap="square" rtlCol="0">
+              <a:spAutoFit/>
+            </a:bodyPr>
+            <a:lstStyle/>
+            <a:p>
+              <a:pPr algn="ctr"/>
+              <a:r>
+                <a:rPr lang="en-GB" dirty="0"/>
+                <a:t>1</a:t>
+              </a:r>
+              <a:endParaRPr lang="en-GB" dirty="0"/>
+            </a:p>
+          </p:txBody>
+        </p:sp>
+        <p:sp>
+          <p:nvSpPr>
+            <p:cNvPr id="39" name="TextBox 38"/>
+            <p:cNvSpPr txBox="1"/>
+            <p:nvPr/>
+          </p:nvSpPr>
+          <p:spPr>
+            <a:xfrm>
+              <a:off x="2766881" y="1680426"/>
+              <a:ext cx="320729" cy="369332"/>
+            </a:xfrm>
+            <a:prstGeom prst="rect">
+              <a:avLst/>
+            </a:prstGeom>
+          </p:spPr>
+          <p:style>
+            <a:lnRef idx="2">
+              <a:schemeClr val="dk1"/>
+            </a:lnRef>
+            <a:fillRef idx="1">
+              <a:schemeClr val="lt1"/>
+            </a:fillRef>
+            <a:effectRef idx="0">
+              <a:schemeClr val="dk1"/>
+            </a:effectRef>
+            <a:fontRef idx="minor">
+              <a:schemeClr val="dk1"/>
+            </a:fontRef>
+          </p:style>
+          <p:txBody>
+            <a:bodyPr wrap="square" rtlCol="0">
+              <a:spAutoFit/>
+            </a:bodyPr>
+            <a:lstStyle/>
+            <a:p>
+              <a:pPr algn="ctr"/>
+              <a:r>
+                <a:rPr lang="en-GB" dirty="0" smtClean="0"/>
+                <a:t>0</a:t>
+              </a:r>
+              <a:endParaRPr lang="en-GB" dirty="0"/>
+            </a:p>
+          </p:txBody>
+        </p:sp>
+        <p:sp>
+          <p:nvSpPr>
+            <p:cNvPr id="40" name="TextBox 39"/>
+            <p:cNvSpPr txBox="1"/>
+            <p:nvPr/>
+          </p:nvSpPr>
+          <p:spPr>
+            <a:xfrm>
+              <a:off x="3090730" y="1680426"/>
+              <a:ext cx="320729" cy="369332"/>
+            </a:xfrm>
+            <a:prstGeom prst="rect">
+              <a:avLst/>
+            </a:prstGeom>
+          </p:spPr>
+          <p:style>
+            <a:lnRef idx="2">
+              <a:schemeClr val="dk1"/>
+            </a:lnRef>
+            <a:fillRef idx="1">
+              <a:schemeClr val="lt1"/>
+            </a:fillRef>
+            <a:effectRef idx="0">
+              <a:schemeClr val="dk1"/>
+            </a:effectRef>
+            <a:fontRef idx="minor">
+              <a:schemeClr val="dk1"/>
+            </a:fontRef>
+          </p:style>
+          <p:txBody>
+            <a:bodyPr wrap="square" rtlCol="0">
+              <a:spAutoFit/>
+            </a:bodyPr>
+            <a:lstStyle/>
+            <a:p>
+              <a:pPr algn="ctr"/>
+              <a:r>
+                <a:rPr lang="en-GB" dirty="0"/>
+                <a:t>1</a:t>
+              </a:r>
+              <a:endParaRPr lang="en-GB" dirty="0"/>
+            </a:p>
+          </p:txBody>
+        </p:sp>
+        <p:sp>
+          <p:nvSpPr>
+            <p:cNvPr id="41" name="TextBox 40"/>
+            <p:cNvSpPr txBox="1"/>
+            <p:nvPr/>
+          </p:nvSpPr>
+          <p:spPr>
+            <a:xfrm>
+              <a:off x="3414580" y="1680426"/>
+              <a:ext cx="320729" cy="369332"/>
+            </a:xfrm>
+            <a:prstGeom prst="rect">
+              <a:avLst/>
+            </a:prstGeom>
+          </p:spPr>
+          <p:style>
+            <a:lnRef idx="2">
+              <a:schemeClr val="dk1"/>
+            </a:lnRef>
+            <a:fillRef idx="1">
+              <a:schemeClr val="lt1"/>
+            </a:fillRef>
+            <a:effectRef idx="0">
+              <a:schemeClr val="dk1"/>
+            </a:effectRef>
+            <a:fontRef idx="minor">
+              <a:schemeClr val="dk1"/>
+            </a:fontRef>
+          </p:style>
+          <p:txBody>
+            <a:bodyPr wrap="square" rtlCol="0">
+              <a:spAutoFit/>
+            </a:bodyPr>
+            <a:lstStyle/>
+            <a:p>
+              <a:pPr algn="ctr"/>
+              <a:r>
+                <a:rPr lang="en-GB" b="1" dirty="0" smtClean="0">
+                  <a:solidFill>
+                    <a:srgbClr val="FF0000"/>
+                  </a:solidFill>
+                </a:rPr>
+                <a:t>0</a:t>
+              </a:r>
+              <a:endParaRPr lang="en-GB" b="1" dirty="0">
+                <a:solidFill>
+                  <a:srgbClr val="FF0000"/>
+                </a:solidFill>
+              </a:endParaRPr>
+            </a:p>
+          </p:txBody>
+        </p:sp>
+        <p:sp>
+          <p:nvSpPr>
+            <p:cNvPr id="42" name="TextBox 41"/>
+            <p:cNvSpPr txBox="1"/>
+            <p:nvPr/>
+          </p:nvSpPr>
+          <p:spPr>
+            <a:xfrm>
+              <a:off x="3738430" y="1680426"/>
+              <a:ext cx="320729" cy="369332"/>
+            </a:xfrm>
+            <a:prstGeom prst="rect">
+              <a:avLst/>
+            </a:prstGeom>
+          </p:spPr>
+          <p:style>
+            <a:lnRef idx="2">
+              <a:schemeClr val="dk1"/>
+            </a:lnRef>
+            <a:fillRef idx="1">
+              <a:schemeClr val="lt1"/>
+            </a:fillRef>
+            <a:effectRef idx="0">
+              <a:schemeClr val="dk1"/>
+            </a:effectRef>
+            <a:fontRef idx="minor">
+              <a:schemeClr val="dk1"/>
+            </a:fontRef>
+          </p:style>
+          <p:txBody>
+            <a:bodyPr wrap="square" rtlCol="0">
+              <a:spAutoFit/>
+            </a:bodyPr>
+            <a:lstStyle/>
+            <a:p>
+              <a:pPr algn="ctr"/>
+              <a:r>
+                <a:rPr lang="en-GB" dirty="0" smtClean="0"/>
+                <a:t>0</a:t>
+              </a:r>
+              <a:endParaRPr lang="en-GB" dirty="0"/>
+            </a:p>
+          </p:txBody>
+        </p:sp>
+        <p:sp>
+          <p:nvSpPr>
+            <p:cNvPr id="43" name="TextBox 42"/>
+            <p:cNvSpPr txBox="1"/>
+            <p:nvPr/>
+          </p:nvSpPr>
+          <p:spPr>
+            <a:xfrm>
+              <a:off x="4062280" y="1680426"/>
+              <a:ext cx="320729" cy="369332"/>
+            </a:xfrm>
+            <a:prstGeom prst="rect">
+              <a:avLst/>
+            </a:prstGeom>
+          </p:spPr>
+          <p:style>
+            <a:lnRef idx="2">
+              <a:schemeClr val="dk1"/>
+            </a:lnRef>
+            <a:fillRef idx="1">
+              <a:schemeClr val="lt1"/>
+            </a:fillRef>
+            <a:effectRef idx="0">
+              <a:schemeClr val="dk1"/>
+            </a:effectRef>
+            <a:fontRef idx="minor">
+              <a:schemeClr val="dk1"/>
+            </a:fontRef>
+          </p:style>
+          <p:txBody>
+            <a:bodyPr wrap="square" rtlCol="0">
+              <a:spAutoFit/>
+            </a:bodyPr>
+            <a:lstStyle/>
+            <a:p>
+              <a:pPr algn="ctr"/>
+              <a:r>
+                <a:rPr lang="en-GB" dirty="0"/>
+                <a:t>1</a:t>
+              </a:r>
+              <a:endParaRPr lang="en-GB" dirty="0"/>
+            </a:p>
+          </p:txBody>
+        </p:sp>
+      </p:grpSp>
+      <p:sp>
+        <p:nvSpPr>
+          <p:cNvPr id="46" name="Left Brace 45"/>
+          <p:cNvSpPr/>
+          <p:nvPr/>
+        </p:nvSpPr>
+        <p:spPr>
+          <a:xfrm rot="5400000">
+            <a:off x="4654550" y="666750"/>
+            <a:ext cx="190500" cy="2235200"/>
+          </a:xfrm>
+          <a:prstGeom prst="leftBrace">
+            <a:avLst>
+              <a:gd name="adj1" fmla="val 40765"/>
+              <a:gd name="adj2" fmla="val 50000"/>
+            </a:avLst>
+          </a:prstGeom>
+        </p:spPr>
+        <p:style>
+          <a:lnRef idx="2">
+            <a:schemeClr val="dk1"/>
+          </a:lnRef>
+          <a:fillRef idx="0">
+            <a:schemeClr val="dk1"/>
+          </a:fillRef>
+          <a:effectRef idx="1">
+            <a:schemeClr val="dk1"/>
+          </a:effectRef>
+          <a:fontRef idx="minor">
+            <a:schemeClr val="tx1"/>
+          </a:fontRef>
+        </p:style>
+        <p:txBody>
+          <a:bodyPr rtlCol="0" anchor="ctr"/>
+          <a:lstStyle/>
+          <a:p>
+            <a:pPr algn="ctr"/>
+            <a:endParaRPr lang="en-GB"/>
+          </a:p>
+        </p:txBody>
+      </p:sp>
+      <p:sp>
+        <p:nvSpPr>
+          <p:cNvPr id="47" name="TextBox 46"/>
+          <p:cNvSpPr txBox="1"/>
+          <p:nvPr/>
+        </p:nvSpPr>
+        <p:spPr>
+          <a:xfrm>
+            <a:off x="4127500" y="1282700"/>
+            <a:ext cx="1244600" cy="369332"/>
+          </a:xfrm>
+          <a:prstGeom prst="rect">
+            <a:avLst/>
+          </a:prstGeom>
+          <a:noFill/>
+        </p:spPr>
+        <p:txBody>
+          <a:bodyPr wrap="square" rtlCol="0">
+            <a:spAutoFit/>
+          </a:bodyPr>
+          <a:lstStyle/>
+          <a:p>
+            <a:r>
+              <a:rPr lang="en-GB" dirty="0" smtClean="0"/>
+              <a:t>7 data bits</a:t>
+            </a:r>
+            <a:endParaRPr lang="en-GB" dirty="0"/>
+          </a:p>
+        </p:txBody>
+      </p:sp>
+      <p:sp>
+        <p:nvSpPr>
+          <p:cNvPr id="48" name="TextBox 47"/>
+          <p:cNvSpPr txBox="1"/>
+          <p:nvPr/>
+        </p:nvSpPr>
+        <p:spPr>
+          <a:xfrm>
+            <a:off x="2908300" y="1301750"/>
+            <a:ext cx="1054100" cy="369332"/>
+          </a:xfrm>
+          <a:prstGeom prst="rect">
+            <a:avLst/>
+          </a:prstGeom>
+          <a:noFill/>
+        </p:spPr>
+        <p:txBody>
+          <a:bodyPr wrap="square" rtlCol="0">
+            <a:spAutoFit/>
+          </a:bodyPr>
+          <a:lstStyle/>
+          <a:p>
+            <a:r>
+              <a:rPr lang="en-GB" dirty="0" smtClean="0"/>
+              <a:t>parity bit</a:t>
+            </a:r>
+            <a:endParaRPr lang="en-GB" dirty="0"/>
+          </a:p>
+        </p:txBody>
+      </p:sp>
+      <p:cxnSp>
+        <p:nvCxnSpPr>
+          <p:cNvPr id="50" name="Straight Arrow Connector 49"/>
+          <p:cNvCxnSpPr>
+            <a:stCxn id="48" idx="2"/>
+            <a:endCxn id="7" idx="0"/>
+          </p:cNvCxnSpPr>
+          <p:nvPr/>
+        </p:nvCxnSpPr>
+        <p:spPr>
+          <a:xfrm>
+            <a:off x="3435350" y="1671082"/>
+            <a:ext cx="2013" cy="246411"/>
+          </a:xfrm>
+          <a:prstGeom prst="straightConnector1">
+            <a:avLst/>
+          </a:prstGeom>
+          <a:ln>
+            <a:tailEnd type="arrow"/>
+          </a:ln>
+        </p:spPr>
+        <p:style>
+          <a:lnRef idx="2">
+            <a:schemeClr val="dk1"/>
+          </a:lnRef>
+          <a:fillRef idx="0">
+            <a:schemeClr val="dk1"/>
+          </a:fillRef>
+          <a:effectRef idx="1">
+            <a:schemeClr val="dk1"/>
+          </a:effectRef>
+          <a:fontRef idx="minor">
+            <a:schemeClr val="tx1"/>
+          </a:fontRef>
+        </p:style>
+      </p:cxnSp>
+      <p:sp>
+        <p:nvSpPr>
+          <p:cNvPr id="51" name="TextBox 50"/>
+          <p:cNvSpPr txBox="1"/>
+          <p:nvPr/>
+        </p:nvSpPr>
+        <p:spPr>
+          <a:xfrm>
+            <a:off x="6083300" y="1917700"/>
+            <a:ext cx="2082800" cy="369332"/>
+          </a:xfrm>
+          <a:prstGeom prst="rect">
+            <a:avLst/>
+          </a:prstGeom>
+          <a:noFill/>
+        </p:spPr>
+        <p:txBody>
+          <a:bodyPr wrap="square" rtlCol="0">
+            <a:spAutoFit/>
+          </a:bodyPr>
+          <a:lstStyle/>
+          <a:p>
+            <a:r>
+              <a:rPr lang="en-GB" dirty="0" smtClean="0"/>
+              <a:t>five ‘1’ bits in data</a:t>
+            </a:r>
+            <a:endParaRPr lang="en-GB" dirty="0"/>
+          </a:p>
+        </p:txBody>
+      </p:sp>
+      <p:sp>
+        <p:nvSpPr>
+          <p:cNvPr id="52" name="TextBox 51"/>
+          <p:cNvSpPr txBox="1"/>
+          <p:nvPr/>
+        </p:nvSpPr>
+        <p:spPr>
+          <a:xfrm>
+            <a:off x="622300" y="2540000"/>
+            <a:ext cx="2438400" cy="646331"/>
+          </a:xfrm>
+          <a:prstGeom prst="rect">
+            <a:avLst/>
+          </a:prstGeom>
+          <a:noFill/>
+        </p:spPr>
+        <p:txBody>
+          <a:bodyPr wrap="square" rtlCol="0">
+            <a:spAutoFit/>
+          </a:bodyPr>
+          <a:lstStyle/>
+          <a:p>
+            <a:r>
+              <a:rPr lang="en-GB" dirty="0" smtClean="0"/>
+              <a:t>odd number of ‘1’s: set parity bit to ‘1’</a:t>
+            </a:r>
+            <a:endParaRPr lang="en-GB" dirty="0"/>
+          </a:p>
+        </p:txBody>
+      </p:sp>
+      <p:cxnSp>
+        <p:nvCxnSpPr>
+          <p:cNvPr id="53" name="Straight Arrow Connector 52"/>
+          <p:cNvCxnSpPr>
+            <a:endCxn id="18" idx="1"/>
+          </p:cNvCxnSpPr>
+          <p:nvPr/>
+        </p:nvCxnSpPr>
+        <p:spPr>
+          <a:xfrm>
+            <a:off x="2565400" y="2895600"/>
+            <a:ext cx="711598" cy="425759"/>
+          </a:xfrm>
+          <a:prstGeom prst="straightConnector1">
+            <a:avLst/>
+          </a:prstGeom>
+          <a:ln>
+            <a:tailEnd type="arrow"/>
+          </a:ln>
+        </p:spPr>
+        <p:style>
+          <a:lnRef idx="2">
+            <a:schemeClr val="dk1"/>
+          </a:lnRef>
+          <a:fillRef idx="0">
+            <a:schemeClr val="dk1"/>
+          </a:fillRef>
+          <a:effectRef idx="1">
+            <a:schemeClr val="dk1"/>
+          </a:effectRef>
+          <a:fontRef idx="minor">
+            <a:schemeClr val="tx1"/>
+          </a:fontRef>
+        </p:style>
+      </p:cxnSp>
+      <p:sp>
+        <p:nvSpPr>
+          <p:cNvPr id="58" name="TextBox 57"/>
+          <p:cNvSpPr txBox="1"/>
+          <p:nvPr/>
+        </p:nvSpPr>
+        <p:spPr>
+          <a:xfrm>
+            <a:off x="5219700" y="4292600"/>
+            <a:ext cx="3467100" cy="369332"/>
+          </a:xfrm>
+          <a:prstGeom prst="rect">
+            <a:avLst/>
+          </a:prstGeom>
+          <a:noFill/>
+        </p:spPr>
+        <p:txBody>
+          <a:bodyPr wrap="square" rtlCol="0">
+            <a:spAutoFit/>
+          </a:bodyPr>
+          <a:lstStyle/>
+          <a:p>
+            <a:r>
+              <a:rPr lang="en-GB" dirty="0" smtClean="0"/>
+              <a:t>corrupted transmission (bit flip)</a:t>
+            </a:r>
+            <a:endParaRPr lang="en-GB" dirty="0"/>
+          </a:p>
+        </p:txBody>
+      </p:sp>
+      <p:sp>
+        <p:nvSpPr>
+          <p:cNvPr id="60" name="TextBox 59"/>
+          <p:cNvSpPr txBox="1"/>
+          <p:nvPr/>
+        </p:nvSpPr>
+        <p:spPr>
+          <a:xfrm>
+            <a:off x="1016000" y="4292600"/>
+            <a:ext cx="2806700" cy="369332"/>
+          </a:xfrm>
+          <a:prstGeom prst="rect">
+            <a:avLst/>
+          </a:prstGeom>
+          <a:noFill/>
+        </p:spPr>
+        <p:txBody>
+          <a:bodyPr wrap="square" rtlCol="0">
+            <a:spAutoFit/>
+          </a:bodyPr>
+          <a:lstStyle/>
+          <a:p>
+            <a:r>
+              <a:rPr lang="en-GB" dirty="0" smtClean="0"/>
+              <a:t>successful transmission</a:t>
+            </a:r>
+            <a:endParaRPr lang="en-GB" dirty="0"/>
+          </a:p>
+        </p:txBody>
+      </p:sp>
+      <p:cxnSp>
+        <p:nvCxnSpPr>
+          <p:cNvPr id="61" name="Straight Arrow Connector 60"/>
+          <p:cNvCxnSpPr>
+            <a:endCxn id="60" idx="0"/>
+          </p:cNvCxnSpPr>
+          <p:nvPr/>
+        </p:nvCxnSpPr>
+        <p:spPr>
+          <a:xfrm flipH="1">
+            <a:off x="2419350" y="3619500"/>
+            <a:ext cx="1873250" cy="673100"/>
+          </a:xfrm>
+          <a:prstGeom prst="straightConnector1">
+            <a:avLst/>
+          </a:prstGeom>
+          <a:ln>
+            <a:tailEnd type="arrow"/>
+          </a:ln>
+        </p:spPr>
+        <p:style>
+          <a:lnRef idx="2">
+            <a:schemeClr val="dk1"/>
+          </a:lnRef>
+          <a:fillRef idx="0">
+            <a:schemeClr val="dk1"/>
+          </a:fillRef>
+          <a:effectRef idx="1">
+            <a:schemeClr val="dk1"/>
+          </a:effectRef>
+          <a:fontRef idx="minor">
+            <a:schemeClr val="tx1"/>
+          </a:fontRef>
+        </p:style>
+      </p:cxnSp>
+      <p:cxnSp>
+        <p:nvCxnSpPr>
+          <p:cNvPr id="64" name="Straight Arrow Connector 63"/>
+          <p:cNvCxnSpPr>
+            <a:endCxn id="58" idx="0"/>
+          </p:cNvCxnSpPr>
+          <p:nvPr/>
+        </p:nvCxnSpPr>
+        <p:spPr>
+          <a:xfrm>
+            <a:off x="4864100" y="3619500"/>
+            <a:ext cx="2089150" cy="673100"/>
+          </a:xfrm>
+          <a:prstGeom prst="straightConnector1">
+            <a:avLst/>
+          </a:prstGeom>
+          <a:ln>
+            <a:tailEnd type="arrow"/>
+          </a:ln>
+        </p:spPr>
+        <p:style>
+          <a:lnRef idx="2">
+            <a:schemeClr val="dk1"/>
+          </a:lnRef>
+          <a:fillRef idx="0">
+            <a:schemeClr val="dk1"/>
+          </a:fillRef>
+          <a:effectRef idx="1">
+            <a:schemeClr val="dk1"/>
+          </a:effectRef>
+          <a:fontRef idx="minor">
+            <a:schemeClr val="tx1"/>
+          </a:fontRef>
+        </p:style>
+      </p:cxnSp>
+      <p:sp>
+        <p:nvSpPr>
+          <p:cNvPr id="74" name="TextBox 73"/>
+          <p:cNvSpPr txBox="1"/>
+          <p:nvPr/>
+        </p:nvSpPr>
+        <p:spPr>
+          <a:xfrm>
+            <a:off x="914400" y="5295900"/>
+            <a:ext cx="3035300" cy="646331"/>
+          </a:xfrm>
+          <a:prstGeom prst="rect">
+            <a:avLst/>
+          </a:prstGeom>
+          <a:noFill/>
+        </p:spPr>
+        <p:txBody>
+          <a:bodyPr wrap="square" rtlCol="0">
+            <a:spAutoFit/>
+          </a:bodyPr>
+          <a:lstStyle/>
+          <a:p>
+            <a:r>
+              <a:rPr lang="en-GB" b="1" dirty="0" smtClean="0">
+                <a:solidFill>
+                  <a:srgbClr val="008000"/>
+                </a:solidFill>
+              </a:rPr>
+              <a:t>even</a:t>
+            </a:r>
+            <a:r>
+              <a:rPr lang="en-GB" dirty="0" smtClean="0"/>
+              <a:t> number of ‘1’ bits (six) </a:t>
+            </a:r>
+            <a:r>
+              <a:rPr lang="en-GB" b="1" dirty="0" smtClean="0">
+                <a:solidFill>
+                  <a:srgbClr val="008000"/>
+                </a:solidFill>
+              </a:rPr>
+              <a:t>data is valid</a:t>
+            </a:r>
+            <a:endParaRPr lang="en-GB" b="1" dirty="0">
+              <a:solidFill>
+                <a:srgbClr val="008000"/>
+              </a:solidFill>
+            </a:endParaRPr>
+          </a:p>
+        </p:txBody>
+      </p:sp>
+      <p:sp>
+        <p:nvSpPr>
+          <p:cNvPr id="77" name="TextBox 76"/>
+          <p:cNvSpPr txBox="1"/>
+          <p:nvPr/>
+        </p:nvSpPr>
+        <p:spPr>
+          <a:xfrm>
+            <a:off x="5499100" y="5295900"/>
+            <a:ext cx="2984500" cy="646331"/>
+          </a:xfrm>
+          <a:prstGeom prst="rect">
+            <a:avLst/>
+          </a:prstGeom>
+          <a:noFill/>
+        </p:spPr>
+        <p:txBody>
+          <a:bodyPr wrap="square" rtlCol="0">
+            <a:spAutoFit/>
+          </a:bodyPr>
+          <a:lstStyle/>
+          <a:p>
+            <a:r>
+              <a:rPr lang="en-GB" b="1" dirty="0" smtClean="0">
+                <a:solidFill>
+                  <a:srgbClr val="FF0000"/>
+                </a:solidFill>
+              </a:rPr>
+              <a:t>odd</a:t>
+            </a:r>
+            <a:r>
+              <a:rPr lang="en-GB" dirty="0" smtClean="0"/>
+              <a:t> number of ‘1’ bits (five) </a:t>
+            </a:r>
+            <a:r>
+              <a:rPr lang="en-GB" b="1" dirty="0" smtClean="0">
+                <a:solidFill>
+                  <a:srgbClr val="FF0000"/>
+                </a:solidFill>
+              </a:rPr>
+              <a:t>data is invalid</a:t>
+            </a:r>
+            <a:endParaRPr lang="en-GB" b="1" dirty="0">
+              <a:solidFill>
+                <a:srgbClr val="FF0000"/>
+              </a:solidFill>
+            </a:endParaRPr>
+          </a:p>
+        </p:txBody>
+      </p:sp>
+      <p:cxnSp>
+        <p:nvCxnSpPr>
+          <p:cNvPr id="78" name="Straight Arrow Connector 77"/>
+          <p:cNvCxnSpPr/>
+          <p:nvPr/>
+        </p:nvCxnSpPr>
+        <p:spPr>
+          <a:xfrm>
+            <a:off x="4572000" y="2387600"/>
+            <a:ext cx="6350" cy="666750"/>
+          </a:xfrm>
+          <a:prstGeom prst="straightConnector1">
+            <a:avLst/>
+          </a:prstGeom>
+          <a:ln>
+            <a:tailEnd type="arrow"/>
+          </a:ln>
+        </p:spPr>
+        <p:style>
+          <a:lnRef idx="2">
+            <a:schemeClr val="dk1"/>
+          </a:lnRef>
+          <a:fillRef idx="0">
+            <a:schemeClr val="dk1"/>
+          </a:fillRef>
+          <a:effectRef idx="1">
+            <a:schemeClr val="dk1"/>
+          </a:effectRef>
+          <a:fontRef idx="minor">
+            <a:schemeClr val="tx1"/>
+          </a:fontRef>
+        </p:style>
+      </p:cxnSp>
     </p:spTree>
     <p:extLst>
       <p:ext uri="{BB962C8B-B14F-4D97-AF65-F5344CB8AC3E}">
-        <p14:creationId xmlns:p14="http://schemas.microsoft.com/office/powerpoint/2010/main" val="3370687389"/>
+        <p14:creationId xmlns:p14="http://schemas.microsoft.com/office/powerpoint/2010/main" val="1658612048"/>
       </p:ext>
     </p:extLst>
   </p:cSld>
@@ -10360,6 +12630,2454 @@
     <p:extLst>
       <p:ext uri="{BB962C8B-B14F-4D97-AF65-F5344CB8AC3E}">
         <p14:creationId xmlns:p14="http://schemas.microsoft.com/office/powerpoint/2010/main" val="1135038595"/>
+      </p:ext>
+    </p:extLst>
+  </p:cSld>
+  <p:clrMapOvr>
+    <a:masterClrMapping/>
+  </p:clrMapOvr>
+  <mc:AlternateContent xmlns:mc="http://schemas.openxmlformats.org/markup-compatibility/2006" xmlns:p14="http://schemas.microsoft.com/office/powerpoint/2010/main">
+    <mc:Choice Requires="p14">
+      <p:transition spd="slow" p14:dur="2000"/>
+    </mc:Choice>
+    <mc:Fallback xmlns="">
+      <p:transition xmlns:p14="http://schemas.microsoft.com/office/powerpoint/2010/main" spd="slow"/>
+    </mc:Fallback>
+  </mc:AlternateContent>
+</p:sld>
+</file>
+
+<file path=ppt/slides/slide20.xml><?xml version="1.0" encoding="utf-8"?>
+<p:sld xmlns:a="http://schemas.openxmlformats.org/drawingml/2006/main" xmlns:r="http://schemas.openxmlformats.org/officeDocument/2006/relationships" xmlns:p="http://schemas.openxmlformats.org/presentationml/2006/main">
+  <p:cSld>
+    <p:spTree>
+      <p:nvGrpSpPr>
+        <p:cNvPr id="1" name=""/>
+        <p:cNvGrpSpPr/>
+        <p:nvPr/>
+      </p:nvGrpSpPr>
+      <p:grpSpPr>
+        <a:xfrm>
+          <a:off x="0" y="0"/>
+          <a:ext cx="0" cy="0"/>
+          <a:chOff x="0" y="0"/>
+          <a:chExt cx="0" cy="0"/>
+        </a:xfrm>
+      </p:grpSpPr>
+      <p:sp>
+        <p:nvSpPr>
+          <p:cNvPr id="2" name="Title 1"/>
+          <p:cNvSpPr>
+            <a:spLocks noGrp="1"/>
+          </p:cNvSpPr>
+          <p:nvPr>
+            <p:ph type="title"/>
+          </p:nvPr>
+        </p:nvSpPr>
+        <p:spPr/>
+        <p:txBody>
+          <a:bodyPr/>
+          <a:lstStyle/>
+          <a:p>
+            <a:r>
+              <a:rPr lang="en-GB" dirty="0" smtClean="0"/>
+              <a:t>Parity bit - implementation</a:t>
+            </a:r>
+            <a:endParaRPr lang="en-GB" dirty="0"/>
+          </a:p>
+        </p:txBody>
+      </p:sp>
+      <p:sp>
+        <p:nvSpPr>
+          <p:cNvPr id="3" name="Content Placeholder 2"/>
+          <p:cNvSpPr>
+            <a:spLocks noGrp="1"/>
+          </p:cNvSpPr>
+          <p:nvPr>
+            <p:ph idx="1"/>
+          </p:nvPr>
+        </p:nvSpPr>
+        <p:spPr/>
+        <p:txBody>
+          <a:bodyPr/>
+          <a:lstStyle/>
+          <a:p>
+            <a:r>
+              <a:rPr lang="en-GB" dirty="0" smtClean="0"/>
+              <a:t>Simple to implement with bitwise operations</a:t>
+            </a:r>
+          </a:p>
+          <a:p>
+            <a:pPr lvl="1">
+              <a:spcBef>
+                <a:spcPts val="1872"/>
+              </a:spcBef>
+            </a:pPr>
+            <a:r>
+              <a:rPr lang="en-GB" dirty="0" smtClean="0"/>
+              <a:t>Mostly </a:t>
+            </a:r>
+            <a:r>
+              <a:rPr lang="en-GB" b="1" dirty="0" smtClean="0">
+                <a:solidFill>
+                  <a:srgbClr val="3366FF"/>
+                </a:solidFill>
+              </a:rPr>
+              <a:t>XOR</a:t>
+            </a:r>
+            <a:r>
+              <a:rPr lang="en-GB" dirty="0" smtClean="0"/>
+              <a:t> (</a:t>
+            </a:r>
+            <a:r>
+              <a:rPr lang="en-GB" dirty="0" smtClean="0">
+                <a:latin typeface="Courier New"/>
+                <a:cs typeface="Courier New"/>
+              </a:rPr>
+              <a:t>^</a:t>
+            </a:r>
+            <a:r>
+              <a:rPr lang="en-GB" dirty="0" smtClean="0"/>
+              <a:t> operator in C)</a:t>
+            </a:r>
+          </a:p>
+          <a:p>
+            <a:pPr>
+              <a:spcBef>
+                <a:spcPts val="1968"/>
+              </a:spcBef>
+            </a:pPr>
+            <a:r>
+              <a:rPr lang="en-GB" dirty="0" smtClean="0"/>
+              <a:t>Some processors may have native hardware support for computing parity efficiently</a:t>
+            </a:r>
+          </a:p>
+          <a:p>
+            <a:r>
+              <a:rPr lang="en-GB" dirty="0" smtClean="0"/>
+              <a:t>Several compilers (</a:t>
+            </a:r>
+            <a:r>
+              <a:rPr lang="en-GB" dirty="0" err="1" smtClean="0"/>
+              <a:t>gcc</a:t>
+            </a:r>
+            <a:r>
+              <a:rPr lang="en-GB" dirty="0" smtClean="0"/>
+              <a:t>, clang, </a:t>
+            </a:r>
+            <a:r>
+              <a:rPr lang="en-GB" dirty="0" err="1" smtClean="0"/>
+              <a:t>icc</a:t>
+            </a:r>
+            <a:r>
+              <a:rPr lang="en-GB" dirty="0" smtClean="0"/>
+              <a:t>) support </a:t>
+            </a:r>
+            <a:r>
+              <a:rPr lang="en-GB" dirty="0" err="1" smtClean="0"/>
+              <a:t>intrinsics</a:t>
+            </a:r>
+            <a:r>
+              <a:rPr lang="en-GB" dirty="0" smtClean="0"/>
+              <a:t> to handle this</a:t>
+            </a:r>
+          </a:p>
+        </p:txBody>
+      </p:sp>
+      <p:sp>
+        <p:nvSpPr>
+          <p:cNvPr id="4" name="Slide Number Placeholder 3"/>
+          <p:cNvSpPr>
+            <a:spLocks noGrp="1"/>
+          </p:cNvSpPr>
+          <p:nvPr>
+            <p:ph type="sldNum" sz="quarter" idx="10"/>
+          </p:nvPr>
+        </p:nvSpPr>
+        <p:spPr/>
+        <p:txBody>
+          <a:bodyPr/>
+          <a:lstStyle/>
+          <a:p>
+            <a:fld id="{D9B8CB04-7B95-2844-BD15-B133C35E4786}" type="slidenum">
+              <a:rPr lang="en-GB" smtClean="0"/>
+              <a:pPr/>
+              <a:t>20</a:t>
+            </a:fld>
+            <a:endParaRPr lang="en-GB"/>
+          </a:p>
+        </p:txBody>
+      </p:sp>
+      <p:sp>
+        <p:nvSpPr>
+          <p:cNvPr id="5" name="Footer Placeholder 4"/>
+          <p:cNvSpPr>
+            <a:spLocks noGrp="1"/>
+          </p:cNvSpPr>
+          <p:nvPr>
+            <p:ph type="ftr" sz="quarter" idx="3"/>
+          </p:nvPr>
+        </p:nvSpPr>
+        <p:spPr/>
+        <p:txBody>
+          <a:bodyPr/>
+          <a:lstStyle/>
+          <a:p>
+            <a:r>
+              <a:rPr lang="en-US" smtClean="0"/>
+              <a:t>© Simon McIntosh-Smith</a:t>
+            </a:r>
+            <a:endParaRPr lang="en-US"/>
+          </a:p>
+        </p:txBody>
+      </p:sp>
+    </p:spTree>
+    <p:extLst>
+      <p:ext uri="{BB962C8B-B14F-4D97-AF65-F5344CB8AC3E}">
+        <p14:creationId xmlns:p14="http://schemas.microsoft.com/office/powerpoint/2010/main" val="1739650430"/>
+      </p:ext>
+    </p:extLst>
+  </p:cSld>
+  <p:clrMapOvr>
+    <a:masterClrMapping/>
+  </p:clrMapOvr>
+  <mc:AlternateContent xmlns:mc="http://schemas.openxmlformats.org/markup-compatibility/2006" xmlns:p14="http://schemas.microsoft.com/office/powerpoint/2010/main">
+    <mc:Choice Requires="p14">
+      <p:transition spd="slow" p14:dur="2000"/>
+    </mc:Choice>
+    <mc:Fallback xmlns="">
+      <p:transition xmlns:p14="http://schemas.microsoft.com/office/powerpoint/2010/main" spd="slow"/>
+    </mc:Fallback>
+  </mc:AlternateContent>
+</p:sld>
+</file>
+
+<file path=ppt/slides/slide21.xml><?xml version="1.0" encoding="utf-8"?>
+<p:sld xmlns:a="http://schemas.openxmlformats.org/drawingml/2006/main" xmlns:r="http://schemas.openxmlformats.org/officeDocument/2006/relationships" xmlns:p="http://schemas.openxmlformats.org/presentationml/2006/main">
+  <p:cSld>
+    <p:spTree>
+      <p:nvGrpSpPr>
+        <p:cNvPr id="1" name=""/>
+        <p:cNvGrpSpPr/>
+        <p:nvPr/>
+      </p:nvGrpSpPr>
+      <p:grpSpPr>
+        <a:xfrm>
+          <a:off x="0" y="0"/>
+          <a:ext cx="0" cy="0"/>
+          <a:chOff x="0" y="0"/>
+          <a:chExt cx="0" cy="0"/>
+        </a:xfrm>
+      </p:grpSpPr>
+      <p:sp>
+        <p:nvSpPr>
+          <p:cNvPr id="2" name="Title 1"/>
+          <p:cNvSpPr>
+            <a:spLocks noGrp="1"/>
+          </p:cNvSpPr>
+          <p:nvPr>
+            <p:ph type="title"/>
+          </p:nvPr>
+        </p:nvSpPr>
+        <p:spPr/>
+        <p:txBody>
+          <a:bodyPr/>
+          <a:lstStyle/>
+          <a:p>
+            <a:r>
+              <a:rPr lang="en-GB" dirty="0" smtClean="0"/>
+              <a:t>Parity bit - implementation</a:t>
+            </a:r>
+            <a:endParaRPr lang="en-GB" dirty="0"/>
+          </a:p>
+        </p:txBody>
+      </p:sp>
+      <p:sp>
+        <p:nvSpPr>
+          <p:cNvPr id="3" name="Content Placeholder 2"/>
+          <p:cNvSpPr>
+            <a:spLocks noGrp="1"/>
+          </p:cNvSpPr>
+          <p:nvPr>
+            <p:ph idx="1"/>
+          </p:nvPr>
+        </p:nvSpPr>
+        <p:spPr/>
+        <p:txBody>
+          <a:bodyPr/>
+          <a:lstStyle/>
+          <a:p>
+            <a:pPr marL="0" indent="0">
+              <a:buNone/>
+            </a:pPr>
+            <a:r>
+              <a:rPr lang="en-GB" sz="2000" b="1" i="1" dirty="0" smtClean="0">
+                <a:solidFill>
+                  <a:srgbClr val="3366FF"/>
+                </a:solidFill>
+                <a:latin typeface="Courier New"/>
+                <a:cs typeface="Courier New"/>
+              </a:rPr>
+              <a:t>uint32_t</a:t>
+            </a:r>
+            <a:r>
+              <a:rPr lang="en-GB" sz="2000" b="1" dirty="0" smtClean="0">
+                <a:latin typeface="Courier New"/>
+                <a:cs typeface="Courier New"/>
+              </a:rPr>
+              <a:t> data[</a:t>
+            </a:r>
+            <a:r>
+              <a:rPr lang="en-GB" sz="2000" b="1" dirty="0" smtClean="0">
+                <a:solidFill>
+                  <a:srgbClr val="6117C1"/>
+                </a:solidFill>
+                <a:latin typeface="Courier New"/>
+                <a:cs typeface="Courier New"/>
+              </a:rPr>
+              <a:t>4</a:t>
+            </a:r>
+            <a:r>
+              <a:rPr lang="en-GB" sz="2000" b="1" dirty="0" smtClean="0">
+                <a:latin typeface="Courier New"/>
+                <a:cs typeface="Courier New"/>
+              </a:rPr>
+              <a:t>]; </a:t>
+            </a:r>
+            <a:r>
+              <a:rPr lang="en-GB" sz="2000" b="1" dirty="0" smtClean="0">
+                <a:solidFill>
+                  <a:srgbClr val="008000"/>
+                </a:solidFill>
+                <a:latin typeface="Courier New"/>
+                <a:cs typeface="Courier New"/>
+              </a:rPr>
+              <a:t>// 128 bits of data</a:t>
+            </a:r>
+          </a:p>
+          <a:p>
+            <a:pPr marL="0" indent="0">
+              <a:buNone/>
+            </a:pPr>
+            <a:endParaRPr lang="en-GB" sz="2000" b="1" dirty="0">
+              <a:latin typeface="Courier New"/>
+              <a:cs typeface="Courier New"/>
+            </a:endParaRPr>
+          </a:p>
+          <a:p>
+            <a:pPr marL="0" indent="0">
+              <a:buNone/>
+            </a:pPr>
+            <a:r>
+              <a:rPr lang="en-GB" sz="2000" b="1" i="1" dirty="0" smtClean="0">
+                <a:solidFill>
+                  <a:srgbClr val="3366FF"/>
+                </a:solidFill>
+                <a:latin typeface="Courier New"/>
+                <a:cs typeface="Courier New"/>
+              </a:rPr>
+              <a:t>uint32_t</a:t>
+            </a:r>
+            <a:r>
+              <a:rPr lang="en-GB" sz="2000" b="1" dirty="0" smtClean="0">
+                <a:latin typeface="Courier New"/>
+                <a:cs typeface="Courier New"/>
+              </a:rPr>
+              <a:t> p = data[</a:t>
+            </a:r>
+            <a:r>
+              <a:rPr lang="en-GB" sz="2000" b="1" dirty="0" smtClean="0">
+                <a:solidFill>
+                  <a:srgbClr val="6117C1"/>
+                </a:solidFill>
+                <a:latin typeface="Courier New"/>
+                <a:cs typeface="Courier New"/>
+              </a:rPr>
+              <a:t>0</a:t>
+            </a:r>
+            <a:r>
+              <a:rPr lang="en-GB" sz="2000" b="1" dirty="0" smtClean="0">
+                <a:latin typeface="Courier New"/>
+                <a:cs typeface="Courier New"/>
+              </a:rPr>
+              <a:t>] ^ data[</a:t>
+            </a:r>
+            <a:r>
+              <a:rPr lang="en-GB" sz="2000" b="1" dirty="0" smtClean="0">
+                <a:solidFill>
+                  <a:srgbClr val="6117C1"/>
+                </a:solidFill>
+                <a:latin typeface="Courier New"/>
+                <a:cs typeface="Courier New"/>
+              </a:rPr>
+              <a:t>1</a:t>
+            </a:r>
+            <a:r>
+              <a:rPr lang="en-GB" sz="2000" b="1" dirty="0" smtClean="0">
+                <a:latin typeface="Courier New"/>
+                <a:cs typeface="Courier New"/>
+              </a:rPr>
+              <a:t>] ^ data[</a:t>
+            </a:r>
+            <a:r>
+              <a:rPr lang="en-GB" sz="2000" b="1" dirty="0" smtClean="0">
+                <a:solidFill>
+                  <a:srgbClr val="6117C1"/>
+                </a:solidFill>
+                <a:latin typeface="Courier New"/>
+                <a:cs typeface="Courier New"/>
+              </a:rPr>
+              <a:t>2</a:t>
+            </a:r>
+            <a:r>
+              <a:rPr lang="en-GB" sz="2000" b="1" dirty="0" smtClean="0">
+                <a:latin typeface="Courier New"/>
+                <a:cs typeface="Courier New"/>
+              </a:rPr>
+              <a:t>] ^ data[</a:t>
+            </a:r>
+            <a:r>
+              <a:rPr lang="en-GB" sz="2000" b="1" dirty="0" smtClean="0">
+                <a:solidFill>
+                  <a:srgbClr val="6117C1"/>
+                </a:solidFill>
+                <a:latin typeface="Courier New"/>
+                <a:cs typeface="Courier New"/>
+              </a:rPr>
+              <a:t>3</a:t>
+            </a:r>
+            <a:r>
+              <a:rPr lang="en-GB" sz="2000" b="1" dirty="0" smtClean="0">
+                <a:latin typeface="Courier New"/>
+                <a:cs typeface="Courier New"/>
+              </a:rPr>
+              <a:t>]</a:t>
+            </a:r>
+          </a:p>
+          <a:p>
+            <a:pPr marL="0" indent="0">
+              <a:buNone/>
+            </a:pPr>
+            <a:r>
+              <a:rPr lang="fr-FR" sz="2000" b="1" dirty="0">
+                <a:latin typeface="Courier New"/>
+                <a:cs typeface="Courier New"/>
+              </a:rPr>
+              <a:t>p</a:t>
+            </a:r>
+            <a:r>
+              <a:rPr lang="fr-FR" sz="2000" b="1" dirty="0" smtClean="0">
+                <a:latin typeface="Courier New"/>
+                <a:cs typeface="Courier New"/>
+              </a:rPr>
+              <a:t> </a:t>
+            </a:r>
+            <a:r>
+              <a:rPr lang="fr-FR" sz="2000" b="1" dirty="0">
+                <a:latin typeface="Courier New"/>
+                <a:cs typeface="Courier New"/>
+              </a:rPr>
+              <a:t>^= </a:t>
+            </a:r>
+            <a:r>
+              <a:rPr lang="fr-FR" sz="2000" b="1" dirty="0" smtClean="0">
+                <a:latin typeface="Courier New"/>
+                <a:cs typeface="Courier New"/>
+              </a:rPr>
+              <a:t>p </a:t>
+            </a:r>
+            <a:r>
+              <a:rPr lang="fr-FR" sz="2000" b="1" dirty="0">
+                <a:latin typeface="Courier New"/>
+                <a:cs typeface="Courier New"/>
+              </a:rPr>
+              <a:t>&gt;&gt; </a:t>
+            </a:r>
+            <a:r>
+              <a:rPr lang="fr-FR" sz="2000" b="1" dirty="0">
+                <a:solidFill>
+                  <a:srgbClr val="6117C1"/>
+                </a:solidFill>
+                <a:latin typeface="Courier New"/>
+                <a:cs typeface="Courier New"/>
+              </a:rPr>
+              <a:t>16</a:t>
+            </a:r>
+            <a:r>
+              <a:rPr lang="fr-FR" sz="2000" b="1" dirty="0">
+                <a:latin typeface="Courier New"/>
+                <a:cs typeface="Courier New"/>
+              </a:rPr>
+              <a:t>;</a:t>
+            </a:r>
+          </a:p>
+          <a:p>
+            <a:pPr marL="0" indent="0">
+              <a:buNone/>
+            </a:pPr>
+            <a:r>
+              <a:rPr lang="fr-FR" sz="2000" b="1" dirty="0">
+                <a:latin typeface="Courier New"/>
+                <a:cs typeface="Courier New"/>
+              </a:rPr>
+              <a:t>p</a:t>
+            </a:r>
+            <a:r>
+              <a:rPr lang="fr-FR" sz="2000" b="1" dirty="0" smtClean="0">
+                <a:latin typeface="Courier New"/>
+                <a:cs typeface="Courier New"/>
+              </a:rPr>
+              <a:t> </a:t>
+            </a:r>
+            <a:r>
+              <a:rPr lang="fr-FR" sz="2000" b="1" dirty="0">
+                <a:latin typeface="Courier New"/>
+                <a:cs typeface="Courier New"/>
+              </a:rPr>
+              <a:t>^= </a:t>
+            </a:r>
+            <a:r>
+              <a:rPr lang="fr-FR" sz="2000" b="1" dirty="0" smtClean="0">
+                <a:latin typeface="Courier New"/>
+                <a:cs typeface="Courier New"/>
+              </a:rPr>
+              <a:t>p </a:t>
+            </a:r>
+            <a:r>
+              <a:rPr lang="fr-FR" sz="2000" b="1" dirty="0">
+                <a:latin typeface="Courier New"/>
+                <a:cs typeface="Courier New"/>
+              </a:rPr>
+              <a:t>&gt;&gt; </a:t>
+            </a:r>
+            <a:r>
+              <a:rPr lang="fr-FR" sz="2000" b="1" dirty="0">
+                <a:solidFill>
+                  <a:srgbClr val="6117C1"/>
+                </a:solidFill>
+                <a:latin typeface="Courier New"/>
+                <a:cs typeface="Courier New"/>
+              </a:rPr>
+              <a:t>8</a:t>
+            </a:r>
+            <a:r>
+              <a:rPr lang="fr-FR" sz="2000" b="1" dirty="0">
+                <a:latin typeface="Courier New"/>
+                <a:cs typeface="Courier New"/>
+              </a:rPr>
+              <a:t>;</a:t>
+            </a:r>
+          </a:p>
+          <a:p>
+            <a:pPr marL="0" indent="0">
+              <a:buNone/>
+            </a:pPr>
+            <a:r>
+              <a:rPr lang="fr-FR" sz="2000" b="1" dirty="0">
+                <a:latin typeface="Courier New"/>
+                <a:cs typeface="Courier New"/>
+              </a:rPr>
+              <a:t>p</a:t>
+            </a:r>
+            <a:r>
+              <a:rPr lang="fr-FR" sz="2000" b="1" dirty="0" smtClean="0">
+                <a:latin typeface="Courier New"/>
+                <a:cs typeface="Courier New"/>
+              </a:rPr>
+              <a:t> </a:t>
+            </a:r>
+            <a:r>
+              <a:rPr lang="fr-FR" sz="2000" b="1" dirty="0">
+                <a:latin typeface="Courier New"/>
+                <a:cs typeface="Courier New"/>
+              </a:rPr>
+              <a:t>^= </a:t>
+            </a:r>
+            <a:r>
+              <a:rPr lang="fr-FR" sz="2000" b="1" dirty="0" smtClean="0">
+                <a:latin typeface="Courier New"/>
+                <a:cs typeface="Courier New"/>
+              </a:rPr>
+              <a:t>p </a:t>
+            </a:r>
+            <a:r>
+              <a:rPr lang="fr-FR" sz="2000" b="1" dirty="0">
+                <a:latin typeface="Courier New"/>
+                <a:cs typeface="Courier New"/>
+              </a:rPr>
+              <a:t>&gt;&gt; </a:t>
+            </a:r>
+            <a:r>
+              <a:rPr lang="fr-FR" sz="2000" b="1" dirty="0">
+                <a:solidFill>
+                  <a:srgbClr val="6117C1"/>
+                </a:solidFill>
+                <a:latin typeface="Courier New"/>
+                <a:cs typeface="Courier New"/>
+              </a:rPr>
+              <a:t>4</a:t>
+            </a:r>
+            <a:r>
+              <a:rPr lang="fr-FR" sz="2000" b="1" dirty="0">
+                <a:latin typeface="Courier New"/>
+                <a:cs typeface="Courier New"/>
+              </a:rPr>
+              <a:t>;</a:t>
+            </a:r>
+          </a:p>
+          <a:p>
+            <a:pPr marL="0" indent="0">
+              <a:buNone/>
+            </a:pPr>
+            <a:r>
+              <a:rPr lang="en-US" sz="2000" b="1" dirty="0">
+                <a:latin typeface="Courier New"/>
+                <a:cs typeface="Courier New"/>
+              </a:rPr>
+              <a:t>p</a:t>
+            </a:r>
+            <a:r>
+              <a:rPr lang="en-US" sz="2000" b="1" dirty="0" smtClean="0">
+                <a:latin typeface="Courier New"/>
+                <a:cs typeface="Courier New"/>
+              </a:rPr>
+              <a:t> </a:t>
+            </a:r>
+            <a:r>
+              <a:rPr lang="en-US" sz="2000" b="1" dirty="0">
+                <a:latin typeface="Courier New"/>
+                <a:cs typeface="Courier New"/>
+              </a:rPr>
+              <a:t>^= </a:t>
+            </a:r>
+            <a:r>
+              <a:rPr lang="en-US" sz="2000" b="1" dirty="0" smtClean="0">
+                <a:latin typeface="Courier New"/>
+                <a:cs typeface="Courier New"/>
+              </a:rPr>
+              <a:t>p </a:t>
+            </a:r>
+            <a:r>
+              <a:rPr lang="en-US" sz="2000" b="1" dirty="0">
+                <a:latin typeface="Courier New"/>
+                <a:cs typeface="Courier New"/>
+              </a:rPr>
+              <a:t>&gt;&gt; </a:t>
+            </a:r>
+            <a:r>
+              <a:rPr lang="en-US" sz="2000" b="1" dirty="0">
+                <a:solidFill>
+                  <a:srgbClr val="6117C1"/>
+                </a:solidFill>
+                <a:latin typeface="Courier New"/>
+                <a:cs typeface="Courier New"/>
+              </a:rPr>
+              <a:t>2</a:t>
+            </a:r>
+            <a:r>
+              <a:rPr lang="en-US" sz="2000" b="1" dirty="0">
+                <a:latin typeface="Courier New"/>
+                <a:cs typeface="Courier New"/>
+              </a:rPr>
+              <a:t>;</a:t>
+            </a:r>
+          </a:p>
+          <a:p>
+            <a:pPr marL="0" indent="0">
+              <a:buNone/>
+            </a:pPr>
+            <a:r>
+              <a:rPr lang="fr-FR" sz="2000" b="1" dirty="0">
+                <a:latin typeface="Courier New"/>
+                <a:cs typeface="Courier New"/>
+              </a:rPr>
+              <a:t>p</a:t>
+            </a:r>
+            <a:r>
+              <a:rPr lang="fr-FR" sz="2000" b="1" dirty="0" smtClean="0">
+                <a:latin typeface="Courier New"/>
+                <a:cs typeface="Courier New"/>
+              </a:rPr>
+              <a:t> </a:t>
+            </a:r>
+            <a:r>
+              <a:rPr lang="fr-FR" sz="2000" b="1" dirty="0">
+                <a:latin typeface="Courier New"/>
+                <a:cs typeface="Courier New"/>
+              </a:rPr>
+              <a:t>^= </a:t>
+            </a:r>
+            <a:r>
+              <a:rPr lang="fr-FR" sz="2000" b="1" dirty="0" smtClean="0">
+                <a:latin typeface="Courier New"/>
+                <a:cs typeface="Courier New"/>
+              </a:rPr>
+              <a:t>p </a:t>
+            </a:r>
+            <a:r>
+              <a:rPr lang="fr-FR" sz="2000" b="1" dirty="0">
+                <a:latin typeface="Courier New"/>
+                <a:cs typeface="Courier New"/>
+              </a:rPr>
+              <a:t>&gt;&gt; </a:t>
+            </a:r>
+            <a:r>
+              <a:rPr lang="fr-FR" sz="2000" b="1" dirty="0">
+                <a:solidFill>
+                  <a:srgbClr val="6117C1"/>
+                </a:solidFill>
+                <a:latin typeface="Courier New"/>
+                <a:cs typeface="Courier New"/>
+              </a:rPr>
+              <a:t>1</a:t>
+            </a:r>
+            <a:r>
+              <a:rPr lang="fr-FR" sz="2000" b="1" dirty="0" smtClean="0">
+                <a:latin typeface="Courier New"/>
+                <a:cs typeface="Courier New"/>
+              </a:rPr>
+              <a:t>;</a:t>
+            </a:r>
+            <a:endParaRPr lang="fr-FR" sz="2000" b="1" dirty="0">
+              <a:latin typeface="Courier New"/>
+              <a:cs typeface="Courier New"/>
+            </a:endParaRPr>
+          </a:p>
+          <a:p>
+            <a:pPr marL="0" indent="0">
+              <a:buNone/>
+            </a:pPr>
+            <a:endParaRPr lang="fr-FR" sz="2000" b="1" dirty="0" smtClean="0">
+              <a:latin typeface="Courier New"/>
+              <a:cs typeface="Courier New"/>
+            </a:endParaRPr>
+          </a:p>
+          <a:p>
+            <a:pPr marL="0" indent="0">
+              <a:buNone/>
+            </a:pPr>
+            <a:r>
+              <a:rPr lang="fr-FR" sz="2000" b="1" dirty="0" smtClean="0">
+                <a:solidFill>
+                  <a:srgbClr val="008000"/>
+                </a:solidFill>
+                <a:latin typeface="Courier New"/>
+                <a:cs typeface="Courier New"/>
+              </a:rPr>
+              <a:t>// p </a:t>
+            </a:r>
+            <a:r>
+              <a:rPr lang="fr-FR" sz="2000" b="1" dirty="0" err="1" smtClean="0">
+                <a:solidFill>
+                  <a:srgbClr val="008000"/>
+                </a:solidFill>
+                <a:latin typeface="Courier New"/>
+                <a:cs typeface="Courier New"/>
+              </a:rPr>
+              <a:t>is</a:t>
+            </a:r>
+            <a:r>
+              <a:rPr lang="fr-FR" sz="2000" b="1" dirty="0" smtClean="0">
+                <a:solidFill>
+                  <a:srgbClr val="008000"/>
+                </a:solidFill>
+                <a:latin typeface="Courier New"/>
+                <a:cs typeface="Courier New"/>
+              </a:rPr>
+              <a:t> </a:t>
+            </a:r>
+            <a:r>
+              <a:rPr lang="fr-FR" sz="2000" b="1" dirty="0" err="1" smtClean="0">
+                <a:solidFill>
+                  <a:srgbClr val="008000"/>
+                </a:solidFill>
+                <a:latin typeface="Courier New"/>
+                <a:cs typeface="Courier New"/>
+              </a:rPr>
+              <a:t>now</a:t>
+            </a:r>
+            <a:r>
+              <a:rPr lang="fr-FR" sz="2000" b="1" dirty="0" smtClean="0">
+                <a:solidFill>
+                  <a:srgbClr val="008000"/>
+                </a:solidFill>
+                <a:latin typeface="Courier New"/>
+                <a:cs typeface="Courier New"/>
+              </a:rPr>
+              <a:t> ‘1’ or ‘0’, </a:t>
+            </a:r>
+            <a:r>
+              <a:rPr lang="fr-FR" sz="2000" b="1" dirty="0" err="1" smtClean="0">
+                <a:solidFill>
+                  <a:srgbClr val="008000"/>
+                </a:solidFill>
+                <a:latin typeface="Courier New"/>
+                <a:cs typeface="Courier New"/>
+              </a:rPr>
+              <a:t>corresponding</a:t>
+            </a:r>
+            <a:r>
+              <a:rPr lang="fr-FR" sz="2000" b="1" dirty="0" smtClean="0">
+                <a:solidFill>
+                  <a:srgbClr val="008000"/>
+                </a:solidFill>
+                <a:latin typeface="Courier New"/>
+                <a:cs typeface="Courier New"/>
+              </a:rPr>
+              <a:t> to data </a:t>
+            </a:r>
+            <a:r>
+              <a:rPr lang="fr-FR" sz="2000" b="1" dirty="0" err="1" smtClean="0">
+                <a:solidFill>
+                  <a:srgbClr val="008000"/>
+                </a:solidFill>
+                <a:latin typeface="Courier New"/>
+                <a:cs typeface="Courier New"/>
+              </a:rPr>
+              <a:t>having</a:t>
+            </a:r>
+            <a:endParaRPr lang="fr-FR" sz="2000" b="1" dirty="0" smtClean="0">
+              <a:solidFill>
+                <a:srgbClr val="008000"/>
+              </a:solidFill>
+              <a:latin typeface="Courier New"/>
+              <a:cs typeface="Courier New"/>
+            </a:endParaRPr>
+          </a:p>
+          <a:p>
+            <a:pPr marL="0" indent="0">
+              <a:buNone/>
+            </a:pPr>
+            <a:r>
+              <a:rPr lang="fr-FR" sz="2000" b="1" dirty="0" smtClean="0">
+                <a:solidFill>
+                  <a:srgbClr val="008000"/>
+                </a:solidFill>
+                <a:latin typeface="Courier New"/>
+                <a:cs typeface="Courier New"/>
+              </a:rPr>
+              <a:t>// an </a:t>
+            </a:r>
+            <a:r>
+              <a:rPr lang="fr-FR" sz="2000" b="1" dirty="0" err="1" smtClean="0">
+                <a:solidFill>
+                  <a:srgbClr val="008000"/>
+                </a:solidFill>
+                <a:latin typeface="Courier New"/>
+                <a:cs typeface="Courier New"/>
+              </a:rPr>
+              <a:t>odd</a:t>
+            </a:r>
+            <a:r>
+              <a:rPr lang="fr-FR" sz="2000" b="1" dirty="0" smtClean="0">
+                <a:solidFill>
+                  <a:srgbClr val="008000"/>
+                </a:solidFill>
+                <a:latin typeface="Courier New"/>
+                <a:cs typeface="Courier New"/>
+              </a:rPr>
+              <a:t> or </a:t>
+            </a:r>
+            <a:r>
+              <a:rPr lang="fr-FR" sz="2000" b="1" dirty="0" err="1" smtClean="0">
+                <a:solidFill>
+                  <a:srgbClr val="008000"/>
+                </a:solidFill>
+                <a:latin typeface="Courier New"/>
+                <a:cs typeface="Courier New"/>
+              </a:rPr>
+              <a:t>even</a:t>
+            </a:r>
+            <a:r>
+              <a:rPr lang="fr-FR" sz="2000" b="1" dirty="0" smtClean="0">
+                <a:solidFill>
+                  <a:srgbClr val="008000"/>
+                </a:solidFill>
+                <a:latin typeface="Courier New"/>
+                <a:cs typeface="Courier New"/>
+              </a:rPr>
+              <a:t> </a:t>
+            </a:r>
+            <a:r>
+              <a:rPr lang="fr-FR" sz="2000" b="1" dirty="0" err="1" smtClean="0">
+                <a:solidFill>
+                  <a:srgbClr val="008000"/>
+                </a:solidFill>
+                <a:latin typeface="Courier New"/>
+                <a:cs typeface="Courier New"/>
+              </a:rPr>
+              <a:t>number</a:t>
+            </a:r>
+            <a:r>
+              <a:rPr lang="fr-FR" sz="2000" b="1" dirty="0" smtClean="0">
+                <a:solidFill>
+                  <a:srgbClr val="008000"/>
+                </a:solidFill>
+                <a:latin typeface="Courier New"/>
+                <a:cs typeface="Courier New"/>
+              </a:rPr>
+              <a:t> of ‘1’ bits</a:t>
+            </a:r>
+            <a:endParaRPr lang="en-GB" sz="2000" b="1" dirty="0" smtClean="0">
+              <a:solidFill>
+                <a:srgbClr val="008000"/>
+              </a:solidFill>
+              <a:latin typeface="Courier New"/>
+              <a:cs typeface="Courier New"/>
+            </a:endParaRPr>
+          </a:p>
+          <a:p>
+            <a:pPr marL="0" indent="0">
+              <a:buNone/>
+            </a:pPr>
+            <a:endParaRPr lang="en-GB" sz="2000" b="1" dirty="0"/>
+          </a:p>
+        </p:txBody>
+      </p:sp>
+      <p:sp>
+        <p:nvSpPr>
+          <p:cNvPr id="4" name="Slide Number Placeholder 3"/>
+          <p:cNvSpPr>
+            <a:spLocks noGrp="1"/>
+          </p:cNvSpPr>
+          <p:nvPr>
+            <p:ph type="sldNum" sz="quarter" idx="10"/>
+          </p:nvPr>
+        </p:nvSpPr>
+        <p:spPr/>
+        <p:txBody>
+          <a:bodyPr/>
+          <a:lstStyle/>
+          <a:p>
+            <a:fld id="{D9B8CB04-7B95-2844-BD15-B133C35E4786}" type="slidenum">
+              <a:rPr lang="en-GB" smtClean="0"/>
+              <a:pPr/>
+              <a:t>21</a:t>
+            </a:fld>
+            <a:endParaRPr lang="en-GB"/>
+          </a:p>
+        </p:txBody>
+      </p:sp>
+      <p:sp>
+        <p:nvSpPr>
+          <p:cNvPr id="5" name="Footer Placeholder 4"/>
+          <p:cNvSpPr>
+            <a:spLocks noGrp="1"/>
+          </p:cNvSpPr>
+          <p:nvPr>
+            <p:ph type="ftr" sz="quarter" idx="3"/>
+          </p:nvPr>
+        </p:nvSpPr>
+        <p:spPr/>
+        <p:txBody>
+          <a:bodyPr/>
+          <a:lstStyle/>
+          <a:p>
+            <a:r>
+              <a:rPr lang="en-US" smtClean="0"/>
+              <a:t>© Simon McIntosh-Smith</a:t>
+            </a:r>
+            <a:endParaRPr lang="en-US"/>
+          </a:p>
+        </p:txBody>
+      </p:sp>
+    </p:spTree>
+    <p:extLst>
+      <p:ext uri="{BB962C8B-B14F-4D97-AF65-F5344CB8AC3E}">
+        <p14:creationId xmlns:p14="http://schemas.microsoft.com/office/powerpoint/2010/main" val="2692605913"/>
+      </p:ext>
+    </p:extLst>
+  </p:cSld>
+  <p:clrMapOvr>
+    <a:masterClrMapping/>
+  </p:clrMapOvr>
+  <mc:AlternateContent xmlns:mc="http://schemas.openxmlformats.org/markup-compatibility/2006" xmlns:p14="http://schemas.microsoft.com/office/powerpoint/2010/main">
+    <mc:Choice Requires="p14">
+      <p:transition spd="slow" p14:dur="2000"/>
+    </mc:Choice>
+    <mc:Fallback xmlns="">
+      <p:transition xmlns:p14="http://schemas.microsoft.com/office/powerpoint/2010/main" spd="slow"/>
+    </mc:Fallback>
+  </mc:AlternateContent>
+</p:sld>
+</file>
+
+<file path=ppt/slides/slide22.xml><?xml version="1.0" encoding="utf-8"?>
+<p:sld xmlns:a="http://schemas.openxmlformats.org/drawingml/2006/main" xmlns:r="http://schemas.openxmlformats.org/officeDocument/2006/relationships" xmlns:p="http://schemas.openxmlformats.org/presentationml/2006/main">
+  <p:cSld>
+    <p:spTree>
+      <p:nvGrpSpPr>
+        <p:cNvPr id="1" name=""/>
+        <p:cNvGrpSpPr/>
+        <p:nvPr/>
+      </p:nvGrpSpPr>
+      <p:grpSpPr>
+        <a:xfrm>
+          <a:off x="0" y="0"/>
+          <a:ext cx="0" cy="0"/>
+          <a:chOff x="0" y="0"/>
+          <a:chExt cx="0" cy="0"/>
+        </a:xfrm>
+      </p:grpSpPr>
+      <p:sp>
+        <p:nvSpPr>
+          <p:cNvPr id="2" name="Title 1"/>
+          <p:cNvSpPr>
+            <a:spLocks noGrp="1"/>
+          </p:cNvSpPr>
+          <p:nvPr>
+            <p:ph type="title"/>
+          </p:nvPr>
+        </p:nvSpPr>
+        <p:spPr/>
+        <p:txBody>
+          <a:bodyPr/>
+          <a:lstStyle/>
+          <a:p>
+            <a:r>
+              <a:rPr lang="en-GB" dirty="0" smtClean="0"/>
+              <a:t>Parity bit - implementation</a:t>
+            </a:r>
+            <a:endParaRPr lang="en-GB" dirty="0"/>
+          </a:p>
+        </p:txBody>
+      </p:sp>
+      <p:sp>
+        <p:nvSpPr>
+          <p:cNvPr id="3" name="Content Placeholder 2"/>
+          <p:cNvSpPr>
+            <a:spLocks noGrp="1"/>
+          </p:cNvSpPr>
+          <p:nvPr>
+            <p:ph idx="1"/>
+          </p:nvPr>
+        </p:nvSpPr>
+        <p:spPr/>
+        <p:txBody>
+          <a:bodyPr/>
+          <a:lstStyle/>
+          <a:p>
+            <a:pPr marL="0" indent="0">
+              <a:buNone/>
+            </a:pPr>
+            <a:r>
+              <a:rPr lang="en-GB" sz="2000" b="1" i="1" dirty="0" smtClean="0">
+                <a:solidFill>
+                  <a:srgbClr val="3366FF"/>
+                </a:solidFill>
+                <a:latin typeface="Courier New"/>
+                <a:cs typeface="Courier New"/>
+              </a:rPr>
+              <a:t>uint32_t</a:t>
+            </a:r>
+            <a:r>
+              <a:rPr lang="en-GB" sz="2000" b="1" dirty="0" smtClean="0">
+                <a:latin typeface="Courier New"/>
+                <a:cs typeface="Courier New"/>
+              </a:rPr>
+              <a:t> data[</a:t>
+            </a:r>
+            <a:r>
+              <a:rPr lang="en-GB" sz="2000" b="1" dirty="0" smtClean="0">
+                <a:solidFill>
+                  <a:srgbClr val="6117C1"/>
+                </a:solidFill>
+                <a:latin typeface="Courier New"/>
+                <a:cs typeface="Courier New"/>
+              </a:rPr>
+              <a:t>4</a:t>
+            </a:r>
+            <a:r>
+              <a:rPr lang="en-GB" sz="2000" b="1" dirty="0" smtClean="0">
+                <a:latin typeface="Courier New"/>
+                <a:cs typeface="Courier New"/>
+              </a:rPr>
+              <a:t>]; </a:t>
+            </a:r>
+            <a:r>
+              <a:rPr lang="en-GB" sz="2000" b="1" dirty="0" smtClean="0">
+                <a:solidFill>
+                  <a:srgbClr val="008000"/>
+                </a:solidFill>
+                <a:latin typeface="Courier New"/>
+                <a:cs typeface="Courier New"/>
+              </a:rPr>
+              <a:t>// 128 bits of data</a:t>
+            </a:r>
+          </a:p>
+          <a:p>
+            <a:pPr marL="0" indent="0">
+              <a:buNone/>
+            </a:pPr>
+            <a:endParaRPr lang="en-GB" sz="2000" b="1" dirty="0">
+              <a:latin typeface="Courier New"/>
+              <a:cs typeface="Courier New"/>
+            </a:endParaRPr>
+          </a:p>
+          <a:p>
+            <a:pPr marL="0" indent="0">
+              <a:buNone/>
+            </a:pPr>
+            <a:r>
+              <a:rPr lang="en-GB" sz="2000" b="1" i="1" dirty="0" smtClean="0">
+                <a:solidFill>
+                  <a:srgbClr val="3366FF"/>
+                </a:solidFill>
+                <a:latin typeface="Courier New"/>
+                <a:cs typeface="Courier New"/>
+              </a:rPr>
+              <a:t>uint32_t</a:t>
+            </a:r>
+            <a:r>
+              <a:rPr lang="en-GB" sz="2000" b="1" dirty="0" smtClean="0">
+                <a:latin typeface="Courier New"/>
+                <a:cs typeface="Courier New"/>
+              </a:rPr>
+              <a:t> p = data[</a:t>
+            </a:r>
+            <a:r>
+              <a:rPr lang="en-GB" sz="2000" b="1" dirty="0" smtClean="0">
+                <a:solidFill>
+                  <a:srgbClr val="6117C1"/>
+                </a:solidFill>
+                <a:latin typeface="Courier New"/>
+                <a:cs typeface="Courier New"/>
+              </a:rPr>
+              <a:t>0</a:t>
+            </a:r>
+            <a:r>
+              <a:rPr lang="en-GB" sz="2000" b="1" dirty="0" smtClean="0">
+                <a:latin typeface="Courier New"/>
+                <a:cs typeface="Courier New"/>
+              </a:rPr>
+              <a:t>] ^ data[</a:t>
+            </a:r>
+            <a:r>
+              <a:rPr lang="en-GB" sz="2000" b="1" dirty="0" smtClean="0">
+                <a:solidFill>
+                  <a:srgbClr val="6117C1"/>
+                </a:solidFill>
+                <a:latin typeface="Courier New"/>
+                <a:cs typeface="Courier New"/>
+              </a:rPr>
+              <a:t>1</a:t>
+            </a:r>
+            <a:r>
+              <a:rPr lang="en-GB" sz="2000" b="1" dirty="0" smtClean="0">
+                <a:latin typeface="Courier New"/>
+                <a:cs typeface="Courier New"/>
+              </a:rPr>
+              <a:t>] ^ data[</a:t>
+            </a:r>
+            <a:r>
+              <a:rPr lang="en-GB" sz="2000" b="1" dirty="0" smtClean="0">
+                <a:solidFill>
+                  <a:srgbClr val="6117C1"/>
+                </a:solidFill>
+                <a:latin typeface="Courier New"/>
+                <a:cs typeface="Courier New"/>
+              </a:rPr>
+              <a:t>2</a:t>
+            </a:r>
+            <a:r>
+              <a:rPr lang="en-GB" sz="2000" b="1" dirty="0" smtClean="0">
+                <a:latin typeface="Courier New"/>
+                <a:cs typeface="Courier New"/>
+              </a:rPr>
+              <a:t>] ^ data[</a:t>
+            </a:r>
+            <a:r>
+              <a:rPr lang="en-GB" sz="2000" b="1" dirty="0" smtClean="0">
+                <a:solidFill>
+                  <a:srgbClr val="6117C1"/>
+                </a:solidFill>
+                <a:latin typeface="Courier New"/>
+                <a:cs typeface="Courier New"/>
+              </a:rPr>
+              <a:t>3</a:t>
+            </a:r>
+            <a:r>
+              <a:rPr lang="en-GB" sz="2000" b="1" dirty="0" smtClean="0">
+                <a:latin typeface="Courier New"/>
+                <a:cs typeface="Courier New"/>
+              </a:rPr>
+              <a:t>]</a:t>
+            </a:r>
+          </a:p>
+          <a:p>
+            <a:pPr marL="0" indent="0">
+              <a:buNone/>
+            </a:pPr>
+            <a:endParaRPr lang="en-GB" sz="2000" b="1" dirty="0" smtClean="0">
+              <a:latin typeface="Courier New"/>
+              <a:cs typeface="Courier New"/>
+            </a:endParaRPr>
+          </a:p>
+          <a:p>
+            <a:pPr marL="0" indent="0">
+              <a:buNone/>
+            </a:pPr>
+            <a:r>
+              <a:rPr lang="fr-FR" sz="2000" b="1" dirty="0">
+                <a:solidFill>
+                  <a:srgbClr val="008000"/>
+                </a:solidFill>
+                <a:latin typeface="Courier New"/>
+                <a:cs typeface="Courier New"/>
+              </a:rPr>
+              <a:t>/</a:t>
+            </a:r>
+            <a:r>
+              <a:rPr lang="fr-FR" sz="2000" b="1" dirty="0" smtClean="0">
+                <a:solidFill>
+                  <a:srgbClr val="008000"/>
+                </a:solidFill>
+                <a:latin typeface="Courier New"/>
+                <a:cs typeface="Courier New"/>
+              </a:rPr>
+              <a:t>/ This </a:t>
+            </a:r>
+            <a:r>
+              <a:rPr lang="fr-FR" sz="2000" b="1" dirty="0" err="1" smtClean="0">
+                <a:solidFill>
+                  <a:srgbClr val="008000"/>
+                </a:solidFill>
+                <a:latin typeface="Courier New"/>
+                <a:cs typeface="Courier New"/>
+              </a:rPr>
+              <a:t>intrinsic</a:t>
+            </a:r>
+            <a:r>
+              <a:rPr lang="fr-FR" sz="2000" b="1" dirty="0" smtClean="0">
+                <a:solidFill>
+                  <a:srgbClr val="008000"/>
+                </a:solidFill>
+                <a:latin typeface="Courier New"/>
+                <a:cs typeface="Courier New"/>
+              </a:rPr>
+              <a:t> </a:t>
+            </a:r>
+            <a:r>
+              <a:rPr lang="fr-FR" sz="2000" b="1" dirty="0" err="1" smtClean="0">
+                <a:solidFill>
+                  <a:srgbClr val="008000"/>
+                </a:solidFill>
+                <a:latin typeface="Courier New"/>
+                <a:cs typeface="Courier New"/>
+              </a:rPr>
+              <a:t>should</a:t>
+            </a:r>
+            <a:r>
+              <a:rPr lang="fr-FR" sz="2000" b="1" dirty="0" smtClean="0">
+                <a:solidFill>
+                  <a:srgbClr val="008000"/>
+                </a:solidFill>
+                <a:latin typeface="Courier New"/>
+                <a:cs typeface="Courier New"/>
+              </a:rPr>
+              <a:t> </a:t>
+            </a:r>
+            <a:r>
+              <a:rPr lang="fr-FR" sz="2000" b="1" dirty="0" err="1" smtClean="0">
+                <a:solidFill>
+                  <a:srgbClr val="008000"/>
+                </a:solidFill>
+                <a:latin typeface="Courier New"/>
+                <a:cs typeface="Courier New"/>
+              </a:rPr>
+              <a:t>map</a:t>
+            </a:r>
+            <a:r>
+              <a:rPr lang="fr-FR" sz="2000" b="1" dirty="0" smtClean="0">
+                <a:solidFill>
+                  <a:srgbClr val="008000"/>
+                </a:solidFill>
+                <a:latin typeface="Courier New"/>
+                <a:cs typeface="Courier New"/>
+              </a:rPr>
+              <a:t> to native hardware</a:t>
+            </a:r>
+          </a:p>
+          <a:p>
+            <a:pPr marL="0" indent="0">
+              <a:buNone/>
+            </a:pPr>
+            <a:r>
+              <a:rPr lang="fr-FR" sz="2000" b="1" dirty="0" smtClean="0">
+                <a:solidFill>
+                  <a:srgbClr val="008000"/>
+                </a:solidFill>
+                <a:latin typeface="Courier New"/>
+                <a:cs typeface="Courier New"/>
+              </a:rPr>
+              <a:t>// </a:t>
+            </a:r>
+            <a:r>
+              <a:rPr lang="fr-FR" sz="2000" b="1" dirty="0" err="1" smtClean="0">
+                <a:solidFill>
+                  <a:srgbClr val="008000"/>
+                </a:solidFill>
+                <a:latin typeface="Courier New"/>
+                <a:cs typeface="Courier New"/>
+              </a:rPr>
+              <a:t>implementation</a:t>
+            </a:r>
+            <a:r>
+              <a:rPr lang="fr-FR" sz="2000" b="1" dirty="0" smtClean="0">
+                <a:solidFill>
+                  <a:srgbClr val="008000"/>
+                </a:solidFill>
+                <a:latin typeface="Courier New"/>
+                <a:cs typeface="Courier New"/>
+              </a:rPr>
+              <a:t> if </a:t>
+            </a:r>
+            <a:r>
+              <a:rPr lang="fr-FR" sz="2000" b="1" dirty="0" err="1" smtClean="0">
+                <a:solidFill>
+                  <a:srgbClr val="008000"/>
+                </a:solidFill>
+                <a:latin typeface="Courier New"/>
+                <a:cs typeface="Courier New"/>
+              </a:rPr>
+              <a:t>available</a:t>
+            </a:r>
+            <a:endParaRPr lang="en-GB" sz="2000" b="1" dirty="0" smtClean="0">
+              <a:latin typeface="Courier New"/>
+              <a:cs typeface="Courier New"/>
+            </a:endParaRPr>
+          </a:p>
+          <a:p>
+            <a:pPr marL="0" indent="0">
+              <a:buNone/>
+            </a:pPr>
+            <a:r>
+              <a:rPr lang="en-GB" sz="2000" b="1" dirty="0">
+                <a:latin typeface="Courier New"/>
+                <a:cs typeface="Courier New"/>
+              </a:rPr>
+              <a:t>p</a:t>
+            </a:r>
+            <a:r>
+              <a:rPr lang="en-GB" sz="2000" b="1" dirty="0" smtClean="0">
+                <a:latin typeface="Courier New"/>
+                <a:cs typeface="Courier New"/>
+              </a:rPr>
+              <a:t> = </a:t>
+            </a:r>
+            <a:r>
+              <a:rPr lang="en-GB" sz="2000" b="1" dirty="0" smtClean="0">
+                <a:solidFill>
+                  <a:srgbClr val="3366FF"/>
+                </a:solidFill>
+                <a:latin typeface="Courier New"/>
+                <a:cs typeface="Courier New"/>
+              </a:rPr>
+              <a:t>__</a:t>
+            </a:r>
+            <a:r>
+              <a:rPr lang="en-GB" sz="2000" b="1" dirty="0" err="1" smtClean="0">
+                <a:solidFill>
+                  <a:srgbClr val="3366FF"/>
+                </a:solidFill>
+                <a:latin typeface="Courier New"/>
+                <a:cs typeface="Courier New"/>
+              </a:rPr>
+              <a:t>builtin_parity</a:t>
+            </a:r>
+            <a:r>
+              <a:rPr lang="en-GB" sz="2000" b="1" dirty="0" smtClean="0">
+                <a:latin typeface="Courier New"/>
+                <a:cs typeface="Courier New"/>
+              </a:rPr>
+              <a:t>(p);</a:t>
+            </a:r>
+          </a:p>
+          <a:p>
+            <a:pPr marL="0" indent="0">
+              <a:buNone/>
+            </a:pPr>
+            <a:endParaRPr lang="fr-FR" sz="2000" b="1" dirty="0">
+              <a:latin typeface="Courier New"/>
+              <a:cs typeface="Courier New"/>
+            </a:endParaRPr>
+          </a:p>
+          <a:p>
+            <a:pPr marL="0" indent="0">
+              <a:buNone/>
+            </a:pPr>
+            <a:endParaRPr lang="fr-FR" sz="2000" b="1" dirty="0" smtClean="0">
+              <a:latin typeface="Courier New"/>
+              <a:cs typeface="Courier New"/>
+            </a:endParaRPr>
+          </a:p>
+          <a:p>
+            <a:pPr marL="0" indent="0">
+              <a:buNone/>
+            </a:pPr>
+            <a:r>
+              <a:rPr lang="fr-FR" sz="2000" b="1" dirty="0" smtClean="0">
+                <a:solidFill>
+                  <a:srgbClr val="008000"/>
+                </a:solidFill>
+                <a:latin typeface="Courier New"/>
+                <a:cs typeface="Courier New"/>
+              </a:rPr>
+              <a:t>// p </a:t>
+            </a:r>
+            <a:r>
+              <a:rPr lang="fr-FR" sz="2000" b="1" dirty="0" err="1" smtClean="0">
+                <a:solidFill>
+                  <a:srgbClr val="008000"/>
+                </a:solidFill>
+                <a:latin typeface="Courier New"/>
+                <a:cs typeface="Courier New"/>
+              </a:rPr>
+              <a:t>is</a:t>
+            </a:r>
+            <a:r>
+              <a:rPr lang="fr-FR" sz="2000" b="1" dirty="0" smtClean="0">
+                <a:solidFill>
+                  <a:srgbClr val="008000"/>
+                </a:solidFill>
+                <a:latin typeface="Courier New"/>
+                <a:cs typeface="Courier New"/>
+              </a:rPr>
+              <a:t> </a:t>
+            </a:r>
+            <a:r>
+              <a:rPr lang="fr-FR" sz="2000" b="1" dirty="0" err="1" smtClean="0">
+                <a:solidFill>
+                  <a:srgbClr val="008000"/>
+                </a:solidFill>
+                <a:latin typeface="Courier New"/>
+                <a:cs typeface="Courier New"/>
+              </a:rPr>
+              <a:t>now</a:t>
+            </a:r>
+            <a:r>
+              <a:rPr lang="fr-FR" sz="2000" b="1" dirty="0" smtClean="0">
+                <a:solidFill>
+                  <a:srgbClr val="008000"/>
+                </a:solidFill>
+                <a:latin typeface="Courier New"/>
+                <a:cs typeface="Courier New"/>
+              </a:rPr>
+              <a:t> ‘1’ or ‘0’, </a:t>
+            </a:r>
+            <a:r>
+              <a:rPr lang="fr-FR" sz="2000" b="1" dirty="0" err="1" smtClean="0">
+                <a:solidFill>
+                  <a:srgbClr val="008000"/>
+                </a:solidFill>
+                <a:latin typeface="Courier New"/>
+                <a:cs typeface="Courier New"/>
+              </a:rPr>
+              <a:t>corresponding</a:t>
+            </a:r>
+            <a:r>
+              <a:rPr lang="fr-FR" sz="2000" b="1" dirty="0" smtClean="0">
+                <a:solidFill>
+                  <a:srgbClr val="008000"/>
+                </a:solidFill>
+                <a:latin typeface="Courier New"/>
+                <a:cs typeface="Courier New"/>
+              </a:rPr>
+              <a:t> to data </a:t>
+            </a:r>
+            <a:r>
+              <a:rPr lang="fr-FR" sz="2000" b="1" dirty="0" err="1" smtClean="0">
+                <a:solidFill>
+                  <a:srgbClr val="008000"/>
+                </a:solidFill>
+                <a:latin typeface="Courier New"/>
+                <a:cs typeface="Courier New"/>
+              </a:rPr>
+              <a:t>having</a:t>
+            </a:r>
+            <a:endParaRPr lang="fr-FR" sz="2000" b="1" dirty="0" smtClean="0">
+              <a:solidFill>
+                <a:srgbClr val="008000"/>
+              </a:solidFill>
+              <a:latin typeface="Courier New"/>
+              <a:cs typeface="Courier New"/>
+            </a:endParaRPr>
+          </a:p>
+          <a:p>
+            <a:pPr marL="0" indent="0">
+              <a:buNone/>
+            </a:pPr>
+            <a:r>
+              <a:rPr lang="fr-FR" sz="2000" b="1" dirty="0" smtClean="0">
+                <a:solidFill>
+                  <a:srgbClr val="008000"/>
+                </a:solidFill>
+                <a:latin typeface="Courier New"/>
+                <a:cs typeface="Courier New"/>
+              </a:rPr>
+              <a:t>// an </a:t>
+            </a:r>
+            <a:r>
+              <a:rPr lang="fr-FR" sz="2000" b="1" dirty="0" err="1" smtClean="0">
+                <a:solidFill>
+                  <a:srgbClr val="008000"/>
+                </a:solidFill>
+                <a:latin typeface="Courier New"/>
+                <a:cs typeface="Courier New"/>
+              </a:rPr>
+              <a:t>odd</a:t>
+            </a:r>
+            <a:r>
+              <a:rPr lang="fr-FR" sz="2000" b="1" dirty="0" smtClean="0">
+                <a:solidFill>
+                  <a:srgbClr val="008000"/>
+                </a:solidFill>
+                <a:latin typeface="Courier New"/>
+                <a:cs typeface="Courier New"/>
+              </a:rPr>
+              <a:t> or </a:t>
+            </a:r>
+            <a:r>
+              <a:rPr lang="fr-FR" sz="2000" b="1" dirty="0" err="1" smtClean="0">
+                <a:solidFill>
+                  <a:srgbClr val="008000"/>
+                </a:solidFill>
+                <a:latin typeface="Courier New"/>
+                <a:cs typeface="Courier New"/>
+              </a:rPr>
+              <a:t>even</a:t>
+            </a:r>
+            <a:r>
+              <a:rPr lang="fr-FR" sz="2000" b="1" dirty="0" smtClean="0">
+                <a:solidFill>
+                  <a:srgbClr val="008000"/>
+                </a:solidFill>
+                <a:latin typeface="Courier New"/>
+                <a:cs typeface="Courier New"/>
+              </a:rPr>
+              <a:t> </a:t>
+            </a:r>
+            <a:r>
+              <a:rPr lang="fr-FR" sz="2000" b="1" dirty="0" err="1" smtClean="0">
+                <a:solidFill>
+                  <a:srgbClr val="008000"/>
+                </a:solidFill>
+                <a:latin typeface="Courier New"/>
+                <a:cs typeface="Courier New"/>
+              </a:rPr>
+              <a:t>number</a:t>
+            </a:r>
+            <a:r>
+              <a:rPr lang="fr-FR" sz="2000" b="1" dirty="0" smtClean="0">
+                <a:solidFill>
+                  <a:srgbClr val="008000"/>
+                </a:solidFill>
+                <a:latin typeface="Courier New"/>
+                <a:cs typeface="Courier New"/>
+              </a:rPr>
+              <a:t> of ‘1’ bits</a:t>
+            </a:r>
+            <a:endParaRPr lang="en-GB" sz="2000" b="1" dirty="0" smtClean="0">
+              <a:solidFill>
+                <a:srgbClr val="008000"/>
+              </a:solidFill>
+              <a:latin typeface="Courier New"/>
+              <a:cs typeface="Courier New"/>
+            </a:endParaRPr>
+          </a:p>
+          <a:p>
+            <a:pPr marL="0" indent="0">
+              <a:buNone/>
+            </a:pPr>
+            <a:endParaRPr lang="en-GB" sz="2000" b="1" dirty="0"/>
+          </a:p>
+        </p:txBody>
+      </p:sp>
+      <p:sp>
+        <p:nvSpPr>
+          <p:cNvPr id="4" name="Slide Number Placeholder 3"/>
+          <p:cNvSpPr>
+            <a:spLocks noGrp="1"/>
+          </p:cNvSpPr>
+          <p:nvPr>
+            <p:ph type="sldNum" sz="quarter" idx="10"/>
+          </p:nvPr>
+        </p:nvSpPr>
+        <p:spPr/>
+        <p:txBody>
+          <a:bodyPr/>
+          <a:lstStyle/>
+          <a:p>
+            <a:fld id="{D9B8CB04-7B95-2844-BD15-B133C35E4786}" type="slidenum">
+              <a:rPr lang="en-GB" smtClean="0"/>
+              <a:pPr/>
+              <a:t>22</a:t>
+            </a:fld>
+            <a:endParaRPr lang="en-GB"/>
+          </a:p>
+        </p:txBody>
+      </p:sp>
+      <p:sp>
+        <p:nvSpPr>
+          <p:cNvPr id="5" name="Footer Placeholder 4"/>
+          <p:cNvSpPr>
+            <a:spLocks noGrp="1"/>
+          </p:cNvSpPr>
+          <p:nvPr>
+            <p:ph type="ftr" sz="quarter" idx="3"/>
+          </p:nvPr>
+        </p:nvSpPr>
+        <p:spPr/>
+        <p:txBody>
+          <a:bodyPr/>
+          <a:lstStyle/>
+          <a:p>
+            <a:r>
+              <a:rPr lang="en-US" smtClean="0"/>
+              <a:t>© Simon McIntosh-Smith</a:t>
+            </a:r>
+            <a:endParaRPr lang="en-US"/>
+          </a:p>
+        </p:txBody>
+      </p:sp>
+    </p:spTree>
+    <p:extLst>
+      <p:ext uri="{BB962C8B-B14F-4D97-AF65-F5344CB8AC3E}">
+        <p14:creationId xmlns:p14="http://schemas.microsoft.com/office/powerpoint/2010/main" val="1368924357"/>
+      </p:ext>
+    </p:extLst>
+  </p:cSld>
+  <p:clrMapOvr>
+    <a:masterClrMapping/>
+  </p:clrMapOvr>
+  <mc:AlternateContent xmlns:mc="http://schemas.openxmlformats.org/markup-compatibility/2006" xmlns:p14="http://schemas.microsoft.com/office/powerpoint/2010/main">
+    <mc:Choice Requires="p14">
+      <p:transition spd="slow" p14:dur="2000"/>
+    </mc:Choice>
+    <mc:Fallback xmlns="">
+      <p:transition xmlns:p14="http://schemas.microsoft.com/office/powerpoint/2010/main" spd="slow"/>
+    </mc:Fallback>
+  </mc:AlternateContent>
+</p:sld>
+</file>
+
+<file path=ppt/slides/slide23.xml><?xml version="1.0" encoding="utf-8"?>
+<p:sld xmlns:a="http://schemas.openxmlformats.org/drawingml/2006/main" xmlns:r="http://schemas.openxmlformats.org/officeDocument/2006/relationships" xmlns:p="http://schemas.openxmlformats.org/presentationml/2006/main">
+  <p:cSld>
+    <p:spTree>
+      <p:nvGrpSpPr>
+        <p:cNvPr id="1" name=""/>
+        <p:cNvGrpSpPr/>
+        <p:nvPr/>
+      </p:nvGrpSpPr>
+      <p:grpSpPr>
+        <a:xfrm>
+          <a:off x="0" y="0"/>
+          <a:ext cx="0" cy="0"/>
+          <a:chOff x="0" y="0"/>
+          <a:chExt cx="0" cy="0"/>
+        </a:xfrm>
+      </p:grpSpPr>
+      <p:sp>
+        <p:nvSpPr>
+          <p:cNvPr id="2" name="Title 1"/>
+          <p:cNvSpPr>
+            <a:spLocks noGrp="1"/>
+          </p:cNvSpPr>
+          <p:nvPr>
+            <p:ph type="title"/>
+          </p:nvPr>
+        </p:nvSpPr>
+        <p:spPr/>
+        <p:txBody>
+          <a:bodyPr/>
+          <a:lstStyle/>
+          <a:p>
+            <a:r>
+              <a:rPr lang="en-GB" dirty="0" smtClean="0"/>
+              <a:t>Parity bit - implementation</a:t>
+            </a:r>
+            <a:endParaRPr lang="en-GB" dirty="0"/>
+          </a:p>
+        </p:txBody>
+      </p:sp>
+      <p:sp>
+        <p:nvSpPr>
+          <p:cNvPr id="3" name="Content Placeholder 2"/>
+          <p:cNvSpPr>
+            <a:spLocks noGrp="1"/>
+          </p:cNvSpPr>
+          <p:nvPr>
+            <p:ph idx="1"/>
+          </p:nvPr>
+        </p:nvSpPr>
+        <p:spPr/>
+        <p:txBody>
+          <a:bodyPr/>
+          <a:lstStyle/>
+          <a:p>
+            <a:pPr marL="0" indent="0">
+              <a:buNone/>
+            </a:pPr>
+            <a:r>
+              <a:rPr lang="en-GB" sz="2000" b="1" i="1" dirty="0" smtClean="0">
+                <a:solidFill>
+                  <a:srgbClr val="3366FF"/>
+                </a:solidFill>
+                <a:latin typeface="Courier New"/>
+                <a:cs typeface="Courier New"/>
+              </a:rPr>
+              <a:t>uint64_t</a:t>
+            </a:r>
+            <a:r>
+              <a:rPr lang="en-GB" sz="2000" b="1" dirty="0" smtClean="0">
+                <a:latin typeface="Courier New"/>
+                <a:cs typeface="Courier New"/>
+              </a:rPr>
+              <a:t> data[</a:t>
+            </a:r>
+            <a:r>
+              <a:rPr lang="en-GB" sz="2000" b="1" dirty="0">
+                <a:solidFill>
+                  <a:srgbClr val="6117C1"/>
+                </a:solidFill>
+                <a:latin typeface="Courier New"/>
+                <a:cs typeface="Courier New"/>
+              </a:rPr>
+              <a:t>2</a:t>
+            </a:r>
+            <a:r>
+              <a:rPr lang="en-GB" sz="2000" b="1" dirty="0" smtClean="0">
+                <a:latin typeface="Courier New"/>
+                <a:cs typeface="Courier New"/>
+              </a:rPr>
+              <a:t>]; </a:t>
+            </a:r>
+            <a:r>
+              <a:rPr lang="en-GB" sz="2000" b="1" dirty="0" smtClean="0">
+                <a:solidFill>
+                  <a:srgbClr val="008000"/>
+                </a:solidFill>
+                <a:latin typeface="Courier New"/>
+                <a:cs typeface="Courier New"/>
+              </a:rPr>
+              <a:t>// 128 bits of data</a:t>
+            </a:r>
+          </a:p>
+          <a:p>
+            <a:pPr marL="0" indent="0">
+              <a:buNone/>
+            </a:pPr>
+            <a:endParaRPr lang="en-GB" sz="2000" b="1" dirty="0">
+              <a:latin typeface="Courier New"/>
+              <a:cs typeface="Courier New"/>
+            </a:endParaRPr>
+          </a:p>
+          <a:p>
+            <a:pPr marL="0" indent="0">
+              <a:buNone/>
+            </a:pPr>
+            <a:r>
+              <a:rPr lang="en-GB" sz="2000" b="1" i="1" dirty="0" smtClean="0">
+                <a:solidFill>
+                  <a:srgbClr val="3366FF"/>
+                </a:solidFill>
+                <a:latin typeface="Courier New"/>
+                <a:cs typeface="Courier New"/>
+              </a:rPr>
+              <a:t>uint64_t</a:t>
+            </a:r>
+            <a:r>
+              <a:rPr lang="en-GB" sz="2000" b="1" dirty="0" smtClean="0">
+                <a:latin typeface="Courier New"/>
+                <a:cs typeface="Courier New"/>
+              </a:rPr>
+              <a:t> p = data[</a:t>
+            </a:r>
+            <a:r>
+              <a:rPr lang="en-GB" sz="2000" b="1" dirty="0" smtClean="0">
+                <a:solidFill>
+                  <a:srgbClr val="6117C1"/>
+                </a:solidFill>
+                <a:latin typeface="Courier New"/>
+                <a:cs typeface="Courier New"/>
+              </a:rPr>
+              <a:t>0</a:t>
+            </a:r>
+            <a:r>
+              <a:rPr lang="en-GB" sz="2000" b="1" dirty="0" smtClean="0">
+                <a:latin typeface="Courier New"/>
+                <a:cs typeface="Courier New"/>
+              </a:rPr>
+              <a:t>] ^ data[</a:t>
+            </a:r>
+            <a:r>
+              <a:rPr lang="en-GB" sz="2000" b="1" dirty="0" smtClean="0">
+                <a:solidFill>
+                  <a:srgbClr val="6117C1"/>
+                </a:solidFill>
+                <a:latin typeface="Courier New"/>
+                <a:cs typeface="Courier New"/>
+              </a:rPr>
+              <a:t>1];</a:t>
+            </a:r>
+          </a:p>
+          <a:p>
+            <a:pPr marL="0" indent="0">
+              <a:buNone/>
+            </a:pPr>
+            <a:endParaRPr lang="en-GB" sz="2000" b="1" dirty="0" smtClean="0">
+              <a:latin typeface="Courier New"/>
+              <a:cs typeface="Courier New"/>
+            </a:endParaRPr>
+          </a:p>
+          <a:p>
+            <a:pPr marL="0" indent="0">
+              <a:buNone/>
+            </a:pPr>
+            <a:r>
+              <a:rPr lang="fr-FR" sz="2000" b="1" dirty="0">
+                <a:solidFill>
+                  <a:srgbClr val="008000"/>
+                </a:solidFill>
+                <a:latin typeface="Courier New"/>
+                <a:cs typeface="Courier New"/>
+              </a:rPr>
+              <a:t>/</a:t>
+            </a:r>
+            <a:r>
+              <a:rPr lang="fr-FR" sz="2000" b="1" dirty="0" smtClean="0">
+                <a:solidFill>
+                  <a:srgbClr val="008000"/>
+                </a:solidFill>
+                <a:latin typeface="Courier New"/>
+                <a:cs typeface="Courier New"/>
+              </a:rPr>
+              <a:t>/ This </a:t>
+            </a:r>
+            <a:r>
+              <a:rPr lang="fr-FR" sz="2000" b="1" dirty="0" err="1" smtClean="0">
+                <a:solidFill>
+                  <a:srgbClr val="008000"/>
+                </a:solidFill>
+                <a:latin typeface="Courier New"/>
+                <a:cs typeface="Courier New"/>
+              </a:rPr>
+              <a:t>intrinsic</a:t>
+            </a:r>
+            <a:r>
+              <a:rPr lang="fr-FR" sz="2000" b="1" dirty="0" smtClean="0">
+                <a:solidFill>
+                  <a:srgbClr val="008000"/>
+                </a:solidFill>
+                <a:latin typeface="Courier New"/>
+                <a:cs typeface="Courier New"/>
+              </a:rPr>
+              <a:t> </a:t>
+            </a:r>
+            <a:r>
+              <a:rPr lang="fr-FR" sz="2000" b="1" dirty="0" err="1" smtClean="0">
+                <a:solidFill>
+                  <a:srgbClr val="008000"/>
+                </a:solidFill>
+                <a:latin typeface="Courier New"/>
+                <a:cs typeface="Courier New"/>
+              </a:rPr>
+              <a:t>should</a:t>
+            </a:r>
+            <a:r>
+              <a:rPr lang="fr-FR" sz="2000" b="1" dirty="0" smtClean="0">
+                <a:solidFill>
+                  <a:srgbClr val="008000"/>
+                </a:solidFill>
+                <a:latin typeface="Courier New"/>
+                <a:cs typeface="Courier New"/>
+              </a:rPr>
+              <a:t> </a:t>
+            </a:r>
+            <a:r>
+              <a:rPr lang="fr-FR" sz="2000" b="1" dirty="0" err="1" smtClean="0">
+                <a:solidFill>
+                  <a:srgbClr val="008000"/>
+                </a:solidFill>
+                <a:latin typeface="Courier New"/>
+                <a:cs typeface="Courier New"/>
+              </a:rPr>
+              <a:t>map</a:t>
+            </a:r>
+            <a:r>
+              <a:rPr lang="fr-FR" sz="2000" b="1" dirty="0" smtClean="0">
+                <a:solidFill>
+                  <a:srgbClr val="008000"/>
+                </a:solidFill>
+                <a:latin typeface="Courier New"/>
+                <a:cs typeface="Courier New"/>
+              </a:rPr>
+              <a:t> to native hardware</a:t>
+            </a:r>
+          </a:p>
+          <a:p>
+            <a:pPr marL="0" indent="0">
+              <a:buNone/>
+            </a:pPr>
+            <a:r>
+              <a:rPr lang="fr-FR" sz="2000" b="1" dirty="0" smtClean="0">
+                <a:solidFill>
+                  <a:srgbClr val="008000"/>
+                </a:solidFill>
+                <a:latin typeface="Courier New"/>
+                <a:cs typeface="Courier New"/>
+              </a:rPr>
+              <a:t>// </a:t>
+            </a:r>
+            <a:r>
+              <a:rPr lang="fr-FR" sz="2000" b="1" dirty="0" err="1" smtClean="0">
+                <a:solidFill>
+                  <a:srgbClr val="008000"/>
+                </a:solidFill>
+                <a:latin typeface="Courier New"/>
+                <a:cs typeface="Courier New"/>
+              </a:rPr>
+              <a:t>implementation</a:t>
+            </a:r>
+            <a:r>
+              <a:rPr lang="fr-FR" sz="2000" b="1" dirty="0" smtClean="0">
+                <a:solidFill>
+                  <a:srgbClr val="008000"/>
+                </a:solidFill>
+                <a:latin typeface="Courier New"/>
+                <a:cs typeface="Courier New"/>
+              </a:rPr>
+              <a:t> if </a:t>
+            </a:r>
+            <a:r>
+              <a:rPr lang="fr-FR" sz="2000" b="1" dirty="0" err="1" smtClean="0">
+                <a:solidFill>
+                  <a:srgbClr val="008000"/>
+                </a:solidFill>
+                <a:latin typeface="Courier New"/>
+                <a:cs typeface="Courier New"/>
+              </a:rPr>
+              <a:t>available</a:t>
+            </a:r>
+            <a:endParaRPr lang="en-GB" sz="2000" b="1" dirty="0" smtClean="0">
+              <a:latin typeface="Courier New"/>
+              <a:cs typeface="Courier New"/>
+            </a:endParaRPr>
+          </a:p>
+          <a:p>
+            <a:pPr marL="0" indent="0">
+              <a:buNone/>
+            </a:pPr>
+            <a:r>
+              <a:rPr lang="en-GB" sz="2000" b="1" dirty="0">
+                <a:latin typeface="Courier New"/>
+                <a:cs typeface="Courier New"/>
+              </a:rPr>
+              <a:t>p</a:t>
+            </a:r>
+            <a:r>
+              <a:rPr lang="en-GB" sz="2000" b="1" dirty="0" smtClean="0">
+                <a:latin typeface="Courier New"/>
+                <a:cs typeface="Courier New"/>
+              </a:rPr>
+              <a:t> = </a:t>
+            </a:r>
+            <a:r>
+              <a:rPr lang="en-GB" sz="2000" b="1" dirty="0" smtClean="0">
+                <a:solidFill>
+                  <a:srgbClr val="3366FF"/>
+                </a:solidFill>
+                <a:latin typeface="Courier New"/>
+                <a:cs typeface="Courier New"/>
+              </a:rPr>
+              <a:t>__</a:t>
+            </a:r>
+            <a:r>
+              <a:rPr lang="en-GB" sz="2000" b="1" dirty="0" err="1" smtClean="0">
+                <a:solidFill>
+                  <a:srgbClr val="3366FF"/>
+                </a:solidFill>
+                <a:latin typeface="Courier New"/>
+                <a:cs typeface="Courier New"/>
+              </a:rPr>
+              <a:t>builtin_parityl</a:t>
+            </a:r>
+            <a:r>
+              <a:rPr lang="en-GB" sz="2000" b="1" dirty="0" smtClean="0">
+                <a:latin typeface="Courier New"/>
+                <a:cs typeface="Courier New"/>
+              </a:rPr>
+              <a:t>(p);</a:t>
+            </a:r>
+          </a:p>
+          <a:p>
+            <a:pPr marL="0" indent="0">
+              <a:buNone/>
+            </a:pPr>
+            <a:endParaRPr lang="fr-FR" sz="2000" b="1" dirty="0">
+              <a:latin typeface="Courier New"/>
+              <a:cs typeface="Courier New"/>
+            </a:endParaRPr>
+          </a:p>
+          <a:p>
+            <a:pPr marL="0" indent="0">
+              <a:buNone/>
+            </a:pPr>
+            <a:endParaRPr lang="fr-FR" sz="2000" b="1" dirty="0" smtClean="0">
+              <a:latin typeface="Courier New"/>
+              <a:cs typeface="Courier New"/>
+            </a:endParaRPr>
+          </a:p>
+          <a:p>
+            <a:pPr marL="0" indent="0">
+              <a:buNone/>
+            </a:pPr>
+            <a:r>
+              <a:rPr lang="fr-FR" sz="2000" b="1" dirty="0" smtClean="0">
+                <a:solidFill>
+                  <a:srgbClr val="008000"/>
+                </a:solidFill>
+                <a:latin typeface="Courier New"/>
+                <a:cs typeface="Courier New"/>
+              </a:rPr>
+              <a:t>// p </a:t>
+            </a:r>
+            <a:r>
+              <a:rPr lang="fr-FR" sz="2000" b="1" dirty="0" err="1" smtClean="0">
+                <a:solidFill>
+                  <a:srgbClr val="008000"/>
+                </a:solidFill>
+                <a:latin typeface="Courier New"/>
+                <a:cs typeface="Courier New"/>
+              </a:rPr>
+              <a:t>is</a:t>
+            </a:r>
+            <a:r>
+              <a:rPr lang="fr-FR" sz="2000" b="1" dirty="0" smtClean="0">
+                <a:solidFill>
+                  <a:srgbClr val="008000"/>
+                </a:solidFill>
+                <a:latin typeface="Courier New"/>
+                <a:cs typeface="Courier New"/>
+              </a:rPr>
+              <a:t> </a:t>
+            </a:r>
+            <a:r>
+              <a:rPr lang="fr-FR" sz="2000" b="1" dirty="0" err="1" smtClean="0">
+                <a:solidFill>
+                  <a:srgbClr val="008000"/>
+                </a:solidFill>
+                <a:latin typeface="Courier New"/>
+                <a:cs typeface="Courier New"/>
+              </a:rPr>
+              <a:t>now</a:t>
+            </a:r>
+            <a:r>
+              <a:rPr lang="fr-FR" sz="2000" b="1" dirty="0" smtClean="0">
+                <a:solidFill>
+                  <a:srgbClr val="008000"/>
+                </a:solidFill>
+                <a:latin typeface="Courier New"/>
+                <a:cs typeface="Courier New"/>
+              </a:rPr>
+              <a:t> ‘1’ or ‘0’, </a:t>
+            </a:r>
+            <a:r>
+              <a:rPr lang="fr-FR" sz="2000" b="1" dirty="0" err="1" smtClean="0">
+                <a:solidFill>
+                  <a:srgbClr val="008000"/>
+                </a:solidFill>
+                <a:latin typeface="Courier New"/>
+                <a:cs typeface="Courier New"/>
+              </a:rPr>
+              <a:t>corresponding</a:t>
+            </a:r>
+            <a:r>
+              <a:rPr lang="fr-FR" sz="2000" b="1" dirty="0" smtClean="0">
+                <a:solidFill>
+                  <a:srgbClr val="008000"/>
+                </a:solidFill>
+                <a:latin typeface="Courier New"/>
+                <a:cs typeface="Courier New"/>
+              </a:rPr>
+              <a:t> to data </a:t>
+            </a:r>
+            <a:r>
+              <a:rPr lang="fr-FR" sz="2000" b="1" dirty="0" err="1" smtClean="0">
+                <a:solidFill>
+                  <a:srgbClr val="008000"/>
+                </a:solidFill>
+                <a:latin typeface="Courier New"/>
+                <a:cs typeface="Courier New"/>
+              </a:rPr>
+              <a:t>having</a:t>
+            </a:r>
+            <a:endParaRPr lang="fr-FR" sz="2000" b="1" dirty="0" smtClean="0">
+              <a:solidFill>
+                <a:srgbClr val="008000"/>
+              </a:solidFill>
+              <a:latin typeface="Courier New"/>
+              <a:cs typeface="Courier New"/>
+            </a:endParaRPr>
+          </a:p>
+          <a:p>
+            <a:pPr marL="0" indent="0">
+              <a:buNone/>
+            </a:pPr>
+            <a:r>
+              <a:rPr lang="fr-FR" sz="2000" b="1" dirty="0" smtClean="0">
+                <a:solidFill>
+                  <a:srgbClr val="008000"/>
+                </a:solidFill>
+                <a:latin typeface="Courier New"/>
+                <a:cs typeface="Courier New"/>
+              </a:rPr>
+              <a:t>// an </a:t>
+            </a:r>
+            <a:r>
+              <a:rPr lang="fr-FR" sz="2000" b="1" dirty="0" err="1" smtClean="0">
+                <a:solidFill>
+                  <a:srgbClr val="008000"/>
+                </a:solidFill>
+                <a:latin typeface="Courier New"/>
+                <a:cs typeface="Courier New"/>
+              </a:rPr>
+              <a:t>odd</a:t>
+            </a:r>
+            <a:r>
+              <a:rPr lang="fr-FR" sz="2000" b="1" dirty="0" smtClean="0">
+                <a:solidFill>
+                  <a:srgbClr val="008000"/>
+                </a:solidFill>
+                <a:latin typeface="Courier New"/>
+                <a:cs typeface="Courier New"/>
+              </a:rPr>
+              <a:t> or </a:t>
+            </a:r>
+            <a:r>
+              <a:rPr lang="fr-FR" sz="2000" b="1" dirty="0" err="1" smtClean="0">
+                <a:solidFill>
+                  <a:srgbClr val="008000"/>
+                </a:solidFill>
+                <a:latin typeface="Courier New"/>
+                <a:cs typeface="Courier New"/>
+              </a:rPr>
+              <a:t>even</a:t>
+            </a:r>
+            <a:r>
+              <a:rPr lang="fr-FR" sz="2000" b="1" dirty="0" smtClean="0">
+                <a:solidFill>
+                  <a:srgbClr val="008000"/>
+                </a:solidFill>
+                <a:latin typeface="Courier New"/>
+                <a:cs typeface="Courier New"/>
+              </a:rPr>
+              <a:t> </a:t>
+            </a:r>
+            <a:r>
+              <a:rPr lang="fr-FR" sz="2000" b="1" dirty="0" err="1" smtClean="0">
+                <a:solidFill>
+                  <a:srgbClr val="008000"/>
+                </a:solidFill>
+                <a:latin typeface="Courier New"/>
+                <a:cs typeface="Courier New"/>
+              </a:rPr>
+              <a:t>number</a:t>
+            </a:r>
+            <a:r>
+              <a:rPr lang="fr-FR" sz="2000" b="1" dirty="0" smtClean="0">
+                <a:solidFill>
+                  <a:srgbClr val="008000"/>
+                </a:solidFill>
+                <a:latin typeface="Courier New"/>
+                <a:cs typeface="Courier New"/>
+              </a:rPr>
+              <a:t> of ‘1’ bits</a:t>
+            </a:r>
+            <a:endParaRPr lang="en-GB" sz="2000" b="1" dirty="0" smtClean="0">
+              <a:solidFill>
+                <a:srgbClr val="008000"/>
+              </a:solidFill>
+              <a:latin typeface="Courier New"/>
+              <a:cs typeface="Courier New"/>
+            </a:endParaRPr>
+          </a:p>
+          <a:p>
+            <a:pPr marL="0" indent="0">
+              <a:buNone/>
+            </a:pPr>
+            <a:endParaRPr lang="en-GB" sz="2000" b="1" dirty="0"/>
+          </a:p>
+        </p:txBody>
+      </p:sp>
+      <p:sp>
+        <p:nvSpPr>
+          <p:cNvPr id="4" name="Slide Number Placeholder 3"/>
+          <p:cNvSpPr>
+            <a:spLocks noGrp="1"/>
+          </p:cNvSpPr>
+          <p:nvPr>
+            <p:ph type="sldNum" sz="quarter" idx="10"/>
+          </p:nvPr>
+        </p:nvSpPr>
+        <p:spPr/>
+        <p:txBody>
+          <a:bodyPr/>
+          <a:lstStyle/>
+          <a:p>
+            <a:fld id="{D9B8CB04-7B95-2844-BD15-B133C35E4786}" type="slidenum">
+              <a:rPr lang="en-GB" smtClean="0"/>
+              <a:pPr/>
+              <a:t>23</a:t>
+            </a:fld>
+            <a:endParaRPr lang="en-GB"/>
+          </a:p>
+        </p:txBody>
+      </p:sp>
+      <p:sp>
+        <p:nvSpPr>
+          <p:cNvPr id="5" name="Footer Placeholder 4"/>
+          <p:cNvSpPr>
+            <a:spLocks noGrp="1"/>
+          </p:cNvSpPr>
+          <p:nvPr>
+            <p:ph type="ftr" sz="quarter" idx="3"/>
+          </p:nvPr>
+        </p:nvSpPr>
+        <p:spPr/>
+        <p:txBody>
+          <a:bodyPr/>
+          <a:lstStyle/>
+          <a:p>
+            <a:r>
+              <a:rPr lang="en-US" smtClean="0"/>
+              <a:t>© Simon McIntosh-Smith</a:t>
+            </a:r>
+            <a:endParaRPr lang="en-US"/>
+          </a:p>
+        </p:txBody>
+      </p:sp>
+    </p:spTree>
+    <p:extLst>
+      <p:ext uri="{BB962C8B-B14F-4D97-AF65-F5344CB8AC3E}">
+        <p14:creationId xmlns:p14="http://schemas.microsoft.com/office/powerpoint/2010/main" val="2605028781"/>
+      </p:ext>
+    </p:extLst>
+  </p:cSld>
+  <p:clrMapOvr>
+    <a:masterClrMapping/>
+  </p:clrMapOvr>
+  <mc:AlternateContent xmlns:mc="http://schemas.openxmlformats.org/markup-compatibility/2006" xmlns:p14="http://schemas.microsoft.com/office/powerpoint/2010/main">
+    <mc:Choice Requires="p14">
+      <p:transition spd="slow" p14:dur="2000"/>
+    </mc:Choice>
+    <mc:Fallback xmlns="">
+      <p:transition xmlns:p14="http://schemas.microsoft.com/office/powerpoint/2010/main" spd="slow"/>
+    </mc:Fallback>
+  </mc:AlternateContent>
+</p:sld>
+</file>
+
+<file path=ppt/slides/slide24.xml><?xml version="1.0" encoding="utf-8"?>
+<p:sld xmlns:a="http://schemas.openxmlformats.org/drawingml/2006/main" xmlns:r="http://schemas.openxmlformats.org/officeDocument/2006/relationships" xmlns:p="http://schemas.openxmlformats.org/presentationml/2006/main">
+  <p:cSld>
+    <p:spTree>
+      <p:nvGrpSpPr>
+        <p:cNvPr id="1" name=""/>
+        <p:cNvGrpSpPr/>
+        <p:nvPr/>
+      </p:nvGrpSpPr>
+      <p:grpSpPr>
+        <a:xfrm>
+          <a:off x="0" y="0"/>
+          <a:ext cx="0" cy="0"/>
+          <a:chOff x="0" y="0"/>
+          <a:chExt cx="0" cy="0"/>
+        </a:xfrm>
+      </p:grpSpPr>
+      <p:sp>
+        <p:nvSpPr>
+          <p:cNvPr id="2" name="Title 1"/>
+          <p:cNvSpPr>
+            <a:spLocks noGrp="1"/>
+          </p:cNvSpPr>
+          <p:nvPr>
+            <p:ph type="title"/>
+          </p:nvPr>
+        </p:nvSpPr>
+        <p:spPr/>
+        <p:txBody>
+          <a:bodyPr/>
+          <a:lstStyle/>
+          <a:p>
+            <a:r>
+              <a:rPr lang="en-GB" dirty="0" smtClean="0"/>
+              <a:t>Software ECC exercise</a:t>
+            </a:r>
+            <a:endParaRPr lang="en-GB" dirty="0"/>
+          </a:p>
+        </p:txBody>
+      </p:sp>
+      <p:sp>
+        <p:nvSpPr>
+          <p:cNvPr id="3" name="Content Placeholder 2"/>
+          <p:cNvSpPr>
+            <a:spLocks noGrp="1"/>
+          </p:cNvSpPr>
+          <p:nvPr>
+            <p:ph idx="1"/>
+          </p:nvPr>
+        </p:nvSpPr>
+        <p:spPr/>
+        <p:txBody>
+          <a:bodyPr/>
+          <a:lstStyle/>
+          <a:p>
+            <a:r>
+              <a:rPr lang="en-GB" dirty="0" smtClean="0"/>
+              <a:t>TODO: hands-on exercise – implement ECC in simple CG using some library routines</a:t>
+            </a:r>
+            <a:endParaRPr lang="en-GB" dirty="0"/>
+          </a:p>
+        </p:txBody>
+      </p:sp>
+      <p:sp>
+        <p:nvSpPr>
+          <p:cNvPr id="4" name="Slide Number Placeholder 3"/>
+          <p:cNvSpPr>
+            <a:spLocks noGrp="1"/>
+          </p:cNvSpPr>
+          <p:nvPr>
+            <p:ph type="sldNum" sz="quarter" idx="10"/>
+          </p:nvPr>
+        </p:nvSpPr>
+        <p:spPr/>
+        <p:txBody>
+          <a:bodyPr/>
+          <a:lstStyle/>
+          <a:p>
+            <a:fld id="{D9B8CB04-7B95-2844-BD15-B133C35E4786}" type="slidenum">
+              <a:rPr lang="en-GB" smtClean="0"/>
+              <a:pPr/>
+              <a:t>24</a:t>
+            </a:fld>
+            <a:endParaRPr lang="en-GB"/>
+          </a:p>
+        </p:txBody>
+      </p:sp>
+    </p:spTree>
+    <p:extLst>
+      <p:ext uri="{BB962C8B-B14F-4D97-AF65-F5344CB8AC3E}">
+        <p14:creationId xmlns:p14="http://schemas.microsoft.com/office/powerpoint/2010/main" val="1795682848"/>
+      </p:ext>
+    </p:extLst>
+  </p:cSld>
+  <p:clrMapOvr>
+    <a:masterClrMapping/>
+  </p:clrMapOvr>
+  <mc:AlternateContent xmlns:mc="http://schemas.openxmlformats.org/markup-compatibility/2006" xmlns:p14="http://schemas.microsoft.com/office/powerpoint/2010/main">
+    <mc:Choice Requires="p14">
+      <p:transition spd="slow" p14:dur="2000"/>
+    </mc:Choice>
+    <mc:Fallback xmlns="">
+      <p:transition xmlns:p14="http://schemas.microsoft.com/office/powerpoint/2010/main" spd="slow"/>
+    </mc:Fallback>
+  </mc:AlternateContent>
+</p:sld>
+</file>
+
+<file path=ppt/slides/slide25.xml><?xml version="1.0" encoding="utf-8"?>
+<p:sld xmlns:a="http://schemas.openxmlformats.org/drawingml/2006/main" xmlns:r="http://schemas.openxmlformats.org/officeDocument/2006/relationships" xmlns:p="http://schemas.openxmlformats.org/presentationml/2006/main">
+  <p:cSld>
+    <p:spTree>
+      <p:nvGrpSpPr>
+        <p:cNvPr id="1" name=""/>
+        <p:cNvGrpSpPr/>
+        <p:nvPr/>
+      </p:nvGrpSpPr>
+      <p:grpSpPr>
+        <a:xfrm>
+          <a:off x="0" y="0"/>
+          <a:ext cx="0" cy="0"/>
+          <a:chOff x="0" y="0"/>
+          <a:chExt cx="0" cy="0"/>
+        </a:xfrm>
+      </p:grpSpPr>
+      <p:sp>
+        <p:nvSpPr>
+          <p:cNvPr id="2" name="Title 1"/>
+          <p:cNvSpPr>
+            <a:spLocks noGrp="1"/>
+          </p:cNvSpPr>
+          <p:nvPr>
+            <p:ph type="title"/>
+          </p:nvPr>
+        </p:nvSpPr>
+        <p:spPr/>
+        <p:txBody>
+          <a:bodyPr/>
+          <a:lstStyle/>
+          <a:p>
+            <a:r>
+              <a:rPr lang="en-GB" dirty="0" smtClean="0"/>
+              <a:t>Conclusions</a:t>
+            </a:r>
+            <a:endParaRPr lang="en-GB" dirty="0"/>
+          </a:p>
+        </p:txBody>
+      </p:sp>
+      <p:sp>
+        <p:nvSpPr>
+          <p:cNvPr id="3" name="Content Placeholder 2"/>
+          <p:cNvSpPr>
+            <a:spLocks noGrp="1"/>
+          </p:cNvSpPr>
+          <p:nvPr>
+            <p:ph idx="1"/>
+          </p:nvPr>
+        </p:nvSpPr>
+        <p:spPr/>
+        <p:txBody>
+          <a:bodyPr/>
+          <a:lstStyle/>
+          <a:p>
+            <a:r>
+              <a:rPr lang="en-GB" dirty="0" smtClean="0"/>
+              <a:t>TODO: Conclusions</a:t>
+            </a:r>
+            <a:endParaRPr lang="en-GB" dirty="0"/>
+          </a:p>
+        </p:txBody>
+      </p:sp>
+      <p:sp>
+        <p:nvSpPr>
+          <p:cNvPr id="4" name="Slide Number Placeholder 3"/>
+          <p:cNvSpPr>
+            <a:spLocks noGrp="1"/>
+          </p:cNvSpPr>
+          <p:nvPr>
+            <p:ph type="sldNum" sz="quarter" idx="10"/>
+          </p:nvPr>
+        </p:nvSpPr>
+        <p:spPr/>
+        <p:txBody>
+          <a:bodyPr/>
+          <a:lstStyle/>
+          <a:p>
+            <a:fld id="{D9B8CB04-7B95-2844-BD15-B133C35E4786}" type="slidenum">
+              <a:rPr lang="en-GB" smtClean="0"/>
+              <a:pPr/>
+              <a:t>25</a:t>
+            </a:fld>
+            <a:endParaRPr lang="en-GB"/>
+          </a:p>
+        </p:txBody>
+      </p:sp>
+    </p:spTree>
+    <p:extLst>
+      <p:ext uri="{BB962C8B-B14F-4D97-AF65-F5344CB8AC3E}">
+        <p14:creationId xmlns:p14="http://schemas.microsoft.com/office/powerpoint/2010/main" val="3370687389"/>
       </p:ext>
     </p:extLst>
   </p:cSld>

</xml_diff>

<commit_message>
Add slide describing SECDED
</commit_message>
<xml_diff>
--- a/abft-training.pptx
+++ b/abft-training.pptx
@@ -5,10 +5,10 @@
     <p:sldMasterId id="2147483649" r:id="rId3"/>
   </p:sldMasterIdLst>
   <p:notesMasterIdLst>
-    <p:notesMasterId r:id="rId45"/>
+    <p:notesMasterId r:id="rId46"/>
   </p:notesMasterIdLst>
   <p:handoutMasterIdLst>
-    <p:handoutMasterId r:id="rId46"/>
+    <p:handoutMasterId r:id="rId47"/>
   </p:handoutMasterIdLst>
   <p:sldIdLst>
     <p:sldId id="257" r:id="rId4"/>
@@ -49,9 +49,10 @@
     <p:sldId id="611" r:id="rId39"/>
     <p:sldId id="612" r:id="rId40"/>
     <p:sldId id="613" r:id="rId41"/>
-    <p:sldId id="614" r:id="rId42"/>
-    <p:sldId id="588" r:id="rId43"/>
-    <p:sldId id="589" r:id="rId44"/>
+    <p:sldId id="615" r:id="rId42"/>
+    <p:sldId id="614" r:id="rId43"/>
+    <p:sldId id="588" r:id="rId44"/>
+    <p:sldId id="589" r:id="rId45"/>
   </p:sldIdLst>
   <p:sldSz cx="9144000" cy="6858000" type="screen4x3"/>
   <p:notesSz cx="6858000" cy="9144000"/>
@@ -2819,6 +2820,91 @@
               <a:rPr lang="en-GB" smtClean="0"/>
               <a:pPr/>
               <a:t>38</a:t>
+            </a:fld>
+            <a:endParaRPr lang="en-GB"/>
+          </a:p>
+        </p:txBody>
+      </p:sp>
+    </p:spTree>
+    <p:extLst>
+      <p:ext uri="{BB962C8B-B14F-4D97-AF65-F5344CB8AC3E}">
+        <p14:creationId xmlns:p14="http://schemas.microsoft.com/office/powerpoint/2010/main" val="645188229"/>
+      </p:ext>
+    </p:extLst>
+  </p:cSld>
+  <p:clrMapOvr>
+    <a:masterClrMapping/>
+  </p:clrMapOvr>
+</p:notes>
+</file>
+
+<file path=ppt/notesSlides/notesSlide27.xml><?xml version="1.0" encoding="utf-8"?>
+<p:notes xmlns:a="http://schemas.openxmlformats.org/drawingml/2006/main" xmlns:r="http://schemas.openxmlformats.org/officeDocument/2006/relationships" xmlns:p="http://schemas.openxmlformats.org/presentationml/2006/main">
+  <p:cSld>
+    <p:spTree>
+      <p:nvGrpSpPr>
+        <p:cNvPr id="1" name=""/>
+        <p:cNvGrpSpPr/>
+        <p:nvPr/>
+      </p:nvGrpSpPr>
+      <p:grpSpPr>
+        <a:xfrm>
+          <a:off x="0" y="0"/>
+          <a:ext cx="0" cy="0"/>
+          <a:chOff x="0" y="0"/>
+          <a:chExt cx="0" cy="0"/>
+        </a:xfrm>
+      </p:grpSpPr>
+      <p:sp>
+        <p:nvSpPr>
+          <p:cNvPr id="2" name="Slide Image Placeholder 1"/>
+          <p:cNvSpPr>
+            <a:spLocks noGrp="1" noRot="1" noChangeAspect="1"/>
+          </p:cNvSpPr>
+          <p:nvPr>
+            <p:ph type="sldImg"/>
+          </p:nvPr>
+        </p:nvSpPr>
+        <p:spPr/>
+      </p:sp>
+      <p:sp>
+        <p:nvSpPr>
+          <p:cNvPr id="3" name="Notes Placeholder 2"/>
+          <p:cNvSpPr>
+            <a:spLocks noGrp="1"/>
+          </p:cNvSpPr>
+          <p:nvPr>
+            <p:ph type="body" idx="1"/>
+          </p:nvPr>
+        </p:nvSpPr>
+        <p:spPr/>
+        <p:txBody>
+          <a:bodyPr/>
+          <a:lstStyle/>
+          <a:p>
+            <a:endParaRPr lang="en-GB" dirty="0"/>
+          </a:p>
+        </p:txBody>
+      </p:sp>
+      <p:sp>
+        <p:nvSpPr>
+          <p:cNvPr id="4" name="Slide Number Placeholder 3"/>
+          <p:cNvSpPr>
+            <a:spLocks noGrp="1"/>
+          </p:cNvSpPr>
+          <p:nvPr>
+            <p:ph type="sldNum" sz="quarter" idx="10"/>
+          </p:nvPr>
+        </p:nvSpPr>
+        <p:spPr/>
+        <p:txBody>
+          <a:bodyPr/>
+          <a:lstStyle/>
+          <a:p>
+            <a:fld id="{1C811BE7-51AF-BD41-88D3-08D74CFB37BF}" type="slidenum">
+              <a:rPr lang="en-GB" smtClean="0"/>
+              <a:pPr/>
+              <a:t>39</a:t>
             </a:fld>
             <a:endParaRPr lang="en-GB"/>
           </a:p>
@@ -8213,7 +8299,6 @@
           <a:lstStyle/>
           <a:p>
             <a:pPr marL="0" indent="0" eaLnBrk="1" hangingPunct="1">
-              <a:buFontTx/>
               <a:buNone/>
             </a:pPr>
             <a:r>
@@ -8222,7 +8307,29 @@
                 <a:ea typeface="ＭＳ Ｐゴシック" charset="0"/>
                 <a:cs typeface="ＭＳ Ｐゴシック" charset="0"/>
               </a:rPr>
-              <a:t>Simon McIntosh</a:t>
+              <a:t>James Price</a:t>
+            </a:r>
+          </a:p>
+          <a:p>
+            <a:pPr marL="0" indent="0" eaLnBrk="1" hangingPunct="1">
+              <a:buFontTx/>
+              <a:buNone/>
+            </a:pPr>
+            <a:r>
+              <a:rPr lang="en-GB" sz="3600" dirty="0" smtClean="0">
+                <a:latin typeface="Arial" charset="0"/>
+                <a:ea typeface="ＭＳ Ｐゴシック" charset="0"/>
+                <a:cs typeface="ＭＳ Ｐゴシック" charset="0"/>
+              </a:rPr>
+              <a:t>Simon </a:t>
+            </a:r>
+            <a:r>
+              <a:rPr lang="en-GB" sz="3600" dirty="0">
+                <a:latin typeface="Arial" charset="0"/>
+                <a:ea typeface="ＭＳ Ｐゴシック" charset="0"/>
+                <a:cs typeface="ＭＳ Ｐゴシック" charset="0"/>
+              </a:rPr>
+              <a:t>McIntosh</a:t>
             </a:r>
             <a:r>
               <a:rPr lang="en-GB" sz="3600" dirty="0" smtClean="0">
@@ -8232,25 +8339,6 @@
               </a:rPr>
               <a:t>-Smith</a:t>
             </a:r>
-          </a:p>
-          <a:p>
-            <a:pPr marL="0" indent="0" eaLnBrk="1" hangingPunct="1">
-              <a:buFontTx/>
-              <a:buNone/>
-            </a:pPr>
-            <a:r>
-              <a:rPr lang="en-GB" sz="3600" dirty="0" smtClean="0">
-                <a:latin typeface="Arial" charset="0"/>
-                <a:ea typeface="ＭＳ Ｐゴシック" charset="0"/>
-                <a:cs typeface="ＭＳ Ｐゴシック" charset="0"/>
-              </a:rPr>
-              <a:t>James Price</a:t>
-            </a:r>
-            <a:endParaRPr lang="en-GB" sz="3600" dirty="0" smtClean="0">
-              <a:latin typeface="Arial" charset="0"/>
-              <a:ea typeface="ＭＳ Ｐゴシック" charset="0"/>
-              <a:cs typeface="ＭＳ Ｐゴシック" charset="0"/>
-            </a:endParaRPr>
           </a:p>
           <a:p>
             <a:pPr marL="0" indent="0" eaLnBrk="1" hangingPunct="1">
@@ -8278,29 +8366,64 @@
                 <a:ea typeface="ＭＳ Ｐゴシック" charset="0"/>
                 <a:cs typeface="ＭＳ Ｐゴシック" charset="0"/>
               </a:rPr>
-              <a:t>HPC Research Group</a:t>
+              <a:t>HPC Research </a:t>
+            </a:r>
+            <a:r>
+              <a:rPr lang="en-GB" dirty="0" smtClean="0">
+                <a:latin typeface="Arial" charset="0"/>
+                <a:ea typeface="ＭＳ Ｐゴシック" charset="0"/>
+                <a:cs typeface="ＭＳ Ｐゴシック" charset="0"/>
+              </a:rPr>
+              <a:t>Group</a:t>
             </a:r>
           </a:p>
           <a:p>
             <a:pPr marL="0" indent="0" eaLnBrk="1" hangingPunct="1">
-              <a:buFontTx/>
               <a:buNone/>
             </a:pPr>
             <a:r>
-              <a:rPr lang="en-GB" dirty="0" smtClean="0">
+              <a:rPr lang="en-GB" dirty="0">
                 <a:latin typeface="Arial" charset="0"/>
                 <a:ea typeface="ＭＳ Ｐゴシック" charset="0"/>
                 <a:cs typeface="ＭＳ Ｐゴシック" charset="0"/>
                 <a:hlinkClick r:id="rId3"/>
               </a:rPr>
-              <a:t>simonm@</a:t>
-            </a:r>
+              <a:t>j.price@bristol.ac.uk</a:t>
+            </a:r>
+            <a:r>
+              <a:rPr lang="en-GB" dirty="0">
+                <a:latin typeface="Arial" charset="0"/>
+                <a:ea typeface="ＭＳ Ｐゴシック" charset="0"/>
+                <a:cs typeface="ＭＳ Ｐゴシック" charset="0"/>
+              </a:rPr>
+              <a:t> </a:t>
+            </a:r>
+            <a:endParaRPr lang="en-GB" dirty="0" smtClean="0">
+              <a:latin typeface="Arial" charset="0"/>
+              <a:ea typeface="ＭＳ Ｐゴシック" charset="0"/>
+              <a:cs typeface="ＭＳ Ｐゴシック" charset="0"/>
+            </a:endParaRPr>
+          </a:p>
+          <a:p>
+            <a:pPr marL="0" indent="0" eaLnBrk="1" hangingPunct="1">
+              <a:buFontTx/>
+              <a:buNone/>
+            </a:pPr>
             <a:r>
               <a:rPr lang="en-GB" dirty="0" smtClean="0">
                 <a:latin typeface="Arial" charset="0"/>
                 <a:ea typeface="ＭＳ Ｐゴシック" charset="0"/>
                 <a:cs typeface="ＭＳ Ｐゴシック" charset="0"/>
-                <a:hlinkClick r:id="rId3"/>
+                <a:hlinkClick r:id="rId4"/>
+              </a:rPr>
+              <a:t>simonm@</a:t>
+            </a:r>
+            <a:r>
+              <a:rPr lang="en-GB" dirty="0" smtClean="0">
+                <a:latin typeface="Arial" charset="0"/>
+                <a:ea typeface="ＭＳ Ｐゴシック" charset="0"/>
+                <a:cs typeface="ＭＳ Ｐゴシック" charset="0"/>
+                <a:hlinkClick r:id="rId4"/>
               </a:rPr>
               <a:t>cs.bris.ac.uk</a:t>
             </a:r>
@@ -8312,34 +8435,6 @@
               </a:rPr>
               <a:t> </a:t>
             </a:r>
-          </a:p>
-          <a:p>
-            <a:pPr marL="0" indent="0" eaLnBrk="1" hangingPunct="1">
-              <a:buFontTx/>
-              <a:buNone/>
-            </a:pPr>
-            <a:r>
-              <a:rPr lang="en-GB" dirty="0" smtClean="0">
-                <a:latin typeface="Arial" charset="0"/>
-                <a:ea typeface="ＭＳ Ｐゴシック" charset="0"/>
-                <a:cs typeface="ＭＳ Ｐゴシック" charset="0"/>
-                <a:hlinkClick r:id="rId4"/>
-              </a:rPr>
-              <a:t>j.price@bristol.ac.uk</a:t>
-            </a:r>
-            <a:r>
-              <a:rPr lang="en-GB" dirty="0" smtClean="0">
-                <a:latin typeface="Arial" charset="0"/>
-                <a:ea typeface="ＭＳ Ｐゴシック" charset="0"/>
-                <a:cs typeface="ＭＳ Ｐゴシック" charset="0"/>
-              </a:rPr>
-              <a:t> </a:t>
-            </a:r>
-            <a:endParaRPr lang="en-GB" dirty="0">
-              <a:latin typeface="Arial" charset="0"/>
-              <a:ea typeface="ＭＳ Ｐゴシック" charset="0"/>
-              <a:cs typeface="ＭＳ Ｐゴシック" charset="0"/>
-            </a:endParaRPr>
           </a:p>
         </p:txBody>
       </p:sp>
@@ -8447,7 +8542,31 @@
                   <a:schemeClr val="tx1"/>
                 </a:solidFill>
               </a:rPr>
-              <a:t>Twitter: @</a:t>
+              <a:t>Twitter: </a:t>
+            </a:r>
+            <a:r>
+              <a:rPr lang="en-US" sz="1600" dirty="0" smtClean="0">
+                <a:solidFill>
+                  <a:schemeClr val="tx1"/>
+                </a:solidFill>
+              </a:rPr>
+              <a:t>@jrprice</a:t>
+            </a:r>
+            <a:r>
+              <a:rPr lang="en-US" sz="1600" dirty="0" smtClean="0">
+                <a:solidFill>
+                  <a:schemeClr val="tx1"/>
+                </a:solidFill>
+              </a:rPr>
+              <a:t>89 </a:t>
+            </a:r>
+            <a:r>
+              <a:rPr lang="en-US" sz="1600" dirty="0" smtClean="0">
+                <a:solidFill>
+                  <a:schemeClr val="tx1"/>
+                </a:solidFill>
+              </a:rPr>
+              <a:t>@</a:t>
             </a:r>
             <a:r>
               <a:rPr lang="en-US" sz="1600" dirty="0" err="1" smtClean="0">
@@ -8463,7 +8582,7 @@
                   <a:schemeClr val="tx1"/>
                 </a:solidFill>
               </a:rPr>
-              <a:t> @jrprice89     </a:t>
+              <a:t>     </a:t>
             </a:r>
             <a:r>
               <a:rPr lang="en-GB" sz="1600" dirty="0" smtClean="0">
@@ -13679,7 +13798,7 @@
             <a:r>
               <a:rPr lang="en-GB" b="1" dirty="0" smtClean="0">
                 <a:solidFill>
-                  <a:srgbClr val="3366FF"/>
+                  <a:srgbClr val="0000FF"/>
                 </a:solidFill>
               </a:rPr>
               <a:t>XOR</a:t>
@@ -38863,7 +38982,19 @@
             </a:r>
             <a:r>
               <a:rPr lang="en-GB" sz="2800" dirty="0" smtClean="0"/>
-              <a:t>indices, masking them out becomes a simple bitwise AND operation</a:t>
+              <a:t>indices, masking them out becomes a simple bitwise </a:t>
+            </a:r>
+            <a:r>
+              <a:rPr lang="en-GB" sz="2800" b="1" dirty="0" smtClean="0">
+                <a:solidFill>
+                  <a:srgbClr val="0000FF"/>
+                </a:solidFill>
+              </a:rPr>
+              <a:t>AND</a:t>
+            </a:r>
+            <a:r>
+              <a:rPr lang="en-GB" sz="2800" dirty="0" smtClean="0"/>
+              <a:t> operation</a:t>
             </a:r>
           </a:p>
         </p:txBody>
@@ -39888,10 +40019,10 @@
           <a:lstStyle/>
           <a:p>
             <a:r>
-              <a:rPr lang="en-GB" dirty="0" smtClean="0"/>
-              <a:t>Hamming codes</a:t>
-            </a:r>
-            <a:endParaRPr lang="en-GB" dirty="0"/>
+              <a:rPr lang="en-GB" sz="4000" dirty="0" smtClean="0"/>
+              <a:t>Hamming codes - SECDED</a:t>
+            </a:r>
+            <a:endParaRPr lang="en-GB" sz="4000" dirty="0"/>
           </a:p>
         </p:txBody>
       </p:sp>
@@ -39911,22 +40042,61 @@
           <a:lstStyle/>
           <a:p>
             <a:r>
-              <a:rPr lang="en-GB" dirty="0" smtClean="0"/>
-              <a:t>TODO: Example code for 8-bit SEC scheme?</a:t>
-            </a:r>
-          </a:p>
-          <a:p>
-            <a:r>
-              <a:rPr lang="en-GB" dirty="0" smtClean="0"/>
-              <a:t>TODO: Show some performance numbers?</a:t>
-            </a:r>
-          </a:p>
-          <a:p>
-            <a:r>
-              <a:rPr lang="en-GB" dirty="0" smtClean="0"/>
-              <a:t>TODO: SECDED</a:t>
-            </a:r>
-            <a:endParaRPr lang="en-GB" dirty="0"/>
+              <a:rPr lang="en-GB" sz="2400" dirty="0" smtClean="0"/>
+              <a:t>An alternative use of this overall parity bit would be to </a:t>
+            </a:r>
+            <a:r>
+              <a:rPr lang="en-GB" sz="2400" b="1" dirty="0" smtClean="0">
+                <a:solidFill>
+                  <a:srgbClr val="0000FF"/>
+                </a:solidFill>
+              </a:rPr>
+              <a:t>detect double-bit errors </a:t>
+            </a:r>
+            <a:r>
+              <a:rPr lang="en-GB" sz="2400" dirty="0" smtClean="0"/>
+              <a:t>(SECDED)</a:t>
+            </a:r>
+          </a:p>
+          <a:p>
+            <a:r>
+              <a:rPr lang="en-GB" sz="2400" dirty="0" smtClean="0"/>
+              <a:t>If the overall parity passes, but one of the other parity checks fails, then we have suffered a double-bit error</a:t>
+            </a:r>
+          </a:p>
+          <a:p>
+            <a:pPr lvl="1"/>
+            <a:r>
+              <a:rPr lang="en-GB" sz="2000" dirty="0" smtClean="0"/>
+              <a:t>We cannot correct this error, but we can fail gracefully</a:t>
+            </a:r>
+          </a:p>
+          <a:p>
+            <a:r>
+              <a:rPr lang="en-GB" sz="2400" dirty="0" smtClean="0"/>
+              <a:t>This requires that we always check all eight parity bits, so this is an expensive scheme</a:t>
+            </a:r>
+          </a:p>
+          <a:p>
+            <a:r>
+              <a:rPr lang="en-GB" sz="2400" dirty="0" smtClean="0"/>
+              <a:t>If we can assume that double-bit errors will always be consecutive, then we can use two overall parity bits to make this more efficient</a:t>
+            </a:r>
+          </a:p>
+          <a:p>
+            <a:pPr lvl="1"/>
+            <a:r>
+              <a:rPr lang="en-GB" sz="2000" dirty="0" smtClean="0"/>
+              <a:t>One will cover odd numbered bits, the other even numbered bits</a:t>
+            </a:r>
+          </a:p>
+          <a:p>
+            <a:pPr lvl="1"/>
+            <a:r>
+              <a:rPr lang="en-GB" sz="2000" dirty="0" smtClean="0"/>
+              <a:t>This now requires nine bits in total</a:t>
+            </a:r>
+            <a:endParaRPr lang="en-GB" sz="2000" dirty="0"/>
           </a:p>
         </p:txBody>
       </p:sp>
@@ -39957,7 +40127,7 @@
     </p:spTree>
     <p:extLst>
       <p:ext uri="{BB962C8B-B14F-4D97-AF65-F5344CB8AC3E}">
-        <p14:creationId xmlns:p14="http://schemas.microsoft.com/office/powerpoint/2010/main" val="2505041799"/>
+        <p14:creationId xmlns:p14="http://schemas.microsoft.com/office/powerpoint/2010/main" val="1612734937"/>
       </p:ext>
     </p:extLst>
   </p:cSld>
@@ -40238,7 +40408,7 @@
           <a:p>
             <a:r>
               <a:rPr lang="en-GB" dirty="0" smtClean="0"/>
-              <a:t>Software ECC exercise</a:t>
+              <a:t>Hamming codes</a:t>
             </a:r>
             <a:endParaRPr lang="en-GB" dirty="0"/>
           </a:p>
@@ -40261,9 +40431,20 @@
           <a:p>
             <a:r>
               <a:rPr lang="en-GB" dirty="0" smtClean="0"/>
-              <a:t>TODO: hands-on exercise – implement ECC in simple CG using some library routines</a:t>
-            </a:r>
-            <a:endParaRPr lang="en-GB" dirty="0"/>
+              <a:t>TODO: Example code for 8-bit SEC scheme?</a:t>
+            </a:r>
+          </a:p>
+          <a:p>
+            <a:r>
+              <a:rPr lang="en-GB" dirty="0" smtClean="0"/>
+              <a:t>TODO: Example code for SECDED schemes?</a:t>
+            </a:r>
+          </a:p>
+          <a:p>
+            <a:r>
+              <a:rPr lang="en-GB" dirty="0" smtClean="0"/>
+              <a:t>TODO: Show some performance numbers?</a:t>
+            </a:r>
           </a:p>
         </p:txBody>
       </p:sp>
@@ -40294,7 +40475,7 @@
     </p:spTree>
     <p:extLst>
       <p:ext uri="{BB962C8B-B14F-4D97-AF65-F5344CB8AC3E}">
-        <p14:creationId xmlns:p14="http://schemas.microsoft.com/office/powerpoint/2010/main" val="1795682848"/>
+        <p14:creationId xmlns:p14="http://schemas.microsoft.com/office/powerpoint/2010/main" val="2505041799"/>
       </p:ext>
     </p:extLst>
   </p:cSld>
@@ -40346,7 +40527,7 @@
           <a:p>
             <a:r>
               <a:rPr lang="en-GB" dirty="0" smtClean="0"/>
-              <a:t>Conclusions</a:t>
+              <a:t>Software ECC exercise</a:t>
             </a:r>
             <a:endParaRPr lang="en-GB" dirty="0"/>
           </a:p>
@@ -40369,7 +40550,7 @@
           <a:p>
             <a:r>
               <a:rPr lang="en-GB" dirty="0" smtClean="0"/>
-              <a:t>TODO: Conclusions</a:t>
+              <a:t>TODO: hands-on exercise – implement ECC in simple CG using some library routines</a:t>
             </a:r>
             <a:endParaRPr lang="en-GB" dirty="0"/>
           </a:p>
@@ -40394,6 +40575,114 @@
               <a:rPr lang="en-GB" smtClean="0"/>
               <a:pPr/>
               <a:t>41</a:t>
+            </a:fld>
+            <a:endParaRPr lang="en-GB"/>
+          </a:p>
+        </p:txBody>
+      </p:sp>
+    </p:spTree>
+    <p:extLst>
+      <p:ext uri="{BB962C8B-B14F-4D97-AF65-F5344CB8AC3E}">
+        <p14:creationId xmlns:p14="http://schemas.microsoft.com/office/powerpoint/2010/main" val="1795682848"/>
+      </p:ext>
+    </p:extLst>
+  </p:cSld>
+  <p:clrMapOvr>
+    <a:masterClrMapping/>
+  </p:clrMapOvr>
+  <mc:AlternateContent xmlns:mc="http://schemas.openxmlformats.org/markup-compatibility/2006" xmlns:p14="http://schemas.microsoft.com/office/powerpoint/2010/main">
+    <mc:Choice Requires="p14">
+      <p:transition spd="slow" p14:dur="2000"/>
+    </mc:Choice>
+    <mc:Fallback xmlns="">
+      <p:transition xmlns:p14="http://schemas.microsoft.com/office/powerpoint/2010/main" spd="slow"/>
+    </mc:Fallback>
+  </mc:AlternateContent>
+</p:sld>
+</file>
+
+<file path=ppt/slides/slide42.xml><?xml version="1.0" encoding="utf-8"?>
+<p:sld xmlns:a="http://schemas.openxmlformats.org/drawingml/2006/main" xmlns:r="http://schemas.openxmlformats.org/officeDocument/2006/relationships" xmlns:p="http://schemas.openxmlformats.org/presentationml/2006/main">
+  <p:cSld>
+    <p:spTree>
+      <p:nvGrpSpPr>
+        <p:cNvPr id="1" name=""/>
+        <p:cNvGrpSpPr/>
+        <p:nvPr/>
+      </p:nvGrpSpPr>
+      <p:grpSpPr>
+        <a:xfrm>
+          <a:off x="0" y="0"/>
+          <a:ext cx="0" cy="0"/>
+          <a:chOff x="0" y="0"/>
+          <a:chExt cx="0" cy="0"/>
+        </a:xfrm>
+      </p:grpSpPr>
+      <p:sp>
+        <p:nvSpPr>
+          <p:cNvPr id="2" name="Title 1"/>
+          <p:cNvSpPr>
+            <a:spLocks noGrp="1"/>
+          </p:cNvSpPr>
+          <p:nvPr>
+            <p:ph type="title"/>
+          </p:nvPr>
+        </p:nvSpPr>
+        <p:spPr/>
+        <p:txBody>
+          <a:bodyPr/>
+          <a:lstStyle/>
+          <a:p>
+            <a:r>
+              <a:rPr lang="en-GB" dirty="0" smtClean="0"/>
+              <a:t>Conclusions</a:t>
+            </a:r>
+            <a:endParaRPr lang="en-GB" dirty="0"/>
+          </a:p>
+        </p:txBody>
+      </p:sp>
+      <p:sp>
+        <p:nvSpPr>
+          <p:cNvPr id="3" name="Content Placeholder 2"/>
+          <p:cNvSpPr>
+            <a:spLocks noGrp="1"/>
+          </p:cNvSpPr>
+          <p:nvPr>
+            <p:ph idx="1"/>
+          </p:nvPr>
+        </p:nvSpPr>
+        <p:spPr/>
+        <p:txBody>
+          <a:bodyPr/>
+          <a:lstStyle/>
+          <a:p>
+            <a:r>
+              <a:rPr lang="en-GB" dirty="0" smtClean="0"/>
+              <a:t>TODO: Conclusions</a:t>
+            </a:r>
+            <a:endParaRPr lang="en-GB" dirty="0"/>
+          </a:p>
+        </p:txBody>
+      </p:sp>
+      <p:sp>
+        <p:nvSpPr>
+          <p:cNvPr id="4" name="Slide Number Placeholder 3"/>
+          <p:cNvSpPr>
+            <a:spLocks noGrp="1"/>
+          </p:cNvSpPr>
+          <p:nvPr>
+            <p:ph type="sldNum" sz="quarter" idx="10"/>
+          </p:nvPr>
+        </p:nvSpPr>
+        <p:spPr/>
+        <p:txBody>
+          <a:bodyPr/>
+          <a:lstStyle/>
+          <a:p>
+            <a:fld id="{D9B8CB04-7B95-2844-BD15-B133C35E4786}" type="slidenum">
+              <a:rPr lang="en-GB" smtClean="0"/>
+              <a:pPr/>
+              <a:t>42</a:t>
             </a:fld>
             <a:endParaRPr lang="en-GB"/>
           </a:p>

</xml_diff>

<commit_message>
Animate parity and hamming slides
</commit_message>
<xml_diff>
--- a/abft-training.pptx
+++ b/abft-training.pptx
@@ -300,7 +300,7 @@
             <a:fld id="{36830665-627D-8446-BB4C-F734FB643EF0}" type="datetime1">
               <a:rPr lang="en-US"/>
               <a:pPr/>
-              <a:t>04/04/16</a:t>
+              <a:t>09/04/16</a:t>
             </a:fld>
             <a:endParaRPr lang="en-US"/>
           </a:p>
@@ -1506,14 +1506,6 @@
           <a:bodyPr/>
           <a:lstStyle/>
           <a:p>
-            <a:r>
-              <a:rPr lang="en-GB" dirty="0" smtClean="0"/>
-              <a:t>TODO: Animate</a:t>
-            </a:r>
-            <a:r>
-              <a:rPr lang="en-GB" baseline="0" dirty="0" smtClean="0"/>
-              <a:t> – incremental reveal</a:t>
-            </a:r>
             <a:endParaRPr lang="en-GB" dirty="0"/>
           </a:p>
         </p:txBody>
@@ -1779,11 +1771,11 @@
           <a:p>
             <a:r>
               <a:rPr lang="en-GB" dirty="0" smtClean="0"/>
-              <a:t>TODO: Animate</a:t>
+              <a:t>This illustrates the way that each bit</a:t>
             </a:r>
             <a:r>
               <a:rPr lang="en-GB" baseline="0" dirty="0" smtClean="0"/>
-              <a:t> – incremental reveal</a:t>
+              <a:t> is protected by a unique set of parity bits</a:t>
             </a:r>
             <a:endParaRPr lang="en-GB" dirty="0"/>
           </a:p>
@@ -1807,7 +1799,7 @@
             <a:fld id="{1C811BE7-51AF-BD41-88D3-08D74CFB37BF}" type="slidenum">
               <a:rPr lang="en-GB" smtClean="0"/>
               <a:pPr/>
-              <a:t>26</a:t>
+              <a:t>25</a:t>
             </a:fld>
             <a:endParaRPr lang="en-GB"/>
           </a:p>
@@ -1816,7 +1808,7 @@
     </p:spTree>
     <p:extLst>
       <p:ext uri="{BB962C8B-B14F-4D97-AF65-F5344CB8AC3E}">
-        <p14:creationId xmlns:p14="http://schemas.microsoft.com/office/powerpoint/2010/main" val="2442681378"/>
+        <p14:creationId xmlns:p14="http://schemas.microsoft.com/office/powerpoint/2010/main" val="2403286589"/>
       </p:ext>
     </p:extLst>
   </p:cSld>
@@ -1870,14 +1862,6 @@
           <a:bodyPr/>
           <a:lstStyle/>
           <a:p>
-            <a:r>
-              <a:rPr lang="en-GB" dirty="0" smtClean="0"/>
-              <a:t>TODO: Animate</a:t>
-            </a:r>
-            <a:r>
-              <a:rPr lang="en-GB" baseline="0" dirty="0" smtClean="0"/>
-              <a:t> – incremental reveal</a:t>
-            </a:r>
             <a:endParaRPr lang="en-GB" dirty="0"/>
           </a:p>
         </p:txBody>
@@ -1900,7 +1884,7 @@
             <a:fld id="{1C811BE7-51AF-BD41-88D3-08D74CFB37BF}" type="slidenum">
               <a:rPr lang="en-GB" smtClean="0"/>
               <a:pPr/>
-              <a:t>27</a:t>
+              <a:t>26</a:t>
             </a:fld>
             <a:endParaRPr lang="en-GB"/>
           </a:p>
@@ -1993,7 +1977,7 @@
             <a:fld id="{1C811BE7-51AF-BD41-88D3-08D74CFB37BF}" type="slidenum">
               <a:rPr lang="en-GB" smtClean="0"/>
               <a:pPr/>
-              <a:t>28</a:t>
+              <a:t>27</a:t>
             </a:fld>
             <a:endParaRPr lang="en-GB"/>
           </a:p>
@@ -2056,14 +2040,6 @@
           <a:bodyPr/>
           <a:lstStyle/>
           <a:p>
-            <a:r>
-              <a:rPr lang="en-GB" dirty="0" smtClean="0"/>
-              <a:t>TODO: Animate</a:t>
-            </a:r>
-            <a:r>
-              <a:rPr lang="en-GB" baseline="0" dirty="0" smtClean="0"/>
-              <a:t> – incremental reveal</a:t>
-            </a:r>
             <a:endParaRPr lang="en-GB" dirty="0"/>
           </a:p>
         </p:txBody>
@@ -2086,7 +2062,7 @@
             <a:fld id="{1C811BE7-51AF-BD41-88D3-08D74CFB37BF}" type="slidenum">
               <a:rPr lang="en-GB" smtClean="0"/>
               <a:pPr/>
-              <a:t>29</a:t>
+              <a:t>28</a:t>
             </a:fld>
             <a:endParaRPr lang="en-GB"/>
           </a:p>
@@ -2239,14 +2215,6 @@
           <a:bodyPr/>
           <a:lstStyle/>
           <a:p>
-            <a:r>
-              <a:rPr lang="en-GB" dirty="0" smtClean="0"/>
-              <a:t>TODO: Animate</a:t>
-            </a:r>
-            <a:r>
-              <a:rPr lang="en-GB" baseline="0" dirty="0" smtClean="0"/>
-              <a:t> – incremental reveal</a:t>
-            </a:r>
             <a:endParaRPr lang="en-GB" dirty="0"/>
           </a:p>
         </p:txBody>
@@ -2269,7 +2237,7 @@
             <a:fld id="{1C811BE7-51AF-BD41-88D3-08D74CFB37BF}" type="slidenum">
               <a:rPr lang="en-GB" smtClean="0"/>
               <a:pPr/>
-              <a:t>30</a:t>
+              <a:t>29</a:t>
             </a:fld>
             <a:endParaRPr lang="en-GB"/>
           </a:p>
@@ -2332,14 +2300,6 @@
           <a:bodyPr/>
           <a:lstStyle/>
           <a:p>
-            <a:r>
-              <a:rPr lang="en-GB" dirty="0" smtClean="0"/>
-              <a:t>TODO: Animate</a:t>
-            </a:r>
-            <a:r>
-              <a:rPr lang="en-GB" baseline="0" dirty="0" smtClean="0"/>
-              <a:t> – incremental reveal</a:t>
-            </a:r>
             <a:endParaRPr lang="en-GB" dirty="0"/>
           </a:p>
         </p:txBody>
@@ -2362,7 +2322,7 @@
             <a:fld id="{1C811BE7-51AF-BD41-88D3-08D74CFB37BF}" type="slidenum">
               <a:rPr lang="en-GB" smtClean="0"/>
               <a:pPr/>
-              <a:t>31</a:t>
+              <a:t>30</a:t>
             </a:fld>
             <a:endParaRPr lang="en-GB"/>
           </a:p>
@@ -2425,14 +2385,6 @@
           <a:bodyPr/>
           <a:lstStyle/>
           <a:p>
-            <a:r>
-              <a:rPr lang="en-GB" dirty="0" smtClean="0"/>
-              <a:t>TODO: Animate</a:t>
-            </a:r>
-            <a:r>
-              <a:rPr lang="en-GB" baseline="0" dirty="0" smtClean="0"/>
-              <a:t> – incremental reveal</a:t>
-            </a:r>
             <a:endParaRPr lang="en-GB" dirty="0"/>
           </a:p>
         </p:txBody>
@@ -2455,7 +2407,7 @@
             <a:fld id="{1C811BE7-51AF-BD41-88D3-08D74CFB37BF}" type="slidenum">
               <a:rPr lang="en-GB" smtClean="0"/>
               <a:pPr/>
-              <a:t>32</a:t>
+              <a:t>31</a:t>
             </a:fld>
             <a:endParaRPr lang="en-GB"/>
           </a:p>
@@ -2518,14 +2470,6 @@
           <a:bodyPr/>
           <a:lstStyle/>
           <a:p>
-            <a:r>
-              <a:rPr lang="en-GB" dirty="0" smtClean="0"/>
-              <a:t>TODO: Animate</a:t>
-            </a:r>
-            <a:r>
-              <a:rPr lang="en-GB" baseline="0" dirty="0" smtClean="0"/>
-              <a:t> – incremental reveal</a:t>
-            </a:r>
             <a:endParaRPr lang="en-GB" dirty="0"/>
           </a:p>
         </p:txBody>
@@ -2548,7 +2492,7 @@
             <a:fld id="{1C811BE7-51AF-BD41-88D3-08D74CFB37BF}" type="slidenum">
               <a:rPr lang="en-GB" smtClean="0"/>
               <a:pPr/>
-              <a:t>33</a:t>
+              <a:t>32</a:t>
             </a:fld>
             <a:endParaRPr lang="en-GB"/>
           </a:p>
@@ -2611,14 +2555,6 @@
           <a:bodyPr/>
           <a:lstStyle/>
           <a:p>
-            <a:r>
-              <a:rPr lang="en-GB" dirty="0" smtClean="0"/>
-              <a:t>TODO: Animate</a:t>
-            </a:r>
-            <a:r>
-              <a:rPr lang="en-GB" baseline="0" dirty="0" smtClean="0"/>
-              <a:t> – incremental reveal</a:t>
-            </a:r>
             <a:endParaRPr lang="en-GB" dirty="0"/>
           </a:p>
         </p:txBody>
@@ -2641,7 +2577,7 @@
             <a:fld id="{1C811BE7-51AF-BD41-88D3-08D74CFB37BF}" type="slidenum">
               <a:rPr lang="en-GB" smtClean="0"/>
               <a:pPr/>
-              <a:t>34</a:t>
+              <a:t>33</a:t>
             </a:fld>
             <a:endParaRPr lang="en-GB"/>
           </a:p>
@@ -2726,7 +2662,7 @@
             <a:fld id="{1C811BE7-51AF-BD41-88D3-08D74CFB37BF}" type="slidenum">
               <a:rPr lang="en-GB" smtClean="0"/>
               <a:pPr/>
-              <a:t>37</a:t>
+              <a:t>34</a:t>
             </a:fld>
             <a:endParaRPr lang="en-GB"/>
           </a:p>
@@ -2735,7 +2671,7 @@
     </p:spTree>
     <p:extLst>
       <p:ext uri="{BB962C8B-B14F-4D97-AF65-F5344CB8AC3E}">
-        <p14:creationId xmlns:p14="http://schemas.microsoft.com/office/powerpoint/2010/main" val="2174565375"/>
+        <p14:creationId xmlns:p14="http://schemas.microsoft.com/office/powerpoint/2010/main" val="2442681378"/>
       </p:ext>
     </p:extLst>
   </p:cSld>
@@ -2789,6 +2725,91 @@
           <a:bodyPr/>
           <a:lstStyle/>
           <a:p>
+            <a:endParaRPr lang="en-GB" dirty="0"/>
+          </a:p>
+        </p:txBody>
+      </p:sp>
+      <p:sp>
+        <p:nvSpPr>
+          <p:cNvPr id="4" name="Slide Number Placeholder 3"/>
+          <p:cNvSpPr>
+            <a:spLocks noGrp="1"/>
+          </p:cNvSpPr>
+          <p:nvPr>
+            <p:ph type="sldNum" sz="quarter" idx="10"/>
+          </p:nvPr>
+        </p:nvSpPr>
+        <p:spPr/>
+        <p:txBody>
+          <a:bodyPr/>
+          <a:lstStyle/>
+          <a:p>
+            <a:fld id="{1C811BE7-51AF-BD41-88D3-08D74CFB37BF}" type="slidenum">
+              <a:rPr lang="en-GB" smtClean="0"/>
+              <a:pPr/>
+              <a:t>37</a:t>
+            </a:fld>
+            <a:endParaRPr lang="en-GB"/>
+          </a:p>
+        </p:txBody>
+      </p:sp>
+    </p:spTree>
+    <p:extLst>
+      <p:ext uri="{BB962C8B-B14F-4D97-AF65-F5344CB8AC3E}">
+        <p14:creationId xmlns:p14="http://schemas.microsoft.com/office/powerpoint/2010/main" val="2174565375"/>
+      </p:ext>
+    </p:extLst>
+  </p:cSld>
+  <p:clrMapOvr>
+    <a:masterClrMapping/>
+  </p:clrMapOvr>
+</p:notes>
+</file>
+
+<file path=ppt/notesSlides/notesSlide27.xml><?xml version="1.0" encoding="utf-8"?>
+<p:notes xmlns:a="http://schemas.openxmlformats.org/drawingml/2006/main" xmlns:r="http://schemas.openxmlformats.org/officeDocument/2006/relationships" xmlns:p="http://schemas.openxmlformats.org/presentationml/2006/main">
+  <p:cSld>
+    <p:spTree>
+      <p:nvGrpSpPr>
+        <p:cNvPr id="1" name=""/>
+        <p:cNvGrpSpPr/>
+        <p:nvPr/>
+      </p:nvGrpSpPr>
+      <p:grpSpPr>
+        <a:xfrm>
+          <a:off x="0" y="0"/>
+          <a:ext cx="0" cy="0"/>
+          <a:chOff x="0" y="0"/>
+          <a:chExt cx="0" cy="0"/>
+        </a:xfrm>
+      </p:grpSpPr>
+      <p:sp>
+        <p:nvSpPr>
+          <p:cNvPr id="2" name="Slide Image Placeholder 1"/>
+          <p:cNvSpPr>
+            <a:spLocks noGrp="1" noRot="1" noChangeAspect="1"/>
+          </p:cNvSpPr>
+          <p:nvPr>
+            <p:ph type="sldImg"/>
+          </p:nvPr>
+        </p:nvSpPr>
+        <p:spPr/>
+      </p:sp>
+      <p:sp>
+        <p:nvSpPr>
+          <p:cNvPr id="3" name="Notes Placeholder 2"/>
+          <p:cNvSpPr>
+            <a:spLocks noGrp="1"/>
+          </p:cNvSpPr>
+          <p:nvPr>
+            <p:ph type="body" idx="1"/>
+          </p:nvPr>
+        </p:nvSpPr>
+        <p:spPr/>
+        <p:txBody>
+          <a:bodyPr/>
+          <a:lstStyle/>
+          <a:p>
             <a:r>
               <a:rPr lang="en-GB" dirty="0" smtClean="0"/>
               <a:t>Since data corruption should be very infrequent,</a:t>
@@ -2838,7 +2859,7 @@
 </p:notes>
 </file>
 
-<file path=ppt/notesSlides/notesSlide27.xml><?xml version="1.0" encoding="utf-8"?>
+<file path=ppt/notesSlides/notesSlide28.xml><?xml version="1.0" encoding="utf-8"?>
 <p:notes xmlns:a="http://schemas.openxmlformats.org/drawingml/2006/main" xmlns:r="http://schemas.openxmlformats.org/officeDocument/2006/relationships" xmlns:p="http://schemas.openxmlformats.org/presentationml/2006/main">
   <p:cSld>
     <p:spTree>
@@ -8366,15 +8387,7 @@
                 <a:ea typeface="ＭＳ Ｐゴシック" charset="0"/>
                 <a:cs typeface="ＭＳ Ｐゴシック" charset="0"/>
               </a:rPr>
-              <a:t>HPC Research </a:t>
-            </a:r>
-            <a:r>
-              <a:rPr lang="en-GB" dirty="0" smtClean="0">
-                <a:latin typeface="Arial" charset="0"/>
-                <a:ea typeface="ＭＳ Ｐゴシック" charset="0"/>
-                <a:cs typeface="ＭＳ Ｐゴシック" charset="0"/>
-              </a:rPr>
-              <a:t>Group</a:t>
+              <a:t>HPC Research Group</a:t>
             </a:r>
           </a:p>
           <a:p>
@@ -8416,16 +8429,7 @@
                 <a:cs typeface="ＭＳ Ｐゴシック" charset="0"/>
                 <a:hlinkClick r:id="rId4"/>
               </a:rPr>
-              <a:t>simonm@</a:t>
-            </a:r>
-            <a:r>
-              <a:rPr lang="en-GB" dirty="0" smtClean="0">
-                <a:latin typeface="Arial" charset="0"/>
-                <a:ea typeface="ＭＳ Ｐゴシック" charset="0"/>
-                <a:cs typeface="ＭＳ Ｐゴシック" charset="0"/>
-                <a:hlinkClick r:id="rId4"/>
-              </a:rPr>
-              <a:t>cs.bris.ac.uk</a:t>
+              <a:t>simonm@cs.bris.ac.uk</a:t>
             </a:r>
             <a:r>
               <a:rPr lang="en-GB" dirty="0" smtClean="0">
@@ -8542,31 +8546,7 @@
                   <a:schemeClr val="tx1"/>
                 </a:solidFill>
               </a:rPr>
-              <a:t>Twitter: </a:t>
-            </a:r>
-            <a:r>
-              <a:rPr lang="en-US" sz="1600" dirty="0" smtClean="0">
-                <a:solidFill>
-                  <a:schemeClr val="tx1"/>
-                </a:solidFill>
-              </a:rPr>
-              <a:t>@jrprice</a:t>
-            </a:r>
-            <a:r>
-              <a:rPr lang="en-US" sz="1600" dirty="0" smtClean="0">
-                <a:solidFill>
-                  <a:schemeClr val="tx1"/>
-                </a:solidFill>
-              </a:rPr>
-              <a:t>89 </a:t>
-            </a:r>
-            <a:r>
-              <a:rPr lang="en-US" sz="1600" dirty="0" smtClean="0">
-                <a:solidFill>
-                  <a:schemeClr val="tx1"/>
-                </a:solidFill>
-              </a:rPr>
-              <a:t>@</a:t>
+              <a:t>Twitter: @jrprice89 @</a:t>
             </a:r>
             <a:r>
               <a:rPr lang="en-US" sz="1600" dirty="0" err="1" smtClean="0">
@@ -10364,7 +10344,6 @@
               <a:rPr lang="en-GB" dirty="0" smtClean="0"/>
               <a:t>manner</a:t>
             </a:r>
-            <a:endParaRPr lang="en-GB" dirty="0" smtClean="0"/>
           </a:p>
           <a:p>
             <a:pPr marL="0" indent="0">
@@ -11646,6 +11625,13 @@
       <p:transition xmlns:p14="http://schemas.microsoft.com/office/powerpoint/2010/main" spd="slow"/>
     </mc:Fallback>
   </mc:AlternateContent>
+  <p:timing>
+    <p:tnLst>
+      <p:par>
+        <p:cTn xmlns:p14="http://schemas.microsoft.com/office/powerpoint/2010/main" id="1" dur="indefinite" restart="never" nodeType="tmRoot"/>
+      </p:par>
+    </p:tnLst>
+  </p:timing>
 </p:sld>
 </file>
 
@@ -11807,7 +11793,6 @@
                 <a:rPr lang="en-GB" dirty="0"/>
                 <a:t>1</a:t>
               </a:r>
-              <a:endParaRPr lang="en-GB" dirty="0"/>
             </a:p>
           </p:txBody>
         </p:sp>
@@ -11851,7 +11836,6 @@
                 <a:rPr lang="en-GB" dirty="0"/>
                 <a:t>1</a:t>
               </a:r>
-              <a:endParaRPr lang="en-GB" dirty="0"/>
             </a:p>
           </p:txBody>
         </p:sp>
@@ -11939,7 +11923,6 @@
                 <a:rPr lang="en-GB" dirty="0"/>
                 <a:t>1</a:t>
               </a:r>
-              <a:endParaRPr lang="en-GB" dirty="0"/>
             </a:p>
           </p:txBody>
         </p:sp>
@@ -11983,7 +11966,6 @@
                 <a:rPr lang="en-GB" dirty="0"/>
                 <a:t>1</a:t>
               </a:r>
-              <a:endParaRPr lang="en-GB" dirty="0"/>
             </a:p>
           </p:txBody>
         </p:sp>
@@ -12071,7 +12053,6 @@
                 <a:rPr lang="en-GB" dirty="0"/>
                 <a:t>1</a:t>
               </a:r>
-              <a:endParaRPr lang="en-GB" dirty="0"/>
             </a:p>
           </p:txBody>
         </p:sp>
@@ -12182,7 +12163,6 @@
                 <a:rPr lang="en-GB" dirty="0"/>
                 <a:t>1</a:t>
               </a:r>
-              <a:endParaRPr lang="en-GB" dirty="0"/>
             </a:p>
           </p:txBody>
         </p:sp>
@@ -12226,7 +12206,6 @@
                 <a:rPr lang="en-GB" dirty="0"/>
                 <a:t>1</a:t>
               </a:r>
-              <a:endParaRPr lang="en-GB" dirty="0"/>
             </a:p>
           </p:txBody>
         </p:sp>
@@ -12314,7 +12293,6 @@
                 <a:rPr lang="en-GB" dirty="0"/>
                 <a:t>1</a:t>
               </a:r>
-              <a:endParaRPr lang="en-GB" dirty="0"/>
             </a:p>
           </p:txBody>
         </p:sp>
@@ -12358,7 +12336,6 @@
                 <a:rPr lang="en-GB" dirty="0"/>
                 <a:t>1</a:t>
               </a:r>
-              <a:endParaRPr lang="en-GB" dirty="0"/>
             </a:p>
           </p:txBody>
         </p:sp>
@@ -12446,7 +12423,6 @@
                 <a:rPr lang="en-GB" dirty="0"/>
                 <a:t>1</a:t>
               </a:r>
-              <a:endParaRPr lang="en-GB" dirty="0"/>
             </a:p>
           </p:txBody>
         </p:sp>
@@ -12557,7 +12533,6 @@
                 <a:rPr lang="en-GB" dirty="0"/>
                 <a:t>1</a:t>
               </a:r>
-              <a:endParaRPr lang="en-GB" dirty="0"/>
             </a:p>
           </p:txBody>
         </p:sp>
@@ -12601,7 +12576,6 @@
                 <a:rPr lang="en-GB" dirty="0"/>
                 <a:t>1</a:t>
               </a:r>
-              <a:endParaRPr lang="en-GB" dirty="0"/>
             </a:p>
           </p:txBody>
         </p:sp>
@@ -12689,7 +12663,6 @@
                 <a:rPr lang="en-GB" dirty="0"/>
                 <a:t>1</a:t>
               </a:r>
-              <a:endParaRPr lang="en-GB" dirty="0"/>
             </a:p>
           </p:txBody>
         </p:sp>
@@ -12733,7 +12706,6 @@
                 <a:rPr lang="en-GB" dirty="0"/>
                 <a:t>1</a:t>
               </a:r>
-              <a:endParaRPr lang="en-GB" dirty="0"/>
             </a:p>
           </p:txBody>
         </p:sp>
@@ -12821,7 +12793,6 @@
                 <a:rPr lang="en-GB" dirty="0"/>
                 <a:t>1</a:t>
               </a:r>
-              <a:endParaRPr lang="en-GB" dirty="0"/>
             </a:p>
           </p:txBody>
         </p:sp>
@@ -12932,7 +12903,6 @@
                 <a:rPr lang="en-GB" dirty="0"/>
                 <a:t>1</a:t>
               </a:r>
-              <a:endParaRPr lang="en-GB" dirty="0"/>
             </a:p>
           </p:txBody>
         </p:sp>
@@ -12976,7 +12946,6 @@
                 <a:rPr lang="en-GB" dirty="0"/>
                 <a:t>1</a:t>
               </a:r>
-              <a:endParaRPr lang="en-GB" dirty="0"/>
             </a:p>
           </p:txBody>
         </p:sp>
@@ -13064,7 +13033,6 @@
                 <a:rPr lang="en-GB" dirty="0"/>
                 <a:t>1</a:t>
               </a:r>
-              <a:endParaRPr lang="en-GB" dirty="0"/>
             </a:p>
           </p:txBody>
         </p:sp>
@@ -13204,7 +13172,6 @@
                 <a:rPr lang="en-GB" dirty="0"/>
                 <a:t>1</a:t>
               </a:r>
-              <a:endParaRPr lang="en-GB" dirty="0"/>
             </a:p>
           </p:txBody>
         </p:sp>
@@ -13722,6 +13689,457 @@
       <p:transition xmlns:p14="http://schemas.microsoft.com/office/powerpoint/2010/main" spd="slow"/>
     </mc:Fallback>
   </mc:AlternateContent>
+  <p:timing>
+    <p:tnLst>
+      <p:par>
+        <p:cTn xmlns:p14="http://schemas.microsoft.com/office/powerpoint/2010/main" id="1" dur="indefinite" restart="never" nodeType="tmRoot">
+          <p:childTnLst>
+            <p:seq concurrent="1" nextAc="seek">
+              <p:cTn id="2" dur="indefinite" nodeType="mainSeq">
+                <p:childTnLst>
+                  <p:par>
+                    <p:cTn id="3" fill="hold">
+                      <p:stCondLst>
+                        <p:cond delay="indefinite"/>
+                      </p:stCondLst>
+                      <p:childTnLst>
+                        <p:par>
+                          <p:cTn id="4" fill="hold">
+                            <p:stCondLst>
+                              <p:cond delay="0"/>
+                            </p:stCondLst>
+                            <p:childTnLst>
+                              <p:par>
+                                <p:cTn id="5" presetID="1" presetClass="entr" presetSubtype="0" fill="hold" nodeType="clickEffect">
+                                  <p:stCondLst>
+                                    <p:cond delay="0"/>
+                                  </p:stCondLst>
+                                  <p:childTnLst>
+                                    <p:set>
+                                      <p:cBhvr>
+                                        <p:cTn id="6" dur="1" fill="hold">
+                                          <p:stCondLst>
+                                            <p:cond delay="0"/>
+                                          </p:stCondLst>
+                                        </p:cTn>
+                                        <p:tgtEl>
+                                          <p:spTgt spid="17"/>
+                                        </p:tgtEl>
+                                        <p:attrNameLst>
+                                          <p:attrName>style.visibility</p:attrName>
+                                        </p:attrNameLst>
+                                      </p:cBhvr>
+                                      <p:to>
+                                        <p:strVal val="visible"/>
+                                      </p:to>
+                                    </p:set>
+                                  </p:childTnLst>
+                                </p:cTn>
+                              </p:par>
+                              <p:par>
+                                <p:cTn id="7" presetID="1" presetClass="entr" presetSubtype="0" fill="hold" grpId="0" nodeType="withEffect">
+                                  <p:stCondLst>
+                                    <p:cond delay="0"/>
+                                  </p:stCondLst>
+                                  <p:childTnLst>
+                                    <p:set>
+                                      <p:cBhvr>
+                                        <p:cTn id="8" dur="1" fill="hold">
+                                          <p:stCondLst>
+                                            <p:cond delay="0"/>
+                                          </p:stCondLst>
+                                        </p:cTn>
+                                        <p:tgtEl>
+                                          <p:spTgt spid="52"/>
+                                        </p:tgtEl>
+                                        <p:attrNameLst>
+                                          <p:attrName>style.visibility</p:attrName>
+                                        </p:attrNameLst>
+                                      </p:cBhvr>
+                                      <p:to>
+                                        <p:strVal val="visible"/>
+                                      </p:to>
+                                    </p:set>
+                                  </p:childTnLst>
+                                </p:cTn>
+                              </p:par>
+                              <p:par>
+                                <p:cTn id="9" presetID="1" presetClass="entr" presetSubtype="0" fill="hold" nodeType="withEffect">
+                                  <p:stCondLst>
+                                    <p:cond delay="0"/>
+                                  </p:stCondLst>
+                                  <p:childTnLst>
+                                    <p:set>
+                                      <p:cBhvr>
+                                        <p:cTn id="10" dur="1" fill="hold">
+                                          <p:stCondLst>
+                                            <p:cond delay="0"/>
+                                          </p:stCondLst>
+                                        </p:cTn>
+                                        <p:tgtEl>
+                                          <p:spTgt spid="53"/>
+                                        </p:tgtEl>
+                                        <p:attrNameLst>
+                                          <p:attrName>style.visibility</p:attrName>
+                                        </p:attrNameLst>
+                                      </p:cBhvr>
+                                      <p:to>
+                                        <p:strVal val="visible"/>
+                                      </p:to>
+                                    </p:set>
+                                  </p:childTnLst>
+                                </p:cTn>
+                              </p:par>
+                              <p:par>
+                                <p:cTn id="11" presetID="1" presetClass="entr" presetSubtype="0" fill="hold" nodeType="withEffect">
+                                  <p:stCondLst>
+                                    <p:cond delay="0"/>
+                                  </p:stCondLst>
+                                  <p:childTnLst>
+                                    <p:set>
+                                      <p:cBhvr>
+                                        <p:cTn id="12" dur="1" fill="hold">
+                                          <p:stCondLst>
+                                            <p:cond delay="0"/>
+                                          </p:stCondLst>
+                                        </p:cTn>
+                                        <p:tgtEl>
+                                          <p:spTgt spid="78"/>
+                                        </p:tgtEl>
+                                        <p:attrNameLst>
+                                          <p:attrName>style.visibility</p:attrName>
+                                        </p:attrNameLst>
+                                      </p:cBhvr>
+                                      <p:to>
+                                        <p:strVal val="visible"/>
+                                      </p:to>
+                                    </p:set>
+                                  </p:childTnLst>
+                                </p:cTn>
+                              </p:par>
+                            </p:childTnLst>
+                          </p:cTn>
+                        </p:par>
+                      </p:childTnLst>
+                    </p:cTn>
+                  </p:par>
+                  <p:par>
+                    <p:cTn id="13" fill="hold">
+                      <p:stCondLst>
+                        <p:cond delay="indefinite"/>
+                      </p:stCondLst>
+                      <p:childTnLst>
+                        <p:par>
+                          <p:cTn id="14" fill="hold">
+                            <p:stCondLst>
+                              <p:cond delay="0"/>
+                            </p:stCondLst>
+                            <p:childTnLst>
+                              <p:par>
+                                <p:cTn id="15" presetID="1" presetClass="entr" presetSubtype="0" fill="hold" nodeType="clickEffect">
+                                  <p:stCondLst>
+                                    <p:cond delay="0"/>
+                                  </p:stCondLst>
+                                  <p:childTnLst>
+                                    <p:set>
+                                      <p:cBhvr>
+                                        <p:cTn id="16" dur="1" fill="hold">
+                                          <p:stCondLst>
+                                            <p:cond delay="0"/>
+                                          </p:stCondLst>
+                                        </p:cTn>
+                                        <p:tgtEl>
+                                          <p:spTgt spid="26"/>
+                                        </p:tgtEl>
+                                        <p:attrNameLst>
+                                          <p:attrName>style.visibility</p:attrName>
+                                        </p:attrNameLst>
+                                      </p:cBhvr>
+                                      <p:to>
+                                        <p:strVal val="visible"/>
+                                      </p:to>
+                                    </p:set>
+                                  </p:childTnLst>
+                                </p:cTn>
+                              </p:par>
+                              <p:par>
+                                <p:cTn id="17" presetID="1" presetClass="entr" presetSubtype="0" fill="hold" grpId="0" nodeType="withEffect">
+                                  <p:stCondLst>
+                                    <p:cond delay="0"/>
+                                  </p:stCondLst>
+                                  <p:childTnLst>
+                                    <p:set>
+                                      <p:cBhvr>
+                                        <p:cTn id="18" dur="1" fill="hold">
+                                          <p:stCondLst>
+                                            <p:cond delay="0"/>
+                                          </p:stCondLst>
+                                        </p:cTn>
+                                        <p:tgtEl>
+                                          <p:spTgt spid="60"/>
+                                        </p:tgtEl>
+                                        <p:attrNameLst>
+                                          <p:attrName>style.visibility</p:attrName>
+                                        </p:attrNameLst>
+                                      </p:cBhvr>
+                                      <p:to>
+                                        <p:strVal val="visible"/>
+                                      </p:to>
+                                    </p:set>
+                                  </p:childTnLst>
+                                </p:cTn>
+                              </p:par>
+                              <p:par>
+                                <p:cTn id="19" presetID="1" presetClass="entr" presetSubtype="0" fill="hold" nodeType="withEffect">
+                                  <p:stCondLst>
+                                    <p:cond delay="0"/>
+                                  </p:stCondLst>
+                                  <p:childTnLst>
+                                    <p:set>
+                                      <p:cBhvr>
+                                        <p:cTn id="20" dur="1" fill="hold">
+                                          <p:stCondLst>
+                                            <p:cond delay="0"/>
+                                          </p:stCondLst>
+                                        </p:cTn>
+                                        <p:tgtEl>
+                                          <p:spTgt spid="61"/>
+                                        </p:tgtEl>
+                                        <p:attrNameLst>
+                                          <p:attrName>style.visibility</p:attrName>
+                                        </p:attrNameLst>
+                                      </p:cBhvr>
+                                      <p:to>
+                                        <p:strVal val="visible"/>
+                                      </p:to>
+                                    </p:set>
+                                  </p:childTnLst>
+                                </p:cTn>
+                              </p:par>
+                            </p:childTnLst>
+                          </p:cTn>
+                        </p:par>
+                      </p:childTnLst>
+                    </p:cTn>
+                  </p:par>
+                  <p:par>
+                    <p:cTn id="21" fill="hold">
+                      <p:stCondLst>
+                        <p:cond delay="indefinite"/>
+                      </p:stCondLst>
+                      <p:childTnLst>
+                        <p:par>
+                          <p:cTn id="22" fill="hold">
+                            <p:stCondLst>
+                              <p:cond delay="0"/>
+                            </p:stCondLst>
+                            <p:childTnLst>
+                              <p:par>
+                                <p:cTn id="23" presetID="1" presetClass="entr" presetSubtype="0" fill="hold" grpId="0" nodeType="clickEffect">
+                                  <p:stCondLst>
+                                    <p:cond delay="0"/>
+                                  </p:stCondLst>
+                                  <p:childTnLst>
+                                    <p:set>
+                                      <p:cBhvr>
+                                        <p:cTn id="24" dur="1" fill="hold">
+                                          <p:stCondLst>
+                                            <p:cond delay="0"/>
+                                          </p:stCondLst>
+                                        </p:cTn>
+                                        <p:tgtEl>
+                                          <p:spTgt spid="74"/>
+                                        </p:tgtEl>
+                                        <p:attrNameLst>
+                                          <p:attrName>style.visibility</p:attrName>
+                                        </p:attrNameLst>
+                                      </p:cBhvr>
+                                      <p:to>
+                                        <p:strVal val="visible"/>
+                                      </p:to>
+                                    </p:set>
+                                  </p:childTnLst>
+                                </p:cTn>
+                              </p:par>
+                            </p:childTnLst>
+                          </p:cTn>
+                        </p:par>
+                      </p:childTnLst>
+                    </p:cTn>
+                  </p:par>
+                  <p:par>
+                    <p:cTn id="25" fill="hold">
+                      <p:stCondLst>
+                        <p:cond delay="indefinite"/>
+                      </p:stCondLst>
+                      <p:childTnLst>
+                        <p:par>
+                          <p:cTn id="26" fill="hold">
+                            <p:stCondLst>
+                              <p:cond delay="0"/>
+                            </p:stCondLst>
+                            <p:childTnLst>
+                              <p:par>
+                                <p:cTn id="27" presetID="1" presetClass="entr" presetSubtype="0" fill="hold" nodeType="clickEffect">
+                                  <p:stCondLst>
+                                    <p:cond delay="0"/>
+                                  </p:stCondLst>
+                                  <p:childTnLst>
+                                    <p:set>
+                                      <p:cBhvr>
+                                        <p:cTn id="28" dur="1" fill="hold">
+                                          <p:stCondLst>
+                                            <p:cond delay="0"/>
+                                          </p:stCondLst>
+                                        </p:cTn>
+                                        <p:tgtEl>
+                                          <p:spTgt spid="35"/>
+                                        </p:tgtEl>
+                                        <p:attrNameLst>
+                                          <p:attrName>style.visibility</p:attrName>
+                                        </p:attrNameLst>
+                                      </p:cBhvr>
+                                      <p:to>
+                                        <p:strVal val="visible"/>
+                                      </p:to>
+                                    </p:set>
+                                  </p:childTnLst>
+                                </p:cTn>
+                              </p:par>
+                              <p:par>
+                                <p:cTn id="29" presetID="1" presetClass="entr" presetSubtype="0" fill="hold" grpId="0" nodeType="withEffect">
+                                  <p:stCondLst>
+                                    <p:cond delay="0"/>
+                                  </p:stCondLst>
+                                  <p:childTnLst>
+                                    <p:set>
+                                      <p:cBhvr>
+                                        <p:cTn id="30" dur="1" fill="hold">
+                                          <p:stCondLst>
+                                            <p:cond delay="0"/>
+                                          </p:stCondLst>
+                                        </p:cTn>
+                                        <p:tgtEl>
+                                          <p:spTgt spid="58"/>
+                                        </p:tgtEl>
+                                        <p:attrNameLst>
+                                          <p:attrName>style.visibility</p:attrName>
+                                        </p:attrNameLst>
+                                      </p:cBhvr>
+                                      <p:to>
+                                        <p:strVal val="visible"/>
+                                      </p:to>
+                                    </p:set>
+                                  </p:childTnLst>
+                                </p:cTn>
+                              </p:par>
+                              <p:par>
+                                <p:cTn id="31" presetID="1" presetClass="entr" presetSubtype="0" fill="hold" nodeType="withEffect">
+                                  <p:stCondLst>
+                                    <p:cond delay="0"/>
+                                  </p:stCondLst>
+                                  <p:childTnLst>
+                                    <p:set>
+                                      <p:cBhvr>
+                                        <p:cTn id="32" dur="1" fill="hold">
+                                          <p:stCondLst>
+                                            <p:cond delay="0"/>
+                                          </p:stCondLst>
+                                        </p:cTn>
+                                        <p:tgtEl>
+                                          <p:spTgt spid="64"/>
+                                        </p:tgtEl>
+                                        <p:attrNameLst>
+                                          <p:attrName>style.visibility</p:attrName>
+                                        </p:attrNameLst>
+                                      </p:cBhvr>
+                                      <p:to>
+                                        <p:strVal val="visible"/>
+                                      </p:to>
+                                    </p:set>
+                                  </p:childTnLst>
+                                </p:cTn>
+                              </p:par>
+                            </p:childTnLst>
+                          </p:cTn>
+                        </p:par>
+                      </p:childTnLst>
+                    </p:cTn>
+                  </p:par>
+                  <p:par>
+                    <p:cTn id="33" fill="hold">
+                      <p:stCondLst>
+                        <p:cond delay="indefinite"/>
+                      </p:stCondLst>
+                      <p:childTnLst>
+                        <p:par>
+                          <p:cTn id="34" fill="hold">
+                            <p:stCondLst>
+                              <p:cond delay="0"/>
+                            </p:stCondLst>
+                            <p:childTnLst>
+                              <p:par>
+                                <p:cTn id="35" presetID="1" presetClass="entr" presetSubtype="0" fill="hold" grpId="0" nodeType="clickEffect">
+                                  <p:stCondLst>
+                                    <p:cond delay="0"/>
+                                  </p:stCondLst>
+                                  <p:childTnLst>
+                                    <p:set>
+                                      <p:cBhvr>
+                                        <p:cTn id="36" dur="1" fill="hold">
+                                          <p:stCondLst>
+                                            <p:cond delay="0"/>
+                                          </p:stCondLst>
+                                        </p:cTn>
+                                        <p:tgtEl>
+                                          <p:spTgt spid="77"/>
+                                        </p:tgtEl>
+                                        <p:attrNameLst>
+                                          <p:attrName>style.visibility</p:attrName>
+                                        </p:attrNameLst>
+                                      </p:cBhvr>
+                                      <p:to>
+                                        <p:strVal val="visible"/>
+                                      </p:to>
+                                    </p:set>
+                                  </p:childTnLst>
+                                </p:cTn>
+                              </p:par>
+                            </p:childTnLst>
+                          </p:cTn>
+                        </p:par>
+                      </p:childTnLst>
+                    </p:cTn>
+                  </p:par>
+                </p:childTnLst>
+              </p:cTn>
+              <p:prevCondLst>
+                <p:cond evt="onPrev" delay="0">
+                  <p:tgtEl>
+                    <p:sldTgt/>
+                  </p:tgtEl>
+                </p:cond>
+              </p:prevCondLst>
+              <p:nextCondLst>
+                <p:cond evt="onNext" delay="0">
+                  <p:tgtEl>
+                    <p:sldTgt/>
+                  </p:tgtEl>
+                </p:cond>
+              </p:nextCondLst>
+            </p:seq>
+          </p:childTnLst>
+        </p:cTn>
+      </p:par>
+    </p:tnLst>
+    <p:bldLst>
+      <p:bldP spid="52" grpId="0"/>
+      <p:bldP spid="58" grpId="0"/>
+      <p:bldP spid="60" grpId="0"/>
+      <p:bldP spid="74" grpId="0"/>
+      <p:bldP spid="77" grpId="0"/>
+    </p:bldLst>
+  </p:timing>
 </p:sld>
 </file>
 
@@ -13904,6 +14322,13 @@
       <p:transition xmlns:p14="http://schemas.microsoft.com/office/powerpoint/2010/main" spd="slow"/>
     </mc:Fallback>
   </mc:AlternateContent>
+  <p:timing>
+    <p:tnLst>
+      <p:par>
+        <p:cTn xmlns:p14="http://schemas.microsoft.com/office/powerpoint/2010/main" id="1" dur="indefinite" restart="never" nodeType="tmRoot"/>
+      </p:par>
+    </p:tnLst>
+  </p:timing>
 </p:sld>
 </file>
 
@@ -14743,6 +15168,13 @@
       <p:transition xmlns:p14="http://schemas.microsoft.com/office/powerpoint/2010/main" spd="slow"/>
     </mc:Fallback>
   </mc:AlternateContent>
+  <p:timing>
+    <p:tnLst>
+      <p:par>
+        <p:cTn xmlns:p14="http://schemas.microsoft.com/office/powerpoint/2010/main" id="1" dur="indefinite" restart="never" nodeType="tmRoot"/>
+      </p:par>
+    </p:tnLst>
+  </p:timing>
 </p:sld>
 </file>
 
@@ -15379,6 +15811,13 @@
       <p:transition xmlns:p14="http://schemas.microsoft.com/office/powerpoint/2010/main" spd="slow"/>
     </mc:Fallback>
   </mc:AlternateContent>
+  <p:timing>
+    <p:tnLst>
+      <p:par>
+        <p:cTn xmlns:p14="http://schemas.microsoft.com/office/powerpoint/2010/main" id="1" dur="indefinite" restart="never" nodeType="tmRoot"/>
+      </p:par>
+    </p:tnLst>
+  </p:timing>
 </p:sld>
 </file>
 
@@ -15974,6 +16413,13 @@
       <p:transition xmlns:p14="http://schemas.microsoft.com/office/powerpoint/2010/main" spd="slow"/>
     </mc:Fallback>
   </mc:AlternateContent>
+  <p:timing>
+    <p:tnLst>
+      <p:par>
+        <p:cTn xmlns:p14="http://schemas.microsoft.com/office/powerpoint/2010/main" id="1" dur="indefinite" restart="never" nodeType="tmRoot"/>
+      </p:par>
+    </p:tnLst>
+  </p:timing>
 </p:sld>
 </file>
 
@@ -16130,6 +16576,13 @@
       <p:transition xmlns:p14="http://schemas.microsoft.com/office/powerpoint/2010/main" spd="slow"/>
     </mc:Fallback>
   </mc:AlternateContent>
+  <p:timing>
+    <p:tnLst>
+      <p:par>
+        <p:cTn xmlns:p14="http://schemas.microsoft.com/office/powerpoint/2010/main" id="1" dur="indefinite" restart="never" nodeType="tmRoot"/>
+      </p:par>
+    </p:tnLst>
+  </p:timing>
 </p:sld>
 </file>
 
@@ -16290,6 +16743,13 @@
       <p:transition xmlns:p14="http://schemas.microsoft.com/office/powerpoint/2010/main" spd="slow"/>
     </mc:Fallback>
   </mc:AlternateContent>
+  <p:timing>
+    <p:tnLst>
+      <p:par>
+        <p:cTn xmlns:p14="http://schemas.microsoft.com/office/powerpoint/2010/main" id="1" dur="indefinite" restart="never" nodeType="tmRoot"/>
+      </p:par>
+    </p:tnLst>
+  </p:timing>
 </p:sld>
 </file>
 
@@ -17929,7 +18389,6 @@
                   <a:rPr lang="en-GB" sz="1400" dirty="0"/>
                   <a:t>8</a:t>
                 </a:r>
-                <a:endParaRPr lang="en-GB" sz="1400" dirty="0"/>
               </a:p>
             </p:txBody>
           </p:sp>
@@ -18017,7 +18476,6 @@
                   <a:rPr lang="en-GB" sz="1400" dirty="0"/>
                   <a:t>6</a:t>
                 </a:r>
-                <a:endParaRPr lang="en-GB" sz="1400" dirty="0"/>
               </a:p>
             </p:txBody>
           </p:sp>
@@ -18105,7 +18563,6 @@
                   <a:rPr lang="en-GB" sz="1400" dirty="0"/>
                   <a:t>4</a:t>
                 </a:r>
-                <a:endParaRPr lang="en-GB" sz="1400" dirty="0"/>
               </a:p>
             </p:txBody>
           </p:sp>
@@ -18149,7 +18606,6 @@
                   <a:rPr lang="en-GB" sz="1400" dirty="0"/>
                   <a:t>3</a:t>
                 </a:r>
-                <a:endParaRPr lang="en-GB" sz="1400" dirty="0"/>
               </a:p>
             </p:txBody>
           </p:sp>
@@ -18237,7 +18693,6 @@
                   <a:rPr lang="en-GB" sz="1400" dirty="0"/>
                   <a:t>1</a:t>
                 </a:r>
-                <a:endParaRPr lang="en-GB" sz="1400" dirty="0"/>
               </a:p>
             </p:txBody>
           </p:sp>
@@ -18570,7 +19025,6 @@
                   <a:rPr lang="en-GB" dirty="0"/>
                   <a:t>X</a:t>
                 </a:r>
-                <a:endParaRPr lang="en-GB" dirty="0"/>
               </a:p>
             </p:txBody>
           </p:sp>
@@ -18654,7 +19108,6 @@
                   <a:rPr lang="en-GB" dirty="0"/>
                   <a:t>X</a:t>
                 </a:r>
-                <a:endParaRPr lang="en-GB" dirty="0"/>
               </a:p>
             </p:txBody>
           </p:sp>
@@ -19751,7 +20204,6 @@
                     <a:rPr lang="en-GB" dirty="0"/>
                     <a:t>X</a:t>
                   </a:r>
-                  <a:endParaRPr lang="en-GB" dirty="0"/>
                 </a:p>
               </p:txBody>
             </p:sp>
@@ -20824,6 +21276,276 @@
       <p:transition xmlns:p14="http://schemas.microsoft.com/office/powerpoint/2010/main" spd="slow"/>
     </mc:Fallback>
   </mc:AlternateContent>
+  <p:timing>
+    <p:tnLst>
+      <p:par>
+        <p:cTn xmlns:p14="http://schemas.microsoft.com/office/powerpoint/2010/main" id="1" dur="indefinite" restart="never" nodeType="tmRoot">
+          <p:childTnLst>
+            <p:seq concurrent="1" nextAc="seek">
+              <p:cTn id="2" dur="indefinite" nodeType="mainSeq">
+                <p:childTnLst>
+                  <p:par>
+                    <p:cTn id="3" fill="hold">
+                      <p:stCondLst>
+                        <p:cond delay="indefinite"/>
+                      </p:stCondLst>
+                      <p:childTnLst>
+                        <p:par>
+                          <p:cTn id="4" fill="hold">
+                            <p:stCondLst>
+                              <p:cond delay="0"/>
+                            </p:stCondLst>
+                            <p:childTnLst>
+                              <p:par>
+                                <p:cTn id="5" presetID="1" presetClass="entr" presetSubtype="0" fill="hold" grpId="0" nodeType="clickEffect">
+                                  <p:stCondLst>
+                                    <p:cond delay="0"/>
+                                  </p:stCondLst>
+                                  <p:childTnLst>
+                                    <p:set>
+                                      <p:cBhvr>
+                                        <p:cTn id="6" dur="1" fill="hold">
+                                          <p:stCondLst>
+                                            <p:cond delay="0"/>
+                                          </p:stCondLst>
+                                        </p:cTn>
+                                        <p:tgtEl>
+                                          <p:spTgt spid="144"/>
+                                        </p:tgtEl>
+                                        <p:attrNameLst>
+                                          <p:attrName>style.visibility</p:attrName>
+                                        </p:attrNameLst>
+                                      </p:cBhvr>
+                                      <p:to>
+                                        <p:strVal val="visible"/>
+                                      </p:to>
+                                    </p:set>
+                                  </p:childTnLst>
+                                </p:cTn>
+                              </p:par>
+                              <p:par>
+                                <p:cTn id="7" presetID="1" presetClass="entr" presetSubtype="0" fill="hold" grpId="0" nodeType="withEffect">
+                                  <p:stCondLst>
+                                    <p:cond delay="0"/>
+                                  </p:stCondLst>
+                                  <p:childTnLst>
+                                    <p:set>
+                                      <p:cBhvr>
+                                        <p:cTn id="8" dur="1" fill="hold">
+                                          <p:stCondLst>
+                                            <p:cond delay="0"/>
+                                          </p:stCondLst>
+                                        </p:cTn>
+                                        <p:tgtEl>
+                                          <p:spTgt spid="145"/>
+                                        </p:tgtEl>
+                                        <p:attrNameLst>
+                                          <p:attrName>style.visibility</p:attrName>
+                                        </p:attrNameLst>
+                                      </p:cBhvr>
+                                      <p:to>
+                                        <p:strVal val="visible"/>
+                                      </p:to>
+                                    </p:set>
+                                  </p:childTnLst>
+                                </p:cTn>
+                              </p:par>
+                              <p:par>
+                                <p:cTn id="9" presetID="1" presetClass="entr" presetSubtype="0" fill="hold" grpId="0" nodeType="withEffect">
+                                  <p:stCondLst>
+                                    <p:cond delay="0"/>
+                                  </p:stCondLst>
+                                  <p:childTnLst>
+                                    <p:set>
+                                      <p:cBhvr>
+                                        <p:cTn id="10" dur="1" fill="hold">
+                                          <p:stCondLst>
+                                            <p:cond delay="0"/>
+                                          </p:stCondLst>
+                                        </p:cTn>
+                                        <p:tgtEl>
+                                          <p:spTgt spid="146"/>
+                                        </p:tgtEl>
+                                        <p:attrNameLst>
+                                          <p:attrName>style.visibility</p:attrName>
+                                        </p:attrNameLst>
+                                      </p:cBhvr>
+                                      <p:to>
+                                        <p:strVal val="visible"/>
+                                      </p:to>
+                                    </p:set>
+                                  </p:childTnLst>
+                                </p:cTn>
+                              </p:par>
+                              <p:par>
+                                <p:cTn id="11" presetID="1" presetClass="entr" presetSubtype="0" fill="hold" grpId="0" nodeType="withEffect">
+                                  <p:stCondLst>
+                                    <p:cond delay="0"/>
+                                  </p:stCondLst>
+                                  <p:childTnLst>
+                                    <p:set>
+                                      <p:cBhvr>
+                                        <p:cTn id="12" dur="1" fill="hold">
+                                          <p:stCondLst>
+                                            <p:cond delay="0"/>
+                                          </p:stCondLst>
+                                        </p:cTn>
+                                        <p:tgtEl>
+                                          <p:spTgt spid="147"/>
+                                        </p:tgtEl>
+                                        <p:attrNameLst>
+                                          <p:attrName>style.visibility</p:attrName>
+                                        </p:attrNameLst>
+                                      </p:cBhvr>
+                                      <p:to>
+                                        <p:strVal val="visible"/>
+                                      </p:to>
+                                    </p:set>
+                                  </p:childTnLst>
+                                </p:cTn>
+                              </p:par>
+                              <p:par>
+                                <p:cTn id="13" presetID="1" presetClass="entr" presetSubtype="0" fill="hold" nodeType="withEffect">
+                                  <p:stCondLst>
+                                    <p:cond delay="0"/>
+                                  </p:stCondLst>
+                                  <p:childTnLst>
+                                    <p:set>
+                                      <p:cBhvr>
+                                        <p:cTn id="14" dur="1" fill="hold">
+                                          <p:stCondLst>
+                                            <p:cond delay="0"/>
+                                          </p:stCondLst>
+                                        </p:cTn>
+                                        <p:tgtEl>
+                                          <p:spTgt spid="167"/>
+                                        </p:tgtEl>
+                                        <p:attrNameLst>
+                                          <p:attrName>style.visibility</p:attrName>
+                                        </p:attrNameLst>
+                                      </p:cBhvr>
+                                      <p:to>
+                                        <p:strVal val="visible"/>
+                                      </p:to>
+                                    </p:set>
+                                  </p:childTnLst>
+                                </p:cTn>
+                              </p:par>
+                              <p:par>
+                                <p:cTn id="15" presetID="1" presetClass="entr" presetSubtype="0" fill="hold" nodeType="withEffect">
+                                  <p:stCondLst>
+                                    <p:cond delay="0"/>
+                                  </p:stCondLst>
+                                  <p:childTnLst>
+                                    <p:set>
+                                      <p:cBhvr>
+                                        <p:cTn id="16" dur="1" fill="hold">
+                                          <p:stCondLst>
+                                            <p:cond delay="0"/>
+                                          </p:stCondLst>
+                                        </p:cTn>
+                                        <p:tgtEl>
+                                          <p:spTgt spid="168"/>
+                                        </p:tgtEl>
+                                        <p:attrNameLst>
+                                          <p:attrName>style.visibility</p:attrName>
+                                        </p:attrNameLst>
+                                      </p:cBhvr>
+                                      <p:to>
+                                        <p:strVal val="visible"/>
+                                      </p:to>
+                                    </p:set>
+                                  </p:childTnLst>
+                                </p:cTn>
+                              </p:par>
+                              <p:par>
+                                <p:cTn id="17" presetID="1" presetClass="entr" presetSubtype="0" fill="hold" nodeType="withEffect">
+                                  <p:stCondLst>
+                                    <p:cond delay="0"/>
+                                  </p:stCondLst>
+                                  <p:childTnLst>
+                                    <p:set>
+                                      <p:cBhvr>
+                                        <p:cTn id="18" dur="1" fill="hold">
+                                          <p:stCondLst>
+                                            <p:cond delay="0"/>
+                                          </p:stCondLst>
+                                        </p:cTn>
+                                        <p:tgtEl>
+                                          <p:spTgt spid="169"/>
+                                        </p:tgtEl>
+                                        <p:attrNameLst>
+                                          <p:attrName>style.visibility</p:attrName>
+                                        </p:attrNameLst>
+                                      </p:cBhvr>
+                                      <p:to>
+                                        <p:strVal val="visible"/>
+                                      </p:to>
+                                    </p:set>
+                                  </p:childTnLst>
+                                </p:cTn>
+                              </p:par>
+                              <p:par>
+                                <p:cTn id="19" presetID="1" presetClass="entr" presetSubtype="0" fill="hold" nodeType="withEffect">
+                                  <p:stCondLst>
+                                    <p:cond delay="0"/>
+                                  </p:stCondLst>
+                                  <p:childTnLst>
+                                    <p:set>
+                                      <p:cBhvr>
+                                        <p:cTn id="20" dur="1" fill="hold">
+                                          <p:stCondLst>
+                                            <p:cond delay="0"/>
+                                          </p:stCondLst>
+                                        </p:cTn>
+                                        <p:tgtEl>
+                                          <p:spTgt spid="170"/>
+                                        </p:tgtEl>
+                                        <p:attrNameLst>
+                                          <p:attrName>style.visibility</p:attrName>
+                                        </p:attrNameLst>
+                                      </p:cBhvr>
+                                      <p:to>
+                                        <p:strVal val="visible"/>
+                                      </p:to>
+                                    </p:set>
+                                  </p:childTnLst>
+                                </p:cTn>
+                              </p:par>
+                            </p:childTnLst>
+                          </p:cTn>
+                        </p:par>
+                      </p:childTnLst>
+                    </p:cTn>
+                  </p:par>
+                </p:childTnLst>
+              </p:cTn>
+              <p:prevCondLst>
+                <p:cond evt="onPrev" delay="0">
+                  <p:tgtEl>
+                    <p:sldTgt/>
+                  </p:tgtEl>
+                </p:cond>
+              </p:prevCondLst>
+              <p:nextCondLst>
+                <p:cond evt="onNext" delay="0">
+                  <p:tgtEl>
+                    <p:sldTgt/>
+                  </p:tgtEl>
+                </p:cond>
+              </p:nextCondLst>
+            </p:seq>
+          </p:childTnLst>
+        </p:cTn>
+      </p:par>
+    </p:tnLst>
+    <p:bldLst>
+      <p:bldP spid="144" grpId="0"/>
+      <p:bldP spid="145" grpId="0"/>
+      <p:bldP spid="146" grpId="0"/>
+      <p:bldP spid="147" grpId="0"/>
+    </p:bldLst>
+  </p:timing>
 </p:sld>
 </file>
 
@@ -20931,7 +21653,6 @@
               <a:rPr lang="en-GB" dirty="0"/>
               <a:t>1</a:t>
             </a:r>
-            <a:endParaRPr lang="en-GB" dirty="0"/>
           </a:p>
         </p:txBody>
       </p:sp>
@@ -20975,7 +21696,6 @@
               <a:rPr lang="en-GB" dirty="0"/>
               <a:t>1</a:t>
             </a:r>
-            <a:endParaRPr lang="en-GB" dirty="0"/>
           </a:p>
         </p:txBody>
       </p:sp>
@@ -21063,7 +21783,6 @@
               <a:rPr lang="en-GB" dirty="0"/>
               <a:t>1</a:t>
             </a:r>
-            <a:endParaRPr lang="en-GB" dirty="0"/>
           </a:p>
         </p:txBody>
       </p:sp>
@@ -21107,7 +21826,6 @@
               <a:rPr lang="en-GB" dirty="0"/>
               <a:t>1</a:t>
             </a:r>
-            <a:endParaRPr lang="en-GB" dirty="0"/>
           </a:p>
         </p:txBody>
       </p:sp>
@@ -21195,7 +21913,6 @@
               <a:rPr lang="en-GB" dirty="0"/>
               <a:t>1</a:t>
             </a:r>
-            <a:endParaRPr lang="en-GB" dirty="0"/>
           </a:p>
         </p:txBody>
       </p:sp>
@@ -21288,6 +22005,13 @@
       <p:transition xmlns:p14="http://schemas.microsoft.com/office/powerpoint/2010/main" spd="slow"/>
     </mc:Fallback>
   </mc:AlternateContent>
+  <p:timing>
+    <p:tnLst>
+      <p:par>
+        <p:cTn xmlns:p14="http://schemas.microsoft.com/office/powerpoint/2010/main" id="1" dur="indefinite" restart="never" nodeType="tmRoot"/>
+      </p:par>
+    </p:tnLst>
+  </p:timing>
 </p:sld>
 </file>
 
@@ -21395,7 +22119,6 @@
               <a:rPr lang="en-GB" dirty="0"/>
               <a:t>1</a:t>
             </a:r>
-            <a:endParaRPr lang="en-GB" dirty="0"/>
           </a:p>
         </p:txBody>
       </p:sp>
@@ -21439,7 +22162,6 @@
               <a:rPr lang="en-GB" dirty="0"/>
               <a:t>1</a:t>
             </a:r>
-            <a:endParaRPr lang="en-GB" dirty="0"/>
           </a:p>
         </p:txBody>
       </p:sp>
@@ -21527,7 +22249,6 @@
               <a:rPr lang="en-GB" dirty="0"/>
               <a:t>1</a:t>
             </a:r>
-            <a:endParaRPr lang="en-GB" dirty="0"/>
           </a:p>
         </p:txBody>
       </p:sp>
@@ -21571,7 +22292,6 @@
               <a:rPr lang="en-GB" dirty="0"/>
               <a:t>1</a:t>
             </a:r>
-            <a:endParaRPr lang="en-GB" dirty="0"/>
           </a:p>
         </p:txBody>
       </p:sp>
@@ -21659,7 +22379,6 @@
               <a:rPr lang="en-GB" dirty="0"/>
               <a:t>1</a:t>
             </a:r>
-            <a:endParaRPr lang="en-GB" dirty="0"/>
           </a:p>
         </p:txBody>
       </p:sp>
@@ -21747,7 +22466,6 @@
               <a:rPr lang="en-GB" dirty="0"/>
               <a:t>1</a:t>
             </a:r>
-            <a:endParaRPr lang="en-GB" dirty="0"/>
           </a:p>
         </p:txBody>
       </p:sp>
@@ -21791,7 +22509,6 @@
               <a:rPr lang="en-GB" dirty="0"/>
               <a:t>1</a:t>
             </a:r>
-            <a:endParaRPr lang="en-GB" dirty="0"/>
           </a:p>
         </p:txBody>
       </p:sp>
@@ -21923,7 +22640,6 @@
               <a:rPr lang="en-GB" dirty="0"/>
               <a:t>1</a:t>
             </a:r>
-            <a:endParaRPr lang="en-GB" dirty="0"/>
           </a:p>
         </p:txBody>
       </p:sp>
@@ -22159,7 +22875,6 @@
               <a:rPr lang="en-GB" dirty="0"/>
               <a:t>1</a:t>
             </a:r>
-            <a:endParaRPr lang="en-GB" dirty="0"/>
           </a:p>
         </p:txBody>
       </p:sp>
@@ -22203,7 +22918,6 @@
               <a:rPr lang="en-GB" dirty="0"/>
               <a:t>1</a:t>
             </a:r>
-            <a:endParaRPr lang="en-GB" dirty="0"/>
           </a:p>
         </p:txBody>
       </p:sp>
@@ -22465,11 +23179,6 @@
                 </a:rPr>
                 <a:t>5</a:t>
               </a:r>
-              <a:endParaRPr lang="en-GB" sz="1000" dirty="0">
-                <a:solidFill>
-                  <a:schemeClr val="tx1"/>
-                </a:solidFill>
-              </a:endParaRPr>
             </a:p>
           </p:txBody>
         </p:sp>
@@ -22517,11 +23226,6 @@
                 </a:rPr>
                 <a:t>4</a:t>
               </a:r>
-              <a:endParaRPr lang="en-GB" sz="1000" dirty="0">
-                <a:solidFill>
-                  <a:schemeClr val="tx1"/>
-                </a:solidFill>
-              </a:endParaRPr>
             </a:p>
           </p:txBody>
         </p:sp>
@@ -22673,11 +23377,6 @@
                 </a:rPr>
                 <a:t>1</a:t>
               </a:r>
-              <a:endParaRPr lang="en-GB" sz="1000" dirty="0">
-                <a:solidFill>
-                  <a:schemeClr val="tx1"/>
-                </a:solidFill>
-              </a:endParaRPr>
             </a:p>
           </p:txBody>
         </p:sp>
@@ -22829,11 +23528,6 @@
                 </a:rPr>
                 <a:t>9</a:t>
               </a:r>
-              <a:endParaRPr lang="en-GB" sz="1000" dirty="0">
-                <a:solidFill>
-                  <a:schemeClr val="tx1"/>
-                </a:solidFill>
-              </a:endParaRPr>
             </a:p>
           </p:txBody>
         </p:sp>
@@ -22890,6 +23584,13 @@
       <p:transition xmlns:p14="http://schemas.microsoft.com/office/powerpoint/2010/main" spd="slow"/>
     </mc:Fallback>
   </mc:AlternateContent>
+  <p:timing>
+    <p:tnLst>
+      <p:par>
+        <p:cTn xmlns:p14="http://schemas.microsoft.com/office/powerpoint/2010/main" id="1" dur="indefinite" restart="never" nodeType="tmRoot"/>
+      </p:par>
+    </p:tnLst>
+  </p:timing>
 </p:sld>
 </file>
 
@@ -22997,7 +23698,6 @@
               <a:rPr lang="en-GB" dirty="0"/>
               <a:t>1</a:t>
             </a:r>
-            <a:endParaRPr lang="en-GB" dirty="0"/>
           </a:p>
         </p:txBody>
       </p:sp>
@@ -23041,7 +23741,6 @@
               <a:rPr lang="en-GB" dirty="0"/>
               <a:t>1</a:t>
             </a:r>
-            <a:endParaRPr lang="en-GB" dirty="0"/>
           </a:p>
         </p:txBody>
       </p:sp>
@@ -23129,7 +23828,6 @@
               <a:rPr lang="en-GB" dirty="0"/>
               <a:t>1</a:t>
             </a:r>
-            <a:endParaRPr lang="en-GB" dirty="0"/>
           </a:p>
         </p:txBody>
       </p:sp>
@@ -23173,7 +23871,6 @@
               <a:rPr lang="en-GB" dirty="0"/>
               <a:t>1</a:t>
             </a:r>
-            <a:endParaRPr lang="en-GB" dirty="0"/>
           </a:p>
         </p:txBody>
       </p:sp>
@@ -23261,7 +23958,6 @@
               <a:rPr lang="en-GB" dirty="0"/>
               <a:t>1</a:t>
             </a:r>
-            <a:endParaRPr lang="en-GB" dirty="0"/>
           </a:p>
         </p:txBody>
       </p:sp>
@@ -23353,11 +24049,6 @@
               </a:rPr>
               <a:t>1</a:t>
             </a:r>
-            <a:endParaRPr lang="en-GB" b="1" dirty="0">
-              <a:solidFill>
-                <a:srgbClr val="FF6600"/>
-              </a:solidFill>
-            </a:endParaRPr>
           </a:p>
         </p:txBody>
       </p:sp>
@@ -23401,7 +24092,6 @@
               <a:rPr lang="en-GB" dirty="0"/>
               <a:t>1</a:t>
             </a:r>
-            <a:endParaRPr lang="en-GB" dirty="0"/>
           </a:p>
         </p:txBody>
       </p:sp>
@@ -23545,11 +24235,6 @@
               </a:rPr>
               <a:t>1</a:t>
             </a:r>
-            <a:endParaRPr lang="en-GB" b="1" dirty="0">
-              <a:solidFill>
-                <a:srgbClr val="FF6600"/>
-              </a:solidFill>
-            </a:endParaRPr>
           </a:p>
         </p:txBody>
       </p:sp>
@@ -23641,11 +24326,6 @@
               </a:rPr>
               <a:t>1</a:t>
             </a:r>
-            <a:endParaRPr lang="en-GB" b="1" dirty="0">
-              <a:solidFill>
-                <a:srgbClr val="0000FF"/>
-              </a:solidFill>
-            </a:endParaRPr>
           </a:p>
         </p:txBody>
       </p:sp>
@@ -23797,11 +24477,6 @@
               </a:rPr>
               <a:t>1</a:t>
             </a:r>
-            <a:endParaRPr lang="en-GB" b="1" dirty="0">
-              <a:solidFill>
-                <a:srgbClr val="FF6600"/>
-              </a:solidFill>
-            </a:endParaRPr>
           </a:p>
         </p:txBody>
       </p:sp>
@@ -23845,7 +24520,6 @@
               <a:rPr lang="en-GB" dirty="0"/>
               <a:t>1</a:t>
             </a:r>
-            <a:endParaRPr lang="en-GB" dirty="0"/>
           </a:p>
         </p:txBody>
       </p:sp>
@@ -24115,11 +24789,6 @@
                 </a:rPr>
                 <a:t>5</a:t>
               </a:r>
-              <a:endParaRPr lang="en-GB" sz="1000" b="1" dirty="0">
-                <a:solidFill>
-                  <a:srgbClr val="FF6600"/>
-                </a:solidFill>
-              </a:endParaRPr>
             </a:p>
           </p:txBody>
         </p:sp>
@@ -24167,11 +24836,6 @@
                 </a:rPr>
                 <a:t>4</a:t>
               </a:r>
-              <a:endParaRPr lang="en-GB" sz="1000" dirty="0">
-                <a:solidFill>
-                  <a:schemeClr val="tx1"/>
-                </a:solidFill>
-              </a:endParaRPr>
             </a:p>
           </p:txBody>
         </p:sp>
@@ -24323,11 +24987,6 @@
                 </a:rPr>
                 <a:t>1</a:t>
               </a:r>
-              <a:endParaRPr lang="en-GB" sz="1000" b="1" dirty="0">
-                <a:solidFill>
-                  <a:srgbClr val="FF6600"/>
-                </a:solidFill>
-              </a:endParaRPr>
             </a:p>
           </p:txBody>
         </p:sp>
@@ -24479,11 +25138,6 @@
                 </a:rPr>
                 <a:t>9</a:t>
               </a:r>
-              <a:endParaRPr lang="en-GB" sz="1000" b="1" dirty="0">
-                <a:solidFill>
-                  <a:srgbClr val="FF6600"/>
-                </a:solidFill>
-              </a:endParaRPr>
             </a:p>
           </p:txBody>
         </p:sp>
@@ -24606,6 +25260,142 @@
       <p:transition xmlns:p14="http://schemas.microsoft.com/office/powerpoint/2010/main" spd="slow"/>
     </mc:Fallback>
   </mc:AlternateContent>
+  <p:timing>
+    <p:tnLst>
+      <p:par>
+        <p:cTn xmlns:p14="http://schemas.microsoft.com/office/powerpoint/2010/main" id="1" dur="indefinite" restart="never" nodeType="tmRoot">
+          <p:childTnLst>
+            <p:seq concurrent="1" nextAc="seek">
+              <p:cTn id="2" dur="indefinite" nodeType="mainSeq">
+                <p:childTnLst>
+                  <p:par>
+                    <p:cTn id="3" fill="hold">
+                      <p:stCondLst>
+                        <p:cond delay="indefinite"/>
+                      </p:stCondLst>
+                      <p:childTnLst>
+                        <p:par>
+                          <p:cTn id="4" fill="hold">
+                            <p:stCondLst>
+                              <p:cond delay="0"/>
+                            </p:stCondLst>
+                            <p:childTnLst>
+                              <p:par>
+                                <p:cTn id="5" presetID="1" presetClass="entr" presetSubtype="0" fill="hold" nodeType="clickEffect">
+                                  <p:stCondLst>
+                                    <p:cond delay="0"/>
+                                  </p:stCondLst>
+                                  <p:childTnLst>
+                                    <p:set>
+                                      <p:cBhvr>
+                                        <p:cTn id="6" dur="1" fill="hold">
+                                          <p:stCondLst>
+                                            <p:cond delay="0"/>
+                                          </p:stCondLst>
+                                        </p:cTn>
+                                        <p:tgtEl>
+                                          <p:spTgt spid="25">
+                                            <p:txEl>
+                                              <p:pRg st="0" end="0"/>
+                                            </p:txEl>
+                                          </p:spTgt>
+                                        </p:tgtEl>
+                                        <p:attrNameLst>
+                                          <p:attrName>style.visibility</p:attrName>
+                                        </p:attrNameLst>
+                                      </p:cBhvr>
+                                      <p:to>
+                                        <p:strVal val="visible"/>
+                                      </p:to>
+                                    </p:set>
+                                  </p:childTnLst>
+                                </p:cTn>
+                              </p:par>
+                              <p:par>
+                                <p:cTn id="7" presetID="1" presetClass="entr" presetSubtype="0" fill="hold" grpId="0" nodeType="withEffect">
+                                  <p:stCondLst>
+                                    <p:cond delay="0"/>
+                                  </p:stCondLst>
+                                  <p:childTnLst>
+                                    <p:set>
+                                      <p:cBhvr>
+                                        <p:cTn id="8" dur="1" fill="hold">
+                                          <p:stCondLst>
+                                            <p:cond delay="0"/>
+                                          </p:stCondLst>
+                                        </p:cTn>
+                                        <p:tgtEl>
+                                          <p:spTgt spid="39"/>
+                                        </p:tgtEl>
+                                        <p:attrNameLst>
+                                          <p:attrName>style.visibility</p:attrName>
+                                        </p:attrNameLst>
+                                      </p:cBhvr>
+                                      <p:to>
+                                        <p:strVal val="visible"/>
+                                      </p:to>
+                                    </p:set>
+                                  </p:childTnLst>
+                                </p:cTn>
+                              </p:par>
+                              <p:par>
+                                <p:cTn id="9" presetID="1" presetClass="entr" presetSubtype="0" fill="hold" nodeType="withEffect">
+                                  <p:stCondLst>
+                                    <p:cond delay="0"/>
+                                  </p:stCondLst>
+                                  <p:childTnLst>
+                                    <p:set>
+                                      <p:cBhvr>
+                                        <p:cTn id="10" dur="1" fill="hold">
+                                          <p:stCondLst>
+                                            <p:cond delay="0"/>
+                                          </p:stCondLst>
+                                        </p:cTn>
+                                        <p:tgtEl>
+                                          <p:spTgt spid="6"/>
+                                        </p:tgtEl>
+                                        <p:attrNameLst>
+                                          <p:attrName>style.visibility</p:attrName>
+                                        </p:attrNameLst>
+                                      </p:cBhvr>
+                                      <p:to>
+                                        <p:strVal val="visible"/>
+                                      </p:to>
+                                    </p:set>
+                                  </p:childTnLst>
+                                </p:cTn>
+                              </p:par>
+                            </p:childTnLst>
+                          </p:cTn>
+                        </p:par>
+                      </p:childTnLst>
+                    </p:cTn>
+                  </p:par>
+                </p:childTnLst>
+              </p:cTn>
+              <p:prevCondLst>
+                <p:cond evt="onPrev" delay="0">
+                  <p:tgtEl>
+                    <p:sldTgt/>
+                  </p:tgtEl>
+                </p:cond>
+              </p:prevCondLst>
+              <p:nextCondLst>
+                <p:cond evt="onNext" delay="0">
+                  <p:tgtEl>
+                    <p:sldTgt/>
+                  </p:tgtEl>
+                </p:cond>
+              </p:nextCondLst>
+            </p:seq>
+          </p:childTnLst>
+        </p:cTn>
+      </p:par>
+    </p:tnLst>
+    <p:bldLst>
+      <p:bldP spid="39" grpId="0"/>
+    </p:bldLst>
+  </p:timing>
 </p:sld>
 </file>
 
@@ -24713,7 +25503,6 @@
               <a:rPr lang="en-GB" dirty="0"/>
               <a:t>1</a:t>
             </a:r>
-            <a:endParaRPr lang="en-GB" dirty="0"/>
           </a:p>
         </p:txBody>
       </p:sp>
@@ -24757,7 +25546,6 @@
               <a:rPr lang="en-GB" dirty="0"/>
               <a:t>1</a:t>
             </a:r>
-            <a:endParaRPr lang="en-GB" dirty="0"/>
           </a:p>
         </p:txBody>
       </p:sp>
@@ -24845,7 +25633,6 @@
               <a:rPr lang="en-GB" dirty="0"/>
               <a:t>1</a:t>
             </a:r>
-            <a:endParaRPr lang="en-GB" dirty="0"/>
           </a:p>
         </p:txBody>
       </p:sp>
@@ -24889,7 +25676,6 @@
               <a:rPr lang="en-GB" dirty="0"/>
               <a:t>1</a:t>
             </a:r>
-            <a:endParaRPr lang="en-GB" dirty="0"/>
           </a:p>
         </p:txBody>
       </p:sp>
@@ -24977,7 +25763,6 @@
               <a:rPr lang="en-GB" dirty="0"/>
               <a:t>1</a:t>
             </a:r>
-            <a:endParaRPr lang="en-GB" dirty="0"/>
           </a:p>
         </p:txBody>
       </p:sp>
@@ -25069,11 +25854,6 @@
               </a:rPr>
               <a:t>1</a:t>
             </a:r>
-            <a:endParaRPr lang="en-GB" b="1" dirty="0">
-              <a:solidFill>
-                <a:srgbClr val="FF6600"/>
-              </a:solidFill>
-            </a:endParaRPr>
           </a:p>
         </p:txBody>
       </p:sp>
@@ -25121,11 +25901,6 @@
               </a:rPr>
               <a:t>1</a:t>
             </a:r>
-            <a:endParaRPr lang="en-GB" b="1" dirty="0">
-              <a:solidFill>
-                <a:srgbClr val="FF6600"/>
-              </a:solidFill>
-            </a:endParaRPr>
           </a:p>
         </p:txBody>
       </p:sp>
@@ -25261,11 +26036,6 @@
               </a:rPr>
               <a:t>1</a:t>
             </a:r>
-            <a:endParaRPr lang="en-GB" b="1" dirty="0">
-              <a:solidFill>
-                <a:srgbClr val="FF6600"/>
-              </a:solidFill>
-            </a:endParaRPr>
           </a:p>
         </p:txBody>
       </p:sp>
@@ -25313,11 +26083,6 @@
               </a:rPr>
               <a:t>1</a:t>
             </a:r>
-            <a:endParaRPr lang="en-GB" b="1" dirty="0">
-              <a:solidFill>
-                <a:srgbClr val="0000FF"/>
-              </a:solidFill>
-            </a:endParaRPr>
           </a:p>
         </p:txBody>
       </p:sp>
@@ -25513,11 +26278,6 @@
               </a:rPr>
               <a:t>1</a:t>
             </a:r>
-            <a:endParaRPr lang="en-GB" b="1" dirty="0">
-              <a:solidFill>
-                <a:srgbClr val="FF6600"/>
-              </a:solidFill>
-            </a:endParaRPr>
           </a:p>
         </p:txBody>
       </p:sp>
@@ -25565,11 +26325,6 @@
               </a:rPr>
               <a:t>1</a:t>
             </a:r>
-            <a:endParaRPr lang="en-GB" b="1" dirty="0">
-              <a:solidFill>
-                <a:srgbClr val="FF6600"/>
-              </a:solidFill>
-            </a:endParaRPr>
           </a:p>
         </p:txBody>
       </p:sp>
@@ -25831,11 +26586,6 @@
                 </a:rPr>
                 <a:t>5</a:t>
               </a:r>
-              <a:endParaRPr lang="en-GB" sz="1000" dirty="0">
-                <a:solidFill>
-                  <a:schemeClr val="tx1"/>
-                </a:solidFill>
-              </a:endParaRPr>
             </a:p>
           </p:txBody>
         </p:sp>
@@ -25883,11 +26633,6 @@
                 </a:rPr>
                 <a:t>4</a:t>
               </a:r>
-              <a:endParaRPr lang="en-GB" sz="1000" dirty="0">
-                <a:solidFill>
-                  <a:schemeClr val="tx1"/>
-                </a:solidFill>
-              </a:endParaRPr>
             </a:p>
           </p:txBody>
         </p:sp>
@@ -26039,11 +26784,6 @@
                 </a:rPr>
                 <a:t>1</a:t>
               </a:r>
-              <a:endParaRPr lang="en-GB" sz="1000" dirty="0">
-                <a:solidFill>
-                  <a:schemeClr val="tx1"/>
-                </a:solidFill>
-              </a:endParaRPr>
             </a:p>
           </p:txBody>
         </p:sp>
@@ -26195,11 +26935,6 @@
                 </a:rPr>
                 <a:t>9</a:t>
               </a:r>
-              <a:endParaRPr lang="en-GB" sz="1000" dirty="0">
-                <a:solidFill>
-                  <a:schemeClr val="tx1"/>
-                </a:solidFill>
-              </a:endParaRPr>
             </a:p>
           </p:txBody>
         </p:sp>
@@ -26322,6 +27057,142 @@
       <p:transition xmlns:p14="http://schemas.microsoft.com/office/powerpoint/2010/main" spd="slow"/>
     </mc:Fallback>
   </mc:AlternateContent>
+  <p:timing>
+    <p:tnLst>
+      <p:par>
+        <p:cTn xmlns:p14="http://schemas.microsoft.com/office/powerpoint/2010/main" id="1" dur="indefinite" restart="never" nodeType="tmRoot">
+          <p:childTnLst>
+            <p:seq concurrent="1" nextAc="seek">
+              <p:cTn id="2" dur="indefinite" nodeType="mainSeq">
+                <p:childTnLst>
+                  <p:par>
+                    <p:cTn id="3" fill="hold">
+                      <p:stCondLst>
+                        <p:cond delay="indefinite"/>
+                      </p:stCondLst>
+                      <p:childTnLst>
+                        <p:par>
+                          <p:cTn id="4" fill="hold">
+                            <p:stCondLst>
+                              <p:cond delay="0"/>
+                            </p:stCondLst>
+                            <p:childTnLst>
+                              <p:par>
+                                <p:cTn id="5" presetID="1" presetClass="entr" presetSubtype="0" fill="hold" nodeType="clickEffect">
+                                  <p:stCondLst>
+                                    <p:cond delay="0"/>
+                                  </p:stCondLst>
+                                  <p:childTnLst>
+                                    <p:set>
+                                      <p:cBhvr>
+                                        <p:cTn id="6" dur="1" fill="hold">
+                                          <p:stCondLst>
+                                            <p:cond delay="0"/>
+                                          </p:stCondLst>
+                                        </p:cTn>
+                                        <p:tgtEl>
+                                          <p:spTgt spid="24">
+                                            <p:txEl>
+                                              <p:pRg st="0" end="0"/>
+                                            </p:txEl>
+                                          </p:spTgt>
+                                        </p:tgtEl>
+                                        <p:attrNameLst>
+                                          <p:attrName>style.visibility</p:attrName>
+                                        </p:attrNameLst>
+                                      </p:cBhvr>
+                                      <p:to>
+                                        <p:strVal val="visible"/>
+                                      </p:to>
+                                    </p:set>
+                                  </p:childTnLst>
+                                </p:cTn>
+                              </p:par>
+                              <p:par>
+                                <p:cTn id="7" presetID="1" presetClass="entr" presetSubtype="0" fill="hold" grpId="0" nodeType="withEffect">
+                                  <p:stCondLst>
+                                    <p:cond delay="0"/>
+                                  </p:stCondLst>
+                                  <p:childTnLst>
+                                    <p:set>
+                                      <p:cBhvr>
+                                        <p:cTn id="8" dur="1" fill="hold">
+                                          <p:stCondLst>
+                                            <p:cond delay="0"/>
+                                          </p:stCondLst>
+                                        </p:cTn>
+                                        <p:tgtEl>
+                                          <p:spTgt spid="39"/>
+                                        </p:tgtEl>
+                                        <p:attrNameLst>
+                                          <p:attrName>style.visibility</p:attrName>
+                                        </p:attrNameLst>
+                                      </p:cBhvr>
+                                      <p:to>
+                                        <p:strVal val="visible"/>
+                                      </p:to>
+                                    </p:set>
+                                  </p:childTnLst>
+                                </p:cTn>
+                              </p:par>
+                              <p:par>
+                                <p:cTn id="9" presetID="1" presetClass="entr" presetSubtype="0" fill="hold" nodeType="withEffect">
+                                  <p:stCondLst>
+                                    <p:cond delay="0"/>
+                                  </p:stCondLst>
+                                  <p:childTnLst>
+                                    <p:set>
+                                      <p:cBhvr>
+                                        <p:cTn id="10" dur="1" fill="hold">
+                                          <p:stCondLst>
+                                            <p:cond delay="0"/>
+                                          </p:stCondLst>
+                                        </p:cTn>
+                                        <p:tgtEl>
+                                          <p:spTgt spid="40"/>
+                                        </p:tgtEl>
+                                        <p:attrNameLst>
+                                          <p:attrName>style.visibility</p:attrName>
+                                        </p:attrNameLst>
+                                      </p:cBhvr>
+                                      <p:to>
+                                        <p:strVal val="visible"/>
+                                      </p:to>
+                                    </p:set>
+                                  </p:childTnLst>
+                                </p:cTn>
+                              </p:par>
+                            </p:childTnLst>
+                          </p:cTn>
+                        </p:par>
+                      </p:childTnLst>
+                    </p:cTn>
+                  </p:par>
+                </p:childTnLst>
+              </p:cTn>
+              <p:prevCondLst>
+                <p:cond evt="onPrev" delay="0">
+                  <p:tgtEl>
+                    <p:sldTgt/>
+                  </p:tgtEl>
+                </p:cond>
+              </p:prevCondLst>
+              <p:nextCondLst>
+                <p:cond evt="onNext" delay="0">
+                  <p:tgtEl>
+                    <p:sldTgt/>
+                  </p:tgtEl>
+                </p:cond>
+              </p:nextCondLst>
+            </p:seq>
+          </p:childTnLst>
+        </p:cTn>
+      </p:par>
+    </p:tnLst>
+    <p:bldLst>
+      <p:bldP spid="39" grpId="0"/>
+    </p:bldLst>
+  </p:timing>
 </p:sld>
 </file>
 
@@ -26628,7 +27499,6 @@
               <a:rPr lang="en-GB" dirty="0"/>
               <a:t>1</a:t>
             </a:r>
-            <a:endParaRPr lang="en-GB" dirty="0"/>
           </a:p>
         </p:txBody>
       </p:sp>
@@ -26672,7 +27542,6 @@
               <a:rPr lang="en-GB" dirty="0"/>
               <a:t>1</a:t>
             </a:r>
-            <a:endParaRPr lang="en-GB" dirty="0"/>
           </a:p>
         </p:txBody>
       </p:sp>
@@ -26760,7 +27629,6 @@
               <a:rPr lang="en-GB" dirty="0"/>
               <a:t>1</a:t>
             </a:r>
-            <a:endParaRPr lang="en-GB" dirty="0"/>
           </a:p>
         </p:txBody>
       </p:sp>
@@ -26804,7 +27672,6 @@
               <a:rPr lang="en-GB" dirty="0"/>
               <a:t>1</a:t>
             </a:r>
-            <a:endParaRPr lang="en-GB" dirty="0"/>
           </a:p>
         </p:txBody>
       </p:sp>
@@ -26892,7 +27759,6 @@
               <a:rPr lang="en-GB" dirty="0"/>
               <a:t>1</a:t>
             </a:r>
-            <a:endParaRPr lang="en-GB" dirty="0"/>
           </a:p>
         </p:txBody>
       </p:sp>
@@ -26984,11 +27850,6 @@
               </a:rPr>
               <a:t>1</a:t>
             </a:r>
-            <a:endParaRPr lang="en-GB" b="1" dirty="0">
-              <a:solidFill>
-                <a:srgbClr val="FF6600"/>
-              </a:solidFill>
-            </a:endParaRPr>
           </a:p>
         </p:txBody>
       </p:sp>
@@ -27036,11 +27897,6 @@
               </a:rPr>
               <a:t>1</a:t>
             </a:r>
-            <a:endParaRPr lang="en-GB" b="1" dirty="0">
-              <a:solidFill>
-                <a:srgbClr val="FF6600"/>
-              </a:solidFill>
-            </a:endParaRPr>
           </a:p>
         </p:txBody>
       </p:sp>
@@ -27188,7 +28044,6 @@
               <a:rPr lang="en-GB" dirty="0"/>
               <a:t>1</a:t>
             </a:r>
-            <a:endParaRPr lang="en-GB" dirty="0"/>
           </a:p>
         </p:txBody>
       </p:sp>
@@ -27424,7 +28279,6 @@
               <a:rPr lang="en-GB" dirty="0"/>
               <a:t>1</a:t>
             </a:r>
-            <a:endParaRPr lang="en-GB" dirty="0"/>
           </a:p>
         </p:txBody>
       </p:sp>
@@ -27468,7 +28322,6 @@
               <a:rPr lang="en-GB" dirty="0"/>
               <a:t>1</a:t>
             </a:r>
-            <a:endParaRPr lang="en-GB" dirty="0"/>
           </a:p>
         </p:txBody>
       </p:sp>
@@ -27730,11 +28583,6 @@
                 </a:rPr>
                 <a:t>5</a:t>
               </a:r>
-              <a:endParaRPr lang="en-GB" sz="1000" b="1" dirty="0">
-                <a:solidFill>
-                  <a:srgbClr val="FF6600"/>
-                </a:solidFill>
-              </a:endParaRPr>
             </a:p>
           </p:txBody>
         </p:sp>
@@ -27782,11 +28630,6 @@
                 </a:rPr>
                 <a:t>4</a:t>
               </a:r>
-              <a:endParaRPr lang="en-GB" sz="1000" b="1" dirty="0">
-                <a:solidFill>
-                  <a:srgbClr val="FF6600"/>
-                </a:solidFill>
-              </a:endParaRPr>
             </a:p>
           </p:txBody>
         </p:sp>
@@ -27938,11 +28781,6 @@
                 </a:rPr>
                 <a:t>1</a:t>
               </a:r>
-              <a:endParaRPr lang="en-GB" sz="1000" dirty="0">
-                <a:solidFill>
-                  <a:schemeClr val="tx1"/>
-                </a:solidFill>
-              </a:endParaRPr>
             </a:p>
           </p:txBody>
         </p:sp>
@@ -28094,11 +28932,6 @@
                 </a:rPr>
                 <a:t>9</a:t>
               </a:r>
-              <a:endParaRPr lang="en-GB" sz="1000" dirty="0">
-                <a:solidFill>
-                  <a:schemeClr val="tx1"/>
-                </a:solidFill>
-              </a:endParaRPr>
             </a:p>
           </p:txBody>
         </p:sp>
@@ -28221,6 +29054,142 @@
       <p:transition xmlns:p14="http://schemas.microsoft.com/office/powerpoint/2010/main" spd="slow"/>
     </mc:Fallback>
   </mc:AlternateContent>
+  <p:timing>
+    <p:tnLst>
+      <p:par>
+        <p:cTn xmlns:p14="http://schemas.microsoft.com/office/powerpoint/2010/main" id="1" dur="indefinite" restart="never" nodeType="tmRoot">
+          <p:childTnLst>
+            <p:seq concurrent="1" nextAc="seek">
+              <p:cTn id="2" dur="indefinite" nodeType="mainSeq">
+                <p:childTnLst>
+                  <p:par>
+                    <p:cTn id="3" fill="hold">
+                      <p:stCondLst>
+                        <p:cond delay="indefinite"/>
+                      </p:stCondLst>
+                      <p:childTnLst>
+                        <p:par>
+                          <p:cTn id="4" fill="hold">
+                            <p:stCondLst>
+                              <p:cond delay="0"/>
+                            </p:stCondLst>
+                            <p:childTnLst>
+                              <p:par>
+                                <p:cTn id="5" presetID="1" presetClass="entr" presetSubtype="0" fill="hold" nodeType="clickEffect">
+                                  <p:stCondLst>
+                                    <p:cond delay="0"/>
+                                  </p:stCondLst>
+                                  <p:childTnLst>
+                                    <p:set>
+                                      <p:cBhvr>
+                                        <p:cTn id="6" dur="1" fill="hold">
+                                          <p:stCondLst>
+                                            <p:cond delay="0"/>
+                                          </p:stCondLst>
+                                        </p:cTn>
+                                        <p:tgtEl>
+                                          <p:spTgt spid="22">
+                                            <p:txEl>
+                                              <p:pRg st="0" end="0"/>
+                                            </p:txEl>
+                                          </p:spTgt>
+                                        </p:tgtEl>
+                                        <p:attrNameLst>
+                                          <p:attrName>style.visibility</p:attrName>
+                                        </p:attrNameLst>
+                                      </p:cBhvr>
+                                      <p:to>
+                                        <p:strVal val="visible"/>
+                                      </p:to>
+                                    </p:set>
+                                  </p:childTnLst>
+                                </p:cTn>
+                              </p:par>
+                              <p:par>
+                                <p:cTn id="7" presetID="1" presetClass="entr" presetSubtype="0" fill="hold" grpId="0" nodeType="withEffect">
+                                  <p:stCondLst>
+                                    <p:cond delay="0"/>
+                                  </p:stCondLst>
+                                  <p:childTnLst>
+                                    <p:set>
+                                      <p:cBhvr>
+                                        <p:cTn id="8" dur="1" fill="hold">
+                                          <p:stCondLst>
+                                            <p:cond delay="0"/>
+                                          </p:stCondLst>
+                                        </p:cTn>
+                                        <p:tgtEl>
+                                          <p:spTgt spid="39"/>
+                                        </p:tgtEl>
+                                        <p:attrNameLst>
+                                          <p:attrName>style.visibility</p:attrName>
+                                        </p:attrNameLst>
+                                      </p:cBhvr>
+                                      <p:to>
+                                        <p:strVal val="visible"/>
+                                      </p:to>
+                                    </p:set>
+                                  </p:childTnLst>
+                                </p:cTn>
+                              </p:par>
+                              <p:par>
+                                <p:cTn id="9" presetID="1" presetClass="entr" presetSubtype="0" fill="hold" nodeType="withEffect">
+                                  <p:stCondLst>
+                                    <p:cond delay="0"/>
+                                  </p:stCondLst>
+                                  <p:childTnLst>
+                                    <p:set>
+                                      <p:cBhvr>
+                                        <p:cTn id="10" dur="1" fill="hold">
+                                          <p:stCondLst>
+                                            <p:cond delay="0"/>
+                                          </p:stCondLst>
+                                        </p:cTn>
+                                        <p:tgtEl>
+                                          <p:spTgt spid="40"/>
+                                        </p:tgtEl>
+                                        <p:attrNameLst>
+                                          <p:attrName>style.visibility</p:attrName>
+                                        </p:attrNameLst>
+                                      </p:cBhvr>
+                                      <p:to>
+                                        <p:strVal val="visible"/>
+                                      </p:to>
+                                    </p:set>
+                                  </p:childTnLst>
+                                </p:cTn>
+                              </p:par>
+                            </p:childTnLst>
+                          </p:cTn>
+                        </p:par>
+                      </p:childTnLst>
+                    </p:cTn>
+                  </p:par>
+                </p:childTnLst>
+              </p:cTn>
+              <p:prevCondLst>
+                <p:cond evt="onPrev" delay="0">
+                  <p:tgtEl>
+                    <p:sldTgt/>
+                  </p:tgtEl>
+                </p:cond>
+              </p:prevCondLst>
+              <p:nextCondLst>
+                <p:cond evt="onNext" delay="0">
+                  <p:tgtEl>
+                    <p:sldTgt/>
+                  </p:tgtEl>
+                </p:cond>
+              </p:nextCondLst>
+            </p:seq>
+          </p:childTnLst>
+        </p:cTn>
+      </p:par>
+    </p:tnLst>
+    <p:bldLst>
+      <p:bldP spid="39" grpId="0"/>
+    </p:bldLst>
+  </p:timing>
 </p:sld>
 </file>
 
@@ -28328,7 +29297,6 @@
               <a:rPr lang="en-GB" dirty="0"/>
               <a:t>1</a:t>
             </a:r>
-            <a:endParaRPr lang="en-GB" dirty="0"/>
           </a:p>
         </p:txBody>
       </p:sp>
@@ -28372,7 +29340,6 @@
               <a:rPr lang="en-GB" dirty="0"/>
               <a:t>1</a:t>
             </a:r>
-            <a:endParaRPr lang="en-GB" dirty="0"/>
           </a:p>
         </p:txBody>
       </p:sp>
@@ -28460,7 +29427,6 @@
               <a:rPr lang="en-GB" dirty="0"/>
               <a:t>1</a:t>
             </a:r>
-            <a:endParaRPr lang="en-GB" dirty="0"/>
           </a:p>
         </p:txBody>
       </p:sp>
@@ -28504,7 +29470,6 @@
               <a:rPr lang="en-GB" dirty="0"/>
               <a:t>1</a:t>
             </a:r>
-            <a:endParaRPr lang="en-GB" dirty="0"/>
           </a:p>
         </p:txBody>
       </p:sp>
@@ -28592,7 +29557,6 @@
               <a:rPr lang="en-GB" dirty="0"/>
               <a:t>1</a:t>
             </a:r>
-            <a:endParaRPr lang="en-GB" dirty="0"/>
           </a:p>
         </p:txBody>
       </p:sp>
@@ -28640,11 +29604,6 @@
               </a:rPr>
               <a:t>0</a:t>
             </a:r>
-            <a:endParaRPr lang="en-GB" b="1" dirty="0">
-              <a:solidFill>
-                <a:srgbClr val="0000FF"/>
-              </a:solidFill>
-            </a:endParaRPr>
           </a:p>
         </p:txBody>
       </p:sp>
@@ -28688,7 +29647,6 @@
               <a:rPr lang="en-GB" dirty="0"/>
               <a:t>1</a:t>
             </a:r>
-            <a:endParaRPr lang="en-GB" dirty="0"/>
           </a:p>
         </p:txBody>
       </p:sp>
@@ -28732,7 +29690,6 @@
               <a:rPr lang="en-GB" dirty="0"/>
               <a:t>1</a:t>
             </a:r>
-            <a:endParaRPr lang="en-GB" dirty="0"/>
           </a:p>
         </p:txBody>
       </p:sp>
@@ -28864,7 +29821,6 @@
               <a:rPr lang="en-GB" dirty="0"/>
               <a:t>1</a:t>
             </a:r>
-            <a:endParaRPr lang="en-GB" dirty="0"/>
           </a:p>
         </p:txBody>
       </p:sp>
@@ -29104,11 +30060,6 @@
               </a:rPr>
               <a:t>1</a:t>
             </a:r>
-            <a:endParaRPr lang="en-GB" b="1" dirty="0">
-              <a:solidFill>
-                <a:srgbClr val="FF6600"/>
-              </a:solidFill>
-            </a:endParaRPr>
           </a:p>
         </p:txBody>
       </p:sp>
@@ -29156,11 +30107,6 @@
               </a:rPr>
               <a:t>1</a:t>
             </a:r>
-            <a:endParaRPr lang="en-GB" b="1" dirty="0">
-              <a:solidFill>
-                <a:srgbClr val="FF6600"/>
-              </a:solidFill>
-            </a:endParaRPr>
           </a:p>
         </p:txBody>
       </p:sp>
@@ -29430,11 +30376,6 @@
                 </a:rPr>
                 <a:t>5</a:t>
               </a:r>
-              <a:endParaRPr lang="en-GB" sz="1000" dirty="0">
-                <a:solidFill>
-                  <a:schemeClr val="tx1"/>
-                </a:solidFill>
-              </a:endParaRPr>
             </a:p>
           </p:txBody>
         </p:sp>
@@ -29482,11 +30423,6 @@
                 </a:rPr>
                 <a:t>4</a:t>
               </a:r>
-              <a:endParaRPr lang="en-GB" sz="1000" dirty="0">
-                <a:solidFill>
-                  <a:schemeClr val="tx1"/>
-                </a:solidFill>
-              </a:endParaRPr>
             </a:p>
           </p:txBody>
         </p:sp>
@@ -29638,11 +30574,6 @@
                 </a:rPr>
                 <a:t>1</a:t>
               </a:r>
-              <a:endParaRPr lang="en-GB" sz="1000" dirty="0">
-                <a:solidFill>
-                  <a:schemeClr val="tx1"/>
-                </a:solidFill>
-              </a:endParaRPr>
             </a:p>
           </p:txBody>
         </p:sp>
@@ -29794,11 +30725,6 @@
                 </a:rPr>
                 <a:t>9</a:t>
               </a:r>
-              <a:endParaRPr lang="en-GB" sz="1000" b="1" dirty="0">
-                <a:solidFill>
-                  <a:srgbClr val="FF6600"/>
-                </a:solidFill>
-              </a:endParaRPr>
             </a:p>
           </p:txBody>
         </p:sp>
@@ -29921,6 +30847,142 @@
       <p:transition xmlns:p14="http://schemas.microsoft.com/office/powerpoint/2010/main" spd="slow"/>
     </mc:Fallback>
   </mc:AlternateContent>
+  <p:timing>
+    <p:tnLst>
+      <p:par>
+        <p:cTn xmlns:p14="http://schemas.microsoft.com/office/powerpoint/2010/main" id="1" dur="indefinite" restart="never" nodeType="tmRoot">
+          <p:childTnLst>
+            <p:seq concurrent="1" nextAc="seek">
+              <p:cTn id="2" dur="indefinite" nodeType="mainSeq">
+                <p:childTnLst>
+                  <p:par>
+                    <p:cTn id="3" fill="hold">
+                      <p:stCondLst>
+                        <p:cond delay="indefinite"/>
+                      </p:stCondLst>
+                      <p:childTnLst>
+                        <p:par>
+                          <p:cTn id="4" fill="hold">
+                            <p:stCondLst>
+                              <p:cond delay="0"/>
+                            </p:stCondLst>
+                            <p:childTnLst>
+                              <p:par>
+                                <p:cTn id="5" presetID="1" presetClass="entr" presetSubtype="0" fill="hold" nodeType="clickEffect">
+                                  <p:stCondLst>
+                                    <p:cond delay="0"/>
+                                  </p:stCondLst>
+                                  <p:childTnLst>
+                                    <p:set>
+                                      <p:cBhvr>
+                                        <p:cTn id="6" dur="1" fill="hold">
+                                          <p:stCondLst>
+                                            <p:cond delay="0"/>
+                                          </p:stCondLst>
+                                        </p:cTn>
+                                        <p:tgtEl>
+                                          <p:spTgt spid="18">
+                                            <p:txEl>
+                                              <p:pRg st="0" end="0"/>
+                                            </p:txEl>
+                                          </p:spTgt>
+                                        </p:tgtEl>
+                                        <p:attrNameLst>
+                                          <p:attrName>style.visibility</p:attrName>
+                                        </p:attrNameLst>
+                                      </p:cBhvr>
+                                      <p:to>
+                                        <p:strVal val="visible"/>
+                                      </p:to>
+                                    </p:set>
+                                  </p:childTnLst>
+                                </p:cTn>
+                              </p:par>
+                              <p:par>
+                                <p:cTn id="7" presetID="1" presetClass="entr" presetSubtype="0" fill="hold" grpId="0" nodeType="withEffect">
+                                  <p:stCondLst>
+                                    <p:cond delay="0"/>
+                                  </p:stCondLst>
+                                  <p:childTnLst>
+                                    <p:set>
+                                      <p:cBhvr>
+                                        <p:cTn id="8" dur="1" fill="hold">
+                                          <p:stCondLst>
+                                            <p:cond delay="0"/>
+                                          </p:stCondLst>
+                                        </p:cTn>
+                                        <p:tgtEl>
+                                          <p:spTgt spid="39"/>
+                                        </p:tgtEl>
+                                        <p:attrNameLst>
+                                          <p:attrName>style.visibility</p:attrName>
+                                        </p:attrNameLst>
+                                      </p:cBhvr>
+                                      <p:to>
+                                        <p:strVal val="visible"/>
+                                      </p:to>
+                                    </p:set>
+                                  </p:childTnLst>
+                                </p:cTn>
+                              </p:par>
+                              <p:par>
+                                <p:cTn id="9" presetID="1" presetClass="entr" presetSubtype="0" fill="hold" nodeType="withEffect">
+                                  <p:stCondLst>
+                                    <p:cond delay="0"/>
+                                  </p:stCondLst>
+                                  <p:childTnLst>
+                                    <p:set>
+                                      <p:cBhvr>
+                                        <p:cTn id="10" dur="1" fill="hold">
+                                          <p:stCondLst>
+                                            <p:cond delay="0"/>
+                                          </p:stCondLst>
+                                        </p:cTn>
+                                        <p:tgtEl>
+                                          <p:spTgt spid="40"/>
+                                        </p:tgtEl>
+                                        <p:attrNameLst>
+                                          <p:attrName>style.visibility</p:attrName>
+                                        </p:attrNameLst>
+                                      </p:cBhvr>
+                                      <p:to>
+                                        <p:strVal val="visible"/>
+                                      </p:to>
+                                    </p:set>
+                                  </p:childTnLst>
+                                </p:cTn>
+                              </p:par>
+                            </p:childTnLst>
+                          </p:cTn>
+                        </p:par>
+                      </p:childTnLst>
+                    </p:cTn>
+                  </p:par>
+                </p:childTnLst>
+              </p:cTn>
+              <p:prevCondLst>
+                <p:cond evt="onPrev" delay="0">
+                  <p:tgtEl>
+                    <p:sldTgt/>
+                  </p:tgtEl>
+                </p:cond>
+              </p:prevCondLst>
+              <p:nextCondLst>
+                <p:cond evt="onNext" delay="0">
+                  <p:tgtEl>
+                    <p:sldTgt/>
+                  </p:tgtEl>
+                </p:cond>
+              </p:nextCondLst>
+            </p:seq>
+          </p:childTnLst>
+        </p:cTn>
+      </p:par>
+    </p:tnLst>
+    <p:bldLst>
+      <p:bldP spid="39" grpId="0"/>
+    </p:bldLst>
+  </p:timing>
 </p:sld>
 </file>
 
@@ -30028,7 +31090,6 @@
               <a:rPr lang="en-GB" dirty="0"/>
               <a:t>1</a:t>
             </a:r>
-            <a:endParaRPr lang="en-GB" dirty="0"/>
           </a:p>
         </p:txBody>
       </p:sp>
@@ -30072,7 +31133,6 @@
               <a:rPr lang="en-GB" dirty="0"/>
               <a:t>1</a:t>
             </a:r>
-            <a:endParaRPr lang="en-GB" dirty="0"/>
           </a:p>
         </p:txBody>
       </p:sp>
@@ -30160,7 +31220,6 @@
               <a:rPr lang="en-GB" dirty="0"/>
               <a:t>1</a:t>
             </a:r>
-            <a:endParaRPr lang="en-GB" dirty="0"/>
           </a:p>
         </p:txBody>
       </p:sp>
@@ -30204,7 +31263,6 @@
               <a:rPr lang="en-GB" dirty="0"/>
               <a:t>1</a:t>
             </a:r>
-            <a:endParaRPr lang="en-GB" dirty="0"/>
           </a:p>
         </p:txBody>
       </p:sp>
@@ -30292,7 +31350,6 @@
               <a:rPr lang="en-GB" dirty="0"/>
               <a:t>1</a:t>
             </a:r>
-            <a:endParaRPr lang="en-GB" dirty="0"/>
           </a:p>
         </p:txBody>
       </p:sp>
@@ -30340,11 +31397,6 @@
               </a:rPr>
               <a:t>0</a:t>
             </a:r>
-            <a:endParaRPr lang="en-GB" b="1" dirty="0">
-              <a:solidFill>
-                <a:srgbClr val="0000FF"/>
-              </a:solidFill>
-            </a:endParaRPr>
           </a:p>
         </p:txBody>
       </p:sp>
@@ -30388,7 +31440,6 @@
               <a:rPr lang="en-GB" dirty="0"/>
               <a:t>1</a:t>
             </a:r>
-            <a:endParaRPr lang="en-GB" dirty="0"/>
           </a:p>
         </p:txBody>
       </p:sp>
@@ -30432,7 +31483,6 @@
               <a:rPr lang="en-GB" dirty="0"/>
               <a:t>1</a:t>
             </a:r>
-            <a:endParaRPr lang="en-GB" dirty="0"/>
           </a:p>
         </p:txBody>
       </p:sp>
@@ -30572,7 +31622,6 @@
               <a:rPr lang="en-GB" dirty="0"/>
               <a:t>1</a:t>
             </a:r>
-            <a:endParaRPr lang="en-GB" dirty="0"/>
           </a:p>
         </p:txBody>
       </p:sp>
@@ -30620,11 +31669,6 @@
               </a:rPr>
               <a:t>1</a:t>
             </a:r>
-            <a:endParaRPr lang="en-GB" b="1" dirty="0">
-              <a:solidFill>
-                <a:srgbClr val="0000FF"/>
-              </a:solidFill>
-            </a:endParaRPr>
           </a:p>
         </p:txBody>
       </p:sp>
@@ -30672,11 +31716,6 @@
               </a:rPr>
               <a:t>1</a:t>
             </a:r>
-            <a:endParaRPr lang="en-GB" b="1" dirty="0">
-              <a:solidFill>
-                <a:srgbClr val="0000FF"/>
-              </a:solidFill>
-            </a:endParaRPr>
           </a:p>
         </p:txBody>
       </p:sp>
@@ -30824,7 +31863,6 @@
               <a:rPr lang="en-GB" dirty="0"/>
               <a:t>1</a:t>
             </a:r>
-            <a:endParaRPr lang="en-GB" dirty="0"/>
           </a:p>
         </p:txBody>
       </p:sp>
@@ -30868,7 +31906,6 @@
               <a:rPr lang="en-GB" dirty="0"/>
               <a:t>1</a:t>
             </a:r>
-            <a:endParaRPr lang="en-GB" dirty="0"/>
           </a:p>
         </p:txBody>
       </p:sp>
@@ -31130,11 +32167,6 @@
                 </a:rPr>
                 <a:t>5</a:t>
               </a:r>
-              <a:endParaRPr lang="en-GB" sz="1000" dirty="0">
-                <a:solidFill>
-                  <a:schemeClr val="tx1"/>
-                </a:solidFill>
-              </a:endParaRPr>
             </a:p>
           </p:txBody>
         </p:sp>
@@ -31182,11 +32214,6 @@
                 </a:rPr>
                 <a:t>4</a:t>
               </a:r>
-              <a:endParaRPr lang="en-GB" sz="1000" dirty="0">
-                <a:solidFill>
-                  <a:schemeClr val="tx1"/>
-                </a:solidFill>
-              </a:endParaRPr>
             </a:p>
           </p:txBody>
         </p:sp>
@@ -31338,11 +32365,6 @@
                 </a:rPr>
                 <a:t>1</a:t>
               </a:r>
-              <a:endParaRPr lang="en-GB" sz="1000" dirty="0">
-                <a:solidFill>
-                  <a:schemeClr val="tx1"/>
-                </a:solidFill>
-              </a:endParaRPr>
             </a:p>
           </p:txBody>
         </p:sp>
@@ -31494,11 +32516,6 @@
                 </a:rPr>
                 <a:t>9</a:t>
               </a:r>
-              <a:endParaRPr lang="en-GB" sz="1000" dirty="0">
-                <a:solidFill>
-                  <a:schemeClr val="tx1"/>
-                </a:solidFill>
-              </a:endParaRPr>
             </a:p>
           </p:txBody>
         </p:sp>
@@ -31555,6 +32572,13 @@
       <p:transition xmlns:p14="http://schemas.microsoft.com/office/powerpoint/2010/main" spd="slow"/>
     </mc:Fallback>
   </mc:AlternateContent>
+  <p:timing>
+    <p:tnLst>
+      <p:par>
+        <p:cTn xmlns:p14="http://schemas.microsoft.com/office/powerpoint/2010/main" id="1" dur="indefinite" restart="never" nodeType="tmRoot"/>
+      </p:par>
+    </p:tnLst>
+  </p:timing>
 </p:sld>
 </file>
 
@@ -31662,7 +32686,6 @@
               <a:rPr lang="en-GB" dirty="0"/>
               <a:t>1</a:t>
             </a:r>
-            <a:endParaRPr lang="en-GB" dirty="0"/>
           </a:p>
         </p:txBody>
       </p:sp>
@@ -31706,7 +32729,6 @@
               <a:rPr lang="en-GB" dirty="0"/>
               <a:t>1</a:t>
             </a:r>
-            <a:endParaRPr lang="en-GB" dirty="0"/>
           </a:p>
         </p:txBody>
       </p:sp>
@@ -31794,7 +32816,6 @@
               <a:rPr lang="en-GB" dirty="0"/>
               <a:t>1</a:t>
             </a:r>
-            <a:endParaRPr lang="en-GB" dirty="0"/>
           </a:p>
         </p:txBody>
       </p:sp>
@@ -31838,7 +32859,6 @@
               <a:rPr lang="en-GB" dirty="0"/>
               <a:t>1</a:t>
             </a:r>
-            <a:endParaRPr lang="en-GB" dirty="0"/>
           </a:p>
         </p:txBody>
       </p:sp>
@@ -31926,7 +32946,6 @@
               <a:rPr lang="en-GB" dirty="0"/>
               <a:t>1</a:t>
             </a:r>
-            <a:endParaRPr lang="en-GB" dirty="0"/>
           </a:p>
         </p:txBody>
       </p:sp>
@@ -31974,11 +32993,6 @@
               </a:rPr>
               <a:t>0</a:t>
             </a:r>
-            <a:endParaRPr lang="en-GB" b="1" dirty="0">
-              <a:solidFill>
-                <a:srgbClr val="0000FF"/>
-              </a:solidFill>
-            </a:endParaRPr>
           </a:p>
         </p:txBody>
       </p:sp>
@@ -32022,7 +33036,6 @@
               <a:rPr lang="en-GB" dirty="0"/>
               <a:t>1</a:t>
             </a:r>
-            <a:endParaRPr lang="en-GB" dirty="0"/>
           </a:p>
         </p:txBody>
       </p:sp>
@@ -32066,7 +33079,6 @@
               <a:rPr lang="en-GB" dirty="0"/>
               <a:t>1</a:t>
             </a:r>
-            <a:endParaRPr lang="en-GB" dirty="0"/>
           </a:p>
         </p:txBody>
       </p:sp>
@@ -32206,7 +33218,6 @@
               <a:rPr lang="en-GB" dirty="0"/>
               <a:t>1</a:t>
             </a:r>
-            <a:endParaRPr lang="en-GB" dirty="0"/>
           </a:p>
         </p:txBody>
       </p:sp>
@@ -32254,11 +33265,6 @@
               </a:rPr>
               <a:t>1</a:t>
             </a:r>
-            <a:endParaRPr lang="en-GB" b="1" dirty="0">
-              <a:solidFill>
-                <a:srgbClr val="0000FF"/>
-              </a:solidFill>
-            </a:endParaRPr>
           </a:p>
         </p:txBody>
       </p:sp>
@@ -32306,11 +33312,6 @@
               </a:rPr>
               <a:t>1</a:t>
             </a:r>
-            <a:endParaRPr lang="en-GB" b="1" dirty="0">
-              <a:solidFill>
-                <a:srgbClr val="0000FF"/>
-              </a:solidFill>
-            </a:endParaRPr>
           </a:p>
         </p:txBody>
       </p:sp>
@@ -32458,7 +33459,6 @@
               <a:rPr lang="en-GB" dirty="0"/>
               <a:t>1</a:t>
             </a:r>
-            <a:endParaRPr lang="en-GB" dirty="0"/>
           </a:p>
         </p:txBody>
       </p:sp>
@@ -32502,7 +33502,6 @@
               <a:rPr lang="en-GB" dirty="0"/>
               <a:t>1</a:t>
             </a:r>
-            <a:endParaRPr lang="en-GB" dirty="0"/>
           </a:p>
         </p:txBody>
       </p:sp>
@@ -32764,11 +33763,6 @@
                 </a:rPr>
                 <a:t>5</a:t>
               </a:r>
-              <a:endParaRPr lang="en-GB" sz="1000" dirty="0">
-                <a:solidFill>
-                  <a:schemeClr val="tx1"/>
-                </a:solidFill>
-              </a:endParaRPr>
             </a:p>
           </p:txBody>
         </p:sp>
@@ -32816,11 +33810,6 @@
                 </a:rPr>
                 <a:t>4</a:t>
               </a:r>
-              <a:endParaRPr lang="en-GB" sz="1000" dirty="0">
-                <a:solidFill>
-                  <a:schemeClr val="tx1"/>
-                </a:solidFill>
-              </a:endParaRPr>
             </a:p>
           </p:txBody>
         </p:sp>
@@ -32972,11 +33961,6 @@
                 </a:rPr>
                 <a:t>1</a:t>
               </a:r>
-              <a:endParaRPr lang="en-GB" sz="1000" dirty="0">
-                <a:solidFill>
-                  <a:schemeClr val="tx1"/>
-                </a:solidFill>
-              </a:endParaRPr>
             </a:p>
           </p:txBody>
         </p:sp>
@@ -33128,11 +34112,6 @@
                 </a:rPr>
                 <a:t>9</a:t>
               </a:r>
-              <a:endParaRPr lang="en-GB" sz="1000" dirty="0">
-                <a:solidFill>
-                  <a:schemeClr val="tx1"/>
-                </a:solidFill>
-              </a:endParaRPr>
             </a:p>
           </p:txBody>
         </p:sp>
@@ -33195,11 +34174,6 @@
                 </a:rPr>
                 <a:t>0</a:t>
               </a:r>
-              <a:endParaRPr lang="en-GB" b="1" dirty="0">
-                <a:solidFill>
-                  <a:srgbClr val="0000FF"/>
-                </a:solidFill>
-              </a:endParaRPr>
             </a:p>
           </p:txBody>
         </p:sp>
@@ -33243,7 +34217,6 @@
                 <a:rPr lang="en-GB" dirty="0"/>
                 <a:t>1</a:t>
               </a:r>
-              <a:endParaRPr lang="en-GB" dirty="0"/>
             </a:p>
           </p:txBody>
         </p:sp>
@@ -33435,7 +34408,6 @@
                 <a:rPr lang="en-GB" dirty="0"/>
                 <a:t>1</a:t>
               </a:r>
-              <a:endParaRPr lang="en-GB" dirty="0"/>
             </a:p>
           </p:txBody>
         </p:sp>
@@ -33483,11 +34455,6 @@
                 </a:rPr>
                 <a:t>1</a:t>
               </a:r>
-              <a:endParaRPr lang="en-GB" b="1" dirty="0">
-                <a:solidFill>
-                  <a:srgbClr val="0000FF"/>
-                </a:solidFill>
-              </a:endParaRPr>
             </a:p>
           </p:txBody>
         </p:sp>
@@ -33535,11 +34502,6 @@
                 </a:rPr>
                 <a:t>1</a:t>
               </a:r>
-              <a:endParaRPr lang="en-GB" b="1" dirty="0">
-                <a:solidFill>
-                  <a:srgbClr val="0000FF"/>
-                </a:solidFill>
-              </a:endParaRPr>
             </a:p>
           </p:txBody>
         </p:sp>
@@ -33583,7 +34545,6 @@
                 <a:rPr lang="en-GB" dirty="0"/>
                 <a:t>1</a:t>
               </a:r>
-              <a:endParaRPr lang="en-GB" dirty="0"/>
             </a:p>
           </p:txBody>
         </p:sp>
@@ -33627,7 +34588,6 @@
                 <a:rPr lang="en-GB" dirty="0"/>
                 <a:t>1</a:t>
               </a:r>
-              <a:endParaRPr lang="en-GB" dirty="0"/>
             </a:p>
           </p:txBody>
         </p:sp>
@@ -33774,7 +34734,6 @@
                 <a:rPr lang="en-GB" dirty="0"/>
                 <a:t>1</a:t>
               </a:r>
-              <a:endParaRPr lang="en-GB" dirty="0"/>
             </a:p>
           </p:txBody>
         </p:sp>
@@ -33950,7 +34909,6 @@
                 <a:rPr lang="en-GB" dirty="0"/>
                 <a:t>1</a:t>
               </a:r>
-              <a:endParaRPr lang="en-GB" dirty="0"/>
             </a:p>
           </p:txBody>
         </p:sp>
@@ -34042,11 +35000,6 @@
                 </a:rPr>
                 <a:t>1</a:t>
               </a:r>
-              <a:endParaRPr lang="en-GB" b="1" dirty="0">
-                <a:solidFill>
-                  <a:srgbClr val="0000FF"/>
-                </a:solidFill>
-              </a:endParaRPr>
             </a:p>
           </p:txBody>
         </p:sp>
@@ -34090,7 +35043,6 @@
                 <a:rPr lang="en-GB" dirty="0"/>
                 <a:t>1</a:t>
               </a:r>
-              <a:endParaRPr lang="en-GB" dirty="0"/>
             </a:p>
           </p:txBody>
         </p:sp>
@@ -34277,7 +35229,6 @@
                 <a:rPr lang="en-GB" dirty="0"/>
                 <a:t>1</a:t>
               </a:r>
-              <a:endParaRPr lang="en-GB" dirty="0"/>
             </a:p>
           </p:txBody>
         </p:sp>
@@ -34457,7 +35408,6 @@
                 <a:rPr lang="en-GB" dirty="0"/>
                 <a:t>1</a:t>
               </a:r>
-              <a:endParaRPr lang="en-GB" dirty="0"/>
             </a:p>
           </p:txBody>
         </p:sp>
@@ -34505,11 +35455,6 @@
                 </a:rPr>
                 <a:t>1</a:t>
               </a:r>
-              <a:endParaRPr lang="en-GB" b="1" dirty="0">
-                <a:solidFill>
-                  <a:srgbClr val="0000FF"/>
-                </a:solidFill>
-              </a:endParaRPr>
             </a:p>
           </p:txBody>
         </p:sp>
@@ -34597,7 +35542,6 @@
                 <a:rPr lang="en-GB" dirty="0"/>
                 <a:t>1</a:t>
               </a:r>
-              <a:endParaRPr lang="en-GB" dirty="0"/>
             </a:p>
           </p:txBody>
         </p:sp>
@@ -34641,7 +35585,6 @@
                 <a:rPr lang="en-GB" dirty="0"/>
                 <a:t>1</a:t>
               </a:r>
-              <a:endParaRPr lang="en-GB" dirty="0"/>
             </a:p>
           </p:txBody>
         </p:sp>
@@ -34784,7 +35727,6 @@
                 <a:rPr lang="en-GB" dirty="0"/>
                 <a:t>1</a:t>
               </a:r>
-              <a:endParaRPr lang="en-GB" dirty="0"/>
             </a:p>
           </p:txBody>
         </p:sp>
@@ -35243,11 +36185,6 @@
                 </a:rPr>
                 <a:t>0</a:t>
               </a:r>
-              <a:endParaRPr lang="en-GB" b="1" dirty="0">
-                <a:solidFill>
-                  <a:srgbClr val="0000FF"/>
-                </a:solidFill>
-              </a:endParaRPr>
             </a:p>
           </p:txBody>
         </p:sp>
@@ -35587,7 +36524,6 @@
                 <a:rPr lang="en-GB" dirty="0"/>
                 <a:t>1</a:t>
               </a:r>
-              <a:endParaRPr lang="en-GB" dirty="0"/>
             </a:p>
           </p:txBody>
         </p:sp>
@@ -35631,7 +36567,6 @@
                 <a:rPr lang="en-GB" dirty="0"/>
                 <a:t>1</a:t>
               </a:r>
-              <a:endParaRPr lang="en-GB" dirty="0"/>
             </a:p>
           </p:txBody>
         </p:sp>
@@ -35856,7 +36791,7 @@
         </p:nvSpPr>
         <p:spPr>
           <a:xfrm>
-            <a:off x="406400" y="3314700"/>
+            <a:off x="558800" y="3251200"/>
             <a:ext cx="1574800" cy="646331"/>
           </a:xfrm>
           <a:prstGeom prst="rect">
@@ -36048,6 +36983,514 @@
       <p:transition xmlns:p14="http://schemas.microsoft.com/office/powerpoint/2010/main" spd="slow"/>
     </mc:Fallback>
   </mc:AlternateContent>
+  <p:timing>
+    <p:tnLst>
+      <p:par>
+        <p:cTn xmlns:p14="http://schemas.microsoft.com/office/powerpoint/2010/main" id="1" dur="indefinite" restart="never" nodeType="tmRoot">
+          <p:childTnLst>
+            <p:seq concurrent="1" nextAc="seek">
+              <p:cTn id="2" dur="indefinite" nodeType="mainSeq">
+                <p:childTnLst>
+                  <p:par>
+                    <p:cTn id="3" fill="hold">
+                      <p:stCondLst>
+                        <p:cond delay="indefinite"/>
+                      </p:stCondLst>
+                      <p:childTnLst>
+                        <p:par>
+                          <p:cTn id="4" fill="hold">
+                            <p:stCondLst>
+                              <p:cond delay="0"/>
+                            </p:stCondLst>
+                            <p:childTnLst>
+                              <p:par>
+                                <p:cTn id="5" presetID="1" presetClass="entr" presetSubtype="0" fill="hold" nodeType="clickEffect">
+                                  <p:stCondLst>
+                                    <p:cond delay="0"/>
+                                  </p:stCondLst>
+                                  <p:childTnLst>
+                                    <p:set>
+                                      <p:cBhvr>
+                                        <p:cTn id="6" dur="1" fill="hold">
+                                          <p:stCondLst>
+                                            <p:cond delay="0"/>
+                                          </p:stCondLst>
+                                        </p:cTn>
+                                        <p:tgtEl>
+                                          <p:spTgt spid="52"/>
+                                        </p:tgtEl>
+                                        <p:attrNameLst>
+                                          <p:attrName>style.visibility</p:attrName>
+                                        </p:attrNameLst>
+                                      </p:cBhvr>
+                                      <p:to>
+                                        <p:strVal val="visible"/>
+                                      </p:to>
+                                    </p:set>
+                                  </p:childTnLst>
+                                </p:cTn>
+                              </p:par>
+                              <p:par>
+                                <p:cTn id="7" presetID="1" presetClass="entr" presetSubtype="0" fill="hold" grpId="0" nodeType="withEffect">
+                                  <p:stCondLst>
+                                    <p:cond delay="0"/>
+                                  </p:stCondLst>
+                                  <p:childTnLst>
+                                    <p:set>
+                                      <p:cBhvr>
+                                        <p:cTn id="8" dur="1" fill="hold">
+                                          <p:stCondLst>
+                                            <p:cond delay="0"/>
+                                          </p:stCondLst>
+                                        </p:cTn>
+                                        <p:tgtEl>
+                                          <p:spTgt spid="7"/>
+                                        </p:tgtEl>
+                                        <p:attrNameLst>
+                                          <p:attrName>style.visibility</p:attrName>
+                                        </p:attrNameLst>
+                                      </p:cBhvr>
+                                      <p:to>
+                                        <p:strVal val="visible"/>
+                                      </p:to>
+                                    </p:set>
+                                  </p:childTnLst>
+                                </p:cTn>
+                              </p:par>
+                            </p:childTnLst>
+                          </p:cTn>
+                        </p:par>
+                      </p:childTnLst>
+                    </p:cTn>
+                  </p:par>
+                  <p:par>
+                    <p:cTn id="9" fill="hold">
+                      <p:stCondLst>
+                        <p:cond delay="indefinite"/>
+                      </p:stCondLst>
+                      <p:childTnLst>
+                        <p:par>
+                          <p:cTn id="10" fill="hold">
+                            <p:stCondLst>
+                              <p:cond delay="0"/>
+                            </p:stCondLst>
+                            <p:childTnLst>
+                              <p:par>
+                                <p:cTn id="11" presetID="1" presetClass="entr" presetSubtype="0" fill="hold" grpId="0" nodeType="clickEffect">
+                                  <p:stCondLst>
+                                    <p:cond delay="0"/>
+                                  </p:stCondLst>
+                                  <p:childTnLst>
+                                    <p:set>
+                                      <p:cBhvr>
+                                        <p:cTn id="12" dur="1" fill="hold">
+                                          <p:stCondLst>
+                                            <p:cond delay="0"/>
+                                          </p:stCondLst>
+                                        </p:cTn>
+                                        <p:tgtEl>
+                                          <p:spTgt spid="3"/>
+                                        </p:tgtEl>
+                                        <p:attrNameLst>
+                                          <p:attrName>style.visibility</p:attrName>
+                                        </p:attrNameLst>
+                                      </p:cBhvr>
+                                      <p:to>
+                                        <p:strVal val="visible"/>
+                                      </p:to>
+                                    </p:set>
+                                  </p:childTnLst>
+                                </p:cTn>
+                              </p:par>
+                            </p:childTnLst>
+                          </p:cTn>
+                        </p:par>
+                      </p:childTnLst>
+                    </p:cTn>
+                  </p:par>
+                  <p:par>
+                    <p:cTn id="13" fill="hold">
+                      <p:stCondLst>
+                        <p:cond delay="indefinite"/>
+                      </p:stCondLst>
+                      <p:childTnLst>
+                        <p:par>
+                          <p:cTn id="14" fill="hold">
+                            <p:stCondLst>
+                              <p:cond delay="0"/>
+                            </p:stCondLst>
+                            <p:childTnLst>
+                              <p:par>
+                                <p:cTn id="15" presetID="1" presetClass="entr" presetSubtype="0" fill="hold" nodeType="clickEffect">
+                                  <p:stCondLst>
+                                    <p:cond delay="0"/>
+                                  </p:stCondLst>
+                                  <p:childTnLst>
+                                    <p:set>
+                                      <p:cBhvr>
+                                        <p:cTn id="16" dur="1" fill="hold">
+                                          <p:stCondLst>
+                                            <p:cond delay="0"/>
+                                          </p:stCondLst>
+                                        </p:cTn>
+                                        <p:tgtEl>
+                                          <p:spTgt spid="79"/>
+                                        </p:tgtEl>
+                                        <p:attrNameLst>
+                                          <p:attrName>style.visibility</p:attrName>
+                                        </p:attrNameLst>
+                                      </p:cBhvr>
+                                      <p:to>
+                                        <p:strVal val="visible"/>
+                                      </p:to>
+                                    </p:set>
+                                  </p:childTnLst>
+                                </p:cTn>
+                              </p:par>
+                              <p:par>
+                                <p:cTn id="17" presetID="1" presetClass="entr" presetSubtype="0" fill="hold" grpId="0" nodeType="withEffect">
+                                  <p:stCondLst>
+                                    <p:cond delay="0"/>
+                                  </p:stCondLst>
+                                  <p:childTnLst>
+                                    <p:set>
+                                      <p:cBhvr>
+                                        <p:cTn id="18" dur="1" fill="hold">
+                                          <p:stCondLst>
+                                            <p:cond delay="0"/>
+                                          </p:stCondLst>
+                                        </p:cTn>
+                                        <p:tgtEl>
+                                          <p:spTgt spid="119"/>
+                                        </p:tgtEl>
+                                        <p:attrNameLst>
+                                          <p:attrName>style.visibility</p:attrName>
+                                        </p:attrNameLst>
+                                      </p:cBhvr>
+                                      <p:to>
+                                        <p:strVal val="visible"/>
+                                      </p:to>
+                                    </p:set>
+                                  </p:childTnLst>
+                                </p:cTn>
+                              </p:par>
+                            </p:childTnLst>
+                          </p:cTn>
+                        </p:par>
+                      </p:childTnLst>
+                    </p:cTn>
+                  </p:par>
+                  <p:par>
+                    <p:cTn id="19" fill="hold">
+                      <p:stCondLst>
+                        <p:cond delay="indefinite"/>
+                      </p:stCondLst>
+                      <p:childTnLst>
+                        <p:par>
+                          <p:cTn id="20" fill="hold">
+                            <p:stCondLst>
+                              <p:cond delay="0"/>
+                            </p:stCondLst>
+                            <p:childTnLst>
+                              <p:par>
+                                <p:cTn id="21" presetID="1" presetClass="entr" presetSubtype="0" fill="hold" grpId="0" nodeType="clickEffect">
+                                  <p:stCondLst>
+                                    <p:cond delay="0"/>
+                                  </p:stCondLst>
+                                  <p:childTnLst>
+                                    <p:set>
+                                      <p:cBhvr>
+                                        <p:cTn id="22" dur="1" fill="hold">
+                                          <p:stCondLst>
+                                            <p:cond delay="0"/>
+                                          </p:stCondLst>
+                                        </p:cTn>
+                                        <p:tgtEl>
+                                          <p:spTgt spid="115"/>
+                                        </p:tgtEl>
+                                        <p:attrNameLst>
+                                          <p:attrName>style.visibility</p:attrName>
+                                        </p:attrNameLst>
+                                      </p:cBhvr>
+                                      <p:to>
+                                        <p:strVal val="visible"/>
+                                      </p:to>
+                                    </p:set>
+                                  </p:childTnLst>
+                                </p:cTn>
+                              </p:par>
+                            </p:childTnLst>
+                          </p:cTn>
+                        </p:par>
+                      </p:childTnLst>
+                    </p:cTn>
+                  </p:par>
+                  <p:par>
+                    <p:cTn id="23" fill="hold">
+                      <p:stCondLst>
+                        <p:cond delay="indefinite"/>
+                      </p:stCondLst>
+                      <p:childTnLst>
+                        <p:par>
+                          <p:cTn id="24" fill="hold">
+                            <p:stCondLst>
+                              <p:cond delay="0"/>
+                            </p:stCondLst>
+                            <p:childTnLst>
+                              <p:par>
+                                <p:cTn id="25" presetID="1" presetClass="entr" presetSubtype="0" fill="hold" nodeType="clickEffect">
+                                  <p:stCondLst>
+                                    <p:cond delay="0"/>
+                                  </p:stCondLst>
+                                  <p:childTnLst>
+                                    <p:set>
+                                      <p:cBhvr>
+                                        <p:cTn id="26" dur="1" fill="hold">
+                                          <p:stCondLst>
+                                            <p:cond delay="0"/>
+                                          </p:stCondLst>
+                                        </p:cTn>
+                                        <p:tgtEl>
+                                          <p:spTgt spid="91"/>
+                                        </p:tgtEl>
+                                        <p:attrNameLst>
+                                          <p:attrName>style.visibility</p:attrName>
+                                        </p:attrNameLst>
+                                      </p:cBhvr>
+                                      <p:to>
+                                        <p:strVal val="visible"/>
+                                      </p:to>
+                                    </p:set>
+                                  </p:childTnLst>
+                                </p:cTn>
+                              </p:par>
+                              <p:par>
+                                <p:cTn id="27" presetID="1" presetClass="entr" presetSubtype="0" fill="hold" grpId="0" nodeType="withEffect">
+                                  <p:stCondLst>
+                                    <p:cond delay="0"/>
+                                  </p:stCondLst>
+                                  <p:childTnLst>
+                                    <p:set>
+                                      <p:cBhvr>
+                                        <p:cTn id="28" dur="1" fill="hold">
+                                          <p:stCondLst>
+                                            <p:cond delay="0"/>
+                                          </p:stCondLst>
+                                        </p:cTn>
+                                        <p:tgtEl>
+                                          <p:spTgt spid="118"/>
+                                        </p:tgtEl>
+                                        <p:attrNameLst>
+                                          <p:attrName>style.visibility</p:attrName>
+                                        </p:attrNameLst>
+                                      </p:cBhvr>
+                                      <p:to>
+                                        <p:strVal val="visible"/>
+                                      </p:to>
+                                    </p:set>
+                                  </p:childTnLst>
+                                </p:cTn>
+                              </p:par>
+                            </p:childTnLst>
+                          </p:cTn>
+                        </p:par>
+                      </p:childTnLst>
+                    </p:cTn>
+                  </p:par>
+                  <p:par>
+                    <p:cTn id="29" fill="hold">
+                      <p:stCondLst>
+                        <p:cond delay="indefinite"/>
+                      </p:stCondLst>
+                      <p:childTnLst>
+                        <p:par>
+                          <p:cTn id="30" fill="hold">
+                            <p:stCondLst>
+                              <p:cond delay="0"/>
+                            </p:stCondLst>
+                            <p:childTnLst>
+                              <p:par>
+                                <p:cTn id="31" presetID="1" presetClass="entr" presetSubtype="0" fill="hold" grpId="0" nodeType="clickEffect">
+                                  <p:stCondLst>
+                                    <p:cond delay="0"/>
+                                  </p:stCondLst>
+                                  <p:childTnLst>
+                                    <p:set>
+                                      <p:cBhvr>
+                                        <p:cTn id="32" dur="1" fill="hold">
+                                          <p:stCondLst>
+                                            <p:cond delay="0"/>
+                                          </p:stCondLst>
+                                        </p:cTn>
+                                        <p:tgtEl>
+                                          <p:spTgt spid="116"/>
+                                        </p:tgtEl>
+                                        <p:attrNameLst>
+                                          <p:attrName>style.visibility</p:attrName>
+                                        </p:attrNameLst>
+                                      </p:cBhvr>
+                                      <p:to>
+                                        <p:strVal val="visible"/>
+                                      </p:to>
+                                    </p:set>
+                                  </p:childTnLst>
+                                </p:cTn>
+                              </p:par>
+                            </p:childTnLst>
+                          </p:cTn>
+                        </p:par>
+                      </p:childTnLst>
+                    </p:cTn>
+                  </p:par>
+                  <p:par>
+                    <p:cTn id="33" fill="hold">
+                      <p:stCondLst>
+                        <p:cond delay="indefinite"/>
+                      </p:stCondLst>
+                      <p:childTnLst>
+                        <p:par>
+                          <p:cTn id="34" fill="hold">
+                            <p:stCondLst>
+                              <p:cond delay="0"/>
+                            </p:stCondLst>
+                            <p:childTnLst>
+                              <p:par>
+                                <p:cTn id="35" presetID="1" presetClass="entr" presetSubtype="0" fill="hold" nodeType="clickEffect">
+                                  <p:stCondLst>
+                                    <p:cond delay="0"/>
+                                  </p:stCondLst>
+                                  <p:childTnLst>
+                                    <p:set>
+                                      <p:cBhvr>
+                                        <p:cTn id="36" dur="1" fill="hold">
+                                          <p:stCondLst>
+                                            <p:cond delay="0"/>
+                                          </p:stCondLst>
+                                        </p:cTn>
+                                        <p:tgtEl>
+                                          <p:spTgt spid="103"/>
+                                        </p:tgtEl>
+                                        <p:attrNameLst>
+                                          <p:attrName>style.visibility</p:attrName>
+                                        </p:attrNameLst>
+                                      </p:cBhvr>
+                                      <p:to>
+                                        <p:strVal val="visible"/>
+                                      </p:to>
+                                    </p:set>
+                                  </p:childTnLst>
+                                </p:cTn>
+                              </p:par>
+                              <p:par>
+                                <p:cTn id="37" presetID="1" presetClass="entr" presetSubtype="0" fill="hold" grpId="0" nodeType="withEffect">
+                                  <p:stCondLst>
+                                    <p:cond delay="0"/>
+                                  </p:stCondLst>
+                                  <p:childTnLst>
+                                    <p:set>
+                                      <p:cBhvr>
+                                        <p:cTn id="38" dur="1" fill="hold">
+                                          <p:stCondLst>
+                                            <p:cond delay="0"/>
+                                          </p:stCondLst>
+                                        </p:cTn>
+                                        <p:tgtEl>
+                                          <p:spTgt spid="120"/>
+                                        </p:tgtEl>
+                                        <p:attrNameLst>
+                                          <p:attrName>style.visibility</p:attrName>
+                                        </p:attrNameLst>
+                                      </p:cBhvr>
+                                      <p:to>
+                                        <p:strVal val="visible"/>
+                                      </p:to>
+                                    </p:set>
+                                  </p:childTnLst>
+                                </p:cTn>
+                              </p:par>
+                            </p:childTnLst>
+                          </p:cTn>
+                        </p:par>
+                      </p:childTnLst>
+                    </p:cTn>
+                  </p:par>
+                  <p:par>
+                    <p:cTn id="39" fill="hold">
+                      <p:stCondLst>
+                        <p:cond delay="indefinite"/>
+                      </p:stCondLst>
+                      <p:childTnLst>
+                        <p:par>
+                          <p:cTn id="40" fill="hold">
+                            <p:stCondLst>
+                              <p:cond delay="0"/>
+                            </p:stCondLst>
+                            <p:childTnLst>
+                              <p:par>
+                                <p:cTn id="41" presetID="1" presetClass="entr" presetSubtype="0" fill="hold" grpId="0" nodeType="clickEffect">
+                                  <p:stCondLst>
+                                    <p:cond delay="0"/>
+                                  </p:stCondLst>
+                                  <p:childTnLst>
+                                    <p:set>
+                                      <p:cBhvr>
+                                        <p:cTn id="42" dur="1" fill="hold">
+                                          <p:stCondLst>
+                                            <p:cond delay="0"/>
+                                          </p:stCondLst>
+                                        </p:cTn>
+                                        <p:tgtEl>
+                                          <p:spTgt spid="117"/>
+                                        </p:tgtEl>
+                                        <p:attrNameLst>
+                                          <p:attrName>style.visibility</p:attrName>
+                                        </p:attrNameLst>
+                                      </p:cBhvr>
+                                      <p:to>
+                                        <p:strVal val="visible"/>
+                                      </p:to>
+                                    </p:set>
+                                  </p:childTnLst>
+                                </p:cTn>
+                              </p:par>
+                            </p:childTnLst>
+                          </p:cTn>
+                        </p:par>
+                      </p:childTnLst>
+                    </p:cTn>
+                  </p:par>
+                </p:childTnLst>
+              </p:cTn>
+              <p:prevCondLst>
+                <p:cond evt="onPrev" delay="0">
+                  <p:tgtEl>
+                    <p:sldTgt/>
+                  </p:tgtEl>
+                </p:cond>
+              </p:prevCondLst>
+              <p:nextCondLst>
+                <p:cond evt="onNext" delay="0">
+                  <p:tgtEl>
+                    <p:sldTgt/>
+                  </p:tgtEl>
+                </p:cond>
+              </p:nextCondLst>
+            </p:seq>
+          </p:childTnLst>
+        </p:cTn>
+      </p:par>
+    </p:tnLst>
+    <p:bldLst>
+      <p:bldP spid="3" grpId="0"/>
+      <p:bldP spid="115" grpId="0"/>
+      <p:bldP spid="116" grpId="0"/>
+      <p:bldP spid="117" grpId="0"/>
+      <p:bldP spid="7" grpId="0"/>
+      <p:bldP spid="118" grpId="0"/>
+      <p:bldP spid="119" grpId="0"/>
+      <p:bldP spid="120" grpId="0"/>
+    </p:bldLst>
+  </p:timing>
 </p:sld>
 </file>
 
@@ -36155,7 +37598,6 @@
               <a:rPr lang="en-GB" dirty="0"/>
               <a:t>1</a:t>
             </a:r>
-            <a:endParaRPr lang="en-GB" dirty="0"/>
           </a:p>
         </p:txBody>
       </p:sp>
@@ -36199,7 +37641,6 @@
               <a:rPr lang="en-GB" dirty="0"/>
               <a:t>1</a:t>
             </a:r>
-            <a:endParaRPr lang="en-GB" dirty="0"/>
           </a:p>
         </p:txBody>
       </p:sp>
@@ -36287,7 +37728,6 @@
               <a:rPr lang="en-GB" dirty="0"/>
               <a:t>1</a:t>
             </a:r>
-            <a:endParaRPr lang="en-GB" dirty="0"/>
           </a:p>
         </p:txBody>
       </p:sp>
@@ -36331,7 +37771,6 @@
               <a:rPr lang="en-GB" dirty="0"/>
               <a:t>1</a:t>
             </a:r>
-            <a:endParaRPr lang="en-GB" dirty="0"/>
           </a:p>
         </p:txBody>
       </p:sp>
@@ -36419,7 +37858,6 @@
               <a:rPr lang="en-GB" dirty="0"/>
               <a:t>1</a:t>
             </a:r>
-            <a:endParaRPr lang="en-GB" dirty="0"/>
           </a:p>
         </p:txBody>
       </p:sp>
@@ -36467,11 +37905,6 @@
               </a:rPr>
               <a:t>0</a:t>
             </a:r>
-            <a:endParaRPr lang="en-GB" b="1" dirty="0">
-              <a:solidFill>
-                <a:srgbClr val="0000FF"/>
-              </a:solidFill>
-            </a:endParaRPr>
           </a:p>
         </p:txBody>
       </p:sp>
@@ -36515,7 +37948,6 @@
               <a:rPr lang="en-GB" dirty="0"/>
               <a:t>1</a:t>
             </a:r>
-            <a:endParaRPr lang="en-GB" dirty="0"/>
           </a:p>
         </p:txBody>
       </p:sp>
@@ -36559,7 +37991,6 @@
               <a:rPr lang="en-GB" dirty="0"/>
               <a:t>1</a:t>
             </a:r>
-            <a:endParaRPr lang="en-GB" dirty="0"/>
           </a:p>
         </p:txBody>
       </p:sp>
@@ -36699,7 +38130,6 @@
               <a:rPr lang="en-GB" dirty="0"/>
               <a:t>1</a:t>
             </a:r>
-            <a:endParaRPr lang="en-GB" dirty="0"/>
           </a:p>
         </p:txBody>
       </p:sp>
@@ -36747,11 +38177,6 @@
               </a:rPr>
               <a:t>1</a:t>
             </a:r>
-            <a:endParaRPr lang="en-GB" b="1" dirty="0">
-              <a:solidFill>
-                <a:srgbClr val="0000FF"/>
-              </a:solidFill>
-            </a:endParaRPr>
           </a:p>
         </p:txBody>
       </p:sp>
@@ -36799,11 +38224,6 @@
               </a:rPr>
               <a:t>1</a:t>
             </a:r>
-            <a:endParaRPr lang="en-GB" b="1" dirty="0">
-              <a:solidFill>
-                <a:srgbClr val="0000FF"/>
-              </a:solidFill>
-            </a:endParaRPr>
           </a:p>
         </p:txBody>
       </p:sp>
@@ -36951,7 +38371,6 @@
               <a:rPr lang="en-GB" dirty="0"/>
               <a:t>1</a:t>
             </a:r>
-            <a:endParaRPr lang="en-GB" dirty="0"/>
           </a:p>
         </p:txBody>
       </p:sp>
@@ -36995,7 +38414,6 @@
               <a:rPr lang="en-GB" dirty="0"/>
               <a:t>1</a:t>
             </a:r>
-            <a:endParaRPr lang="en-GB" dirty="0"/>
           </a:p>
         </p:txBody>
       </p:sp>
@@ -37257,11 +38675,6 @@
                 </a:rPr>
                 <a:t>5</a:t>
               </a:r>
-              <a:endParaRPr lang="en-GB" sz="1000" dirty="0">
-                <a:solidFill>
-                  <a:schemeClr val="tx1"/>
-                </a:solidFill>
-              </a:endParaRPr>
             </a:p>
           </p:txBody>
         </p:sp>
@@ -37309,11 +38722,6 @@
                 </a:rPr>
                 <a:t>4</a:t>
               </a:r>
-              <a:endParaRPr lang="en-GB" sz="1000" dirty="0">
-                <a:solidFill>
-                  <a:schemeClr val="tx1"/>
-                </a:solidFill>
-              </a:endParaRPr>
             </a:p>
           </p:txBody>
         </p:sp>
@@ -37465,11 +38873,6 @@
                 </a:rPr>
                 <a:t>1</a:t>
               </a:r>
-              <a:endParaRPr lang="en-GB" sz="1000" dirty="0">
-                <a:solidFill>
-                  <a:schemeClr val="tx1"/>
-                </a:solidFill>
-              </a:endParaRPr>
             </a:p>
           </p:txBody>
         </p:sp>
@@ -37621,11 +39024,6 @@
                 </a:rPr>
                 <a:t>9</a:t>
               </a:r>
-              <a:endParaRPr lang="en-GB" sz="1000" dirty="0">
-                <a:solidFill>
-                  <a:schemeClr val="tx1"/>
-                </a:solidFill>
-              </a:endParaRPr>
             </a:p>
           </p:txBody>
         </p:sp>
@@ -37688,11 +39086,6 @@
                 </a:rPr>
                 <a:t>0</a:t>
               </a:r>
-              <a:endParaRPr lang="en-GB" b="1" dirty="0">
-                <a:solidFill>
-                  <a:srgbClr val="0000FF"/>
-                </a:solidFill>
-              </a:endParaRPr>
             </a:p>
           </p:txBody>
         </p:sp>
@@ -37736,7 +39129,6 @@
                 <a:rPr lang="en-GB" dirty="0"/>
                 <a:t>1</a:t>
               </a:r>
-              <a:endParaRPr lang="en-GB" dirty="0"/>
             </a:p>
           </p:txBody>
         </p:sp>
@@ -37928,7 +39320,6 @@
                 <a:rPr lang="en-GB" dirty="0"/>
                 <a:t>1</a:t>
               </a:r>
-              <a:endParaRPr lang="en-GB" dirty="0"/>
             </a:p>
           </p:txBody>
         </p:sp>
@@ -37976,11 +39367,6 @@
                 </a:rPr>
                 <a:t>1</a:t>
               </a:r>
-              <a:endParaRPr lang="en-GB" b="1" dirty="0">
-                <a:solidFill>
-                  <a:srgbClr val="0000FF"/>
-                </a:solidFill>
-              </a:endParaRPr>
             </a:p>
           </p:txBody>
         </p:sp>
@@ -38028,11 +39414,6 @@
                 </a:rPr>
                 <a:t>1</a:t>
               </a:r>
-              <a:endParaRPr lang="en-GB" b="1" dirty="0">
-                <a:solidFill>
-                  <a:srgbClr val="0000FF"/>
-                </a:solidFill>
-              </a:endParaRPr>
             </a:p>
           </p:txBody>
         </p:sp>
@@ -38076,7 +39457,6 @@
                 <a:rPr lang="en-GB" dirty="0"/>
                 <a:t>1</a:t>
               </a:r>
-              <a:endParaRPr lang="en-GB" dirty="0"/>
             </a:p>
           </p:txBody>
         </p:sp>
@@ -38120,7 +39500,6 @@
                 <a:rPr lang="en-GB" dirty="0"/>
                 <a:t>1</a:t>
               </a:r>
-              <a:endParaRPr lang="en-GB" dirty="0"/>
             </a:p>
           </p:txBody>
         </p:sp>
@@ -38265,11 +39644,6 @@
                 </a:rPr>
                 <a:t>0</a:t>
               </a:r>
-              <a:endParaRPr lang="en-GB" dirty="0">
-                <a:solidFill>
-                  <a:schemeClr val="tx1"/>
-                </a:solidFill>
-              </a:endParaRPr>
             </a:p>
           </p:txBody>
         </p:sp>
@@ -38317,11 +39691,6 @@
                 </a:rPr>
                 <a:t>1</a:t>
               </a:r>
-              <a:endParaRPr lang="en-GB" dirty="0">
-                <a:solidFill>
-                  <a:schemeClr val="tx1"/>
-                </a:solidFill>
-              </a:endParaRPr>
             </a:p>
           </p:txBody>
         </p:sp>
@@ -38369,11 +39738,6 @@
                 </a:rPr>
                 <a:t>1</a:t>
               </a:r>
-              <a:endParaRPr lang="en-GB" dirty="0">
-                <a:solidFill>
-                  <a:schemeClr val="tx1"/>
-                </a:solidFill>
-              </a:endParaRPr>
             </a:p>
           </p:txBody>
         </p:sp>
@@ -38488,11 +39852,6 @@
                 </a:rPr>
                 <a:t>4</a:t>
               </a:r>
-              <a:endParaRPr lang="en-GB" sz="1000" dirty="0">
-                <a:solidFill>
-                  <a:schemeClr val="tx1"/>
-                </a:solidFill>
-              </a:endParaRPr>
             </a:p>
           </p:txBody>
         </p:sp>
@@ -38644,11 +40003,6 @@
                 </a:rPr>
                 <a:t>1</a:t>
               </a:r>
-              <a:endParaRPr lang="en-GB" sz="1000" dirty="0">
-                <a:solidFill>
-                  <a:schemeClr val="tx1"/>
-                </a:solidFill>
-              </a:endParaRPr>
             </a:p>
           </p:txBody>
         </p:sp>
@@ -38743,6 +40097,13 @@
       <p:transition xmlns:p14="http://schemas.microsoft.com/office/powerpoint/2010/main" spd="slow"/>
     </mc:Fallback>
   </mc:AlternateContent>
+  <p:timing>
+    <p:tnLst>
+      <p:par>
+        <p:cTn xmlns:p14="http://schemas.microsoft.com/office/powerpoint/2010/main" id="1" dur="indefinite" restart="never" nodeType="tmRoot"/>
+      </p:par>
+    </p:tnLst>
+  </p:timing>
 </p:sld>
 </file>
 
@@ -38886,6 +40247,13 @@
       <p:transition xmlns:p14="http://schemas.microsoft.com/office/powerpoint/2010/main" spd="slow"/>
     </mc:Fallback>
   </mc:AlternateContent>
+  <p:timing>
+    <p:tnLst>
+      <p:par>
+        <p:cTn xmlns:p14="http://schemas.microsoft.com/office/powerpoint/2010/main" id="1" dur="indefinite" restart="never" nodeType="tmRoot"/>
+      </p:par>
+    </p:tnLst>
+  </p:timing>
 </p:sld>
 </file>
 
@@ -39041,6 +40409,13 @@
       <p:transition xmlns:p14="http://schemas.microsoft.com/office/powerpoint/2010/main" spd="slow"/>
     </mc:Fallback>
   </mc:AlternateContent>
+  <p:timing>
+    <p:tnLst>
+      <p:par>
+        <p:cTn xmlns:p14="http://schemas.microsoft.com/office/powerpoint/2010/main" id="1" dur="indefinite" restart="never" nodeType="tmRoot"/>
+      </p:par>
+    </p:tnLst>
+  </p:timing>
 </p:sld>
 </file>
 
@@ -39839,6 +41214,13 @@
       <p:transition xmlns:p14="http://schemas.microsoft.com/office/powerpoint/2010/main" spd="slow"/>
     </mc:Fallback>
   </mc:AlternateContent>
+  <p:timing>
+    <p:tnLst>
+      <p:par>
+        <p:cTn xmlns:p14="http://schemas.microsoft.com/office/powerpoint/2010/main" id="1" dur="indefinite" restart="never" nodeType="tmRoot"/>
+      </p:par>
+    </p:tnLst>
+  </p:timing>
 </p:sld>
 </file>
 
@@ -39983,6 +41365,13 @@
       <p:transition xmlns:p14="http://schemas.microsoft.com/office/powerpoint/2010/main" spd="slow"/>
     </mc:Fallback>
   </mc:AlternateContent>
+  <p:timing>
+    <p:tnLst>
+      <p:par>
+        <p:cTn xmlns:p14="http://schemas.microsoft.com/office/powerpoint/2010/main" id="1" dur="indefinite" restart="never" nodeType="tmRoot"/>
+      </p:par>
+    </p:tnLst>
+  </p:timing>
 </p:sld>
 </file>
 
@@ -40142,6 +41531,13 @@
       <p:transition xmlns:p14="http://schemas.microsoft.com/office/powerpoint/2010/main" spd="slow"/>
     </mc:Fallback>
   </mc:AlternateContent>
+  <p:timing>
+    <p:tnLst>
+      <p:par>
+        <p:cTn xmlns:p14="http://schemas.microsoft.com/office/powerpoint/2010/main" id="1" dur="indefinite" restart="never" nodeType="tmRoot"/>
+      </p:par>
+    </p:tnLst>
+  </p:timing>
 </p:sld>
 </file>
 
@@ -40490,6 +41886,13 @@
       <p:transition xmlns:p14="http://schemas.microsoft.com/office/powerpoint/2010/main" spd="slow"/>
     </mc:Fallback>
   </mc:AlternateContent>
+  <p:timing>
+    <p:tnLst>
+      <p:par>
+        <p:cTn xmlns:p14="http://schemas.microsoft.com/office/powerpoint/2010/main" id="1" dur="indefinite" restart="never" nodeType="tmRoot"/>
+      </p:par>
+    </p:tnLst>
+  </p:timing>
 </p:sld>
 </file>
 
@@ -40598,6 +42001,13 @@
       <p:transition xmlns:p14="http://schemas.microsoft.com/office/powerpoint/2010/main" spd="slow"/>
     </mc:Fallback>
   </mc:AlternateContent>
+  <p:timing>
+    <p:tnLst>
+      <p:par>
+        <p:cTn xmlns:p14="http://schemas.microsoft.com/office/powerpoint/2010/main" id="1" dur="indefinite" restart="never" nodeType="tmRoot"/>
+      </p:par>
+    </p:tnLst>
+  </p:timing>
 </p:sld>
 </file>
 
@@ -40706,6 +42116,13 @@
       <p:transition xmlns:p14="http://schemas.microsoft.com/office/powerpoint/2010/main" spd="slow"/>
     </mc:Fallback>
   </mc:AlternateContent>
+  <p:timing>
+    <p:tnLst>
+      <p:par>
+        <p:cTn xmlns:p14="http://schemas.microsoft.com/office/powerpoint/2010/main" id="1" dur="indefinite" restart="never" nodeType="tmRoot"/>
+      </p:par>
+    </p:tnLst>
+  </p:timing>
 </p:sld>
 </file>
 

</xml_diff>

<commit_message>
Delete conclusions slide for now
</commit_message>
<xml_diff>
--- a/abft-training.pptx
+++ b/abft-training.pptx
@@ -5,10 +5,10 @@
     <p:sldMasterId id="2147483649" r:id="rId3"/>
   </p:sldMasterIdLst>
   <p:notesMasterIdLst>
-    <p:notesMasterId r:id="rId46"/>
+    <p:notesMasterId r:id="rId45"/>
   </p:notesMasterIdLst>
   <p:handoutMasterIdLst>
-    <p:handoutMasterId r:id="rId47"/>
+    <p:handoutMasterId r:id="rId46"/>
   </p:handoutMasterIdLst>
   <p:sldIdLst>
     <p:sldId id="257" r:id="rId4"/>
@@ -52,7 +52,6 @@
     <p:sldId id="615" r:id="rId42"/>
     <p:sldId id="614" r:id="rId43"/>
     <p:sldId id="588" r:id="rId44"/>
-    <p:sldId id="589" r:id="rId45"/>
   </p:sldIdLst>
   <p:sldSz cx="9144000" cy="6858000" type="screen4x3"/>
   <p:notesSz cx="6858000" cy="9144000"/>
@@ -41987,121 +41986,6 @@
     <p:extLst>
       <p:ext uri="{BB962C8B-B14F-4D97-AF65-F5344CB8AC3E}">
         <p14:creationId xmlns:p14="http://schemas.microsoft.com/office/powerpoint/2010/main" val="1795682848"/>
-      </p:ext>
-    </p:extLst>
-  </p:cSld>
-  <p:clrMapOvr>
-    <a:masterClrMapping/>
-  </p:clrMapOvr>
-  <mc:AlternateContent xmlns:mc="http://schemas.openxmlformats.org/markup-compatibility/2006" xmlns:p14="http://schemas.microsoft.com/office/powerpoint/2010/main">
-    <mc:Choice Requires="p14">
-      <p:transition spd="slow" p14:dur="2000"/>
-    </mc:Choice>
-    <mc:Fallback xmlns="">
-      <p:transition xmlns:p14="http://schemas.microsoft.com/office/powerpoint/2010/main" spd="slow"/>
-    </mc:Fallback>
-  </mc:AlternateContent>
-  <p:timing>
-    <p:tnLst>
-      <p:par>
-        <p:cTn xmlns:p14="http://schemas.microsoft.com/office/powerpoint/2010/main" id="1" dur="indefinite" restart="never" nodeType="tmRoot"/>
-      </p:par>
-    </p:tnLst>
-  </p:timing>
-</p:sld>
-</file>
-
-<file path=ppt/slides/slide42.xml><?xml version="1.0" encoding="utf-8"?>
-<p:sld xmlns:a="http://schemas.openxmlformats.org/drawingml/2006/main" xmlns:r="http://schemas.openxmlformats.org/officeDocument/2006/relationships" xmlns:p="http://schemas.openxmlformats.org/presentationml/2006/main">
-  <p:cSld>
-    <p:spTree>
-      <p:nvGrpSpPr>
-        <p:cNvPr id="1" name=""/>
-        <p:cNvGrpSpPr/>
-        <p:nvPr/>
-      </p:nvGrpSpPr>
-      <p:grpSpPr>
-        <a:xfrm>
-          <a:off x="0" y="0"/>
-          <a:ext cx="0" cy="0"/>
-          <a:chOff x="0" y="0"/>
-          <a:chExt cx="0" cy="0"/>
-        </a:xfrm>
-      </p:grpSpPr>
-      <p:sp>
-        <p:nvSpPr>
-          <p:cNvPr id="2" name="Title 1"/>
-          <p:cNvSpPr>
-            <a:spLocks noGrp="1"/>
-          </p:cNvSpPr>
-          <p:nvPr>
-            <p:ph type="title"/>
-          </p:nvPr>
-        </p:nvSpPr>
-        <p:spPr/>
-        <p:txBody>
-          <a:bodyPr/>
-          <a:lstStyle/>
-          <a:p>
-            <a:r>
-              <a:rPr lang="en-GB" dirty="0" smtClean="0"/>
-              <a:t>Conclusions</a:t>
-            </a:r>
-            <a:endParaRPr lang="en-GB" dirty="0"/>
-          </a:p>
-        </p:txBody>
-      </p:sp>
-      <p:sp>
-        <p:nvSpPr>
-          <p:cNvPr id="3" name="Content Placeholder 2"/>
-          <p:cNvSpPr>
-            <a:spLocks noGrp="1"/>
-          </p:cNvSpPr>
-          <p:nvPr>
-            <p:ph idx="1"/>
-          </p:nvPr>
-        </p:nvSpPr>
-        <p:spPr/>
-        <p:txBody>
-          <a:bodyPr/>
-          <a:lstStyle/>
-          <a:p>
-            <a:r>
-              <a:rPr lang="en-GB" dirty="0" smtClean="0"/>
-              <a:t>TODO: Conclusions</a:t>
-            </a:r>
-            <a:endParaRPr lang="en-GB" dirty="0"/>
-          </a:p>
-        </p:txBody>
-      </p:sp>
-      <p:sp>
-        <p:nvSpPr>
-          <p:cNvPr id="4" name="Slide Number Placeholder 3"/>
-          <p:cNvSpPr>
-            <a:spLocks noGrp="1"/>
-          </p:cNvSpPr>
-          <p:nvPr>
-            <p:ph type="sldNum" sz="quarter" idx="10"/>
-          </p:nvPr>
-        </p:nvSpPr>
-        <p:spPr/>
-        <p:txBody>
-          <a:bodyPr/>
-          <a:lstStyle/>
-          <a:p>
-            <a:fld id="{D9B8CB04-7B95-2844-BD15-B133C35E4786}" type="slidenum">
-              <a:rPr lang="en-GB" smtClean="0"/>
-              <a:pPr/>
-              <a:t>42</a:t>
-            </a:fld>
-            <a:endParaRPr lang="en-GB"/>
-          </a:p>
-        </p:txBody>
-      </p:sp>
-    </p:spTree>
-    <p:extLst>
-      <p:ext uri="{BB962C8B-B14F-4D97-AF65-F5344CB8AC3E}">
-        <p14:creationId xmlns:p14="http://schemas.microsoft.com/office/powerpoint/2010/main" val="3370687389"/>
       </p:ext>
     </p:extLst>
   </p:cSld>

</xml_diff>

<commit_message>
Add slides describing exercise
</commit_message>
<xml_diff>
--- a/abft-training.pptx
+++ b/abft-training.pptx
@@ -5,10 +5,10 @@
     <p:sldMasterId id="2147483649" r:id="rId3"/>
   </p:sldMasterIdLst>
   <p:notesMasterIdLst>
-    <p:notesMasterId r:id="rId47"/>
+    <p:notesMasterId r:id="rId49"/>
   </p:notesMasterIdLst>
   <p:handoutMasterIdLst>
-    <p:handoutMasterId r:id="rId48"/>
+    <p:handoutMasterId r:id="rId50"/>
   </p:handoutMasterIdLst>
   <p:sldIdLst>
     <p:sldId id="257" r:id="rId4"/>
@@ -53,7 +53,9 @@
     <p:sldId id="613" r:id="rId43"/>
     <p:sldId id="615" r:id="rId44"/>
     <p:sldId id="614" r:id="rId45"/>
-    <p:sldId id="588" r:id="rId46"/>
+    <p:sldId id="618" r:id="rId46"/>
+    <p:sldId id="588" r:id="rId47"/>
+    <p:sldId id="619" r:id="rId48"/>
   </p:sldIdLst>
   <p:sldSz cx="9144000" cy="6858000" type="screen4x3"/>
   <p:notesSz cx="6858000" cy="9144000"/>
@@ -2233,7 +2235,7 @@
           <a:p>
             <a:r>
               <a:rPr lang="en-GB" dirty="0" smtClean="0"/>
-              <a:t>100B non-zeros in 0.1% of 10Mx10M matrix</a:t>
+              <a:t>10B non-zeros in 0.01% of 10Mx10M matrix</a:t>
             </a:r>
             <a:endParaRPr lang="en-GB" dirty="0"/>
           </a:p>
@@ -3010,11 +3012,7 @@
           <a:p>
             <a:r>
               <a:rPr lang="en-GB" dirty="0" smtClean="0"/>
-              <a:t>Masks will change if you change where you store </a:t>
-            </a:r>
-            <a:r>
-              <a:rPr lang="en-GB" smtClean="0"/>
-              <a:t>the parity bits</a:t>
+              <a:t>Masks will change if you change where you store the parity bits</a:t>
             </a:r>
             <a:endParaRPr lang="en-GB" dirty="0"/>
           </a:p>
@@ -3316,6 +3314,91 @@
     <p:extLst>
       <p:ext uri="{BB962C8B-B14F-4D97-AF65-F5344CB8AC3E}">
         <p14:creationId xmlns:p14="http://schemas.microsoft.com/office/powerpoint/2010/main" val="645188229"/>
+      </p:ext>
+    </p:extLst>
+  </p:cSld>
+  <p:clrMapOvr>
+    <a:masterClrMapping/>
+  </p:clrMapOvr>
+</p:notes>
+</file>
+
+<file path=ppt/notesSlides/notesSlide31.xml><?xml version="1.0" encoding="utf-8"?>
+<p:notes xmlns:a="http://schemas.openxmlformats.org/drawingml/2006/main" xmlns:r="http://schemas.openxmlformats.org/officeDocument/2006/relationships" xmlns:p="http://schemas.openxmlformats.org/presentationml/2006/main">
+  <p:cSld>
+    <p:spTree>
+      <p:nvGrpSpPr>
+        <p:cNvPr id="1" name=""/>
+        <p:cNvGrpSpPr/>
+        <p:nvPr/>
+      </p:nvGrpSpPr>
+      <p:grpSpPr>
+        <a:xfrm>
+          <a:off x="0" y="0"/>
+          <a:ext cx="0" cy="0"/>
+          <a:chOff x="0" y="0"/>
+          <a:chExt cx="0" cy="0"/>
+        </a:xfrm>
+      </p:grpSpPr>
+      <p:sp>
+        <p:nvSpPr>
+          <p:cNvPr id="2" name="Slide Image Placeholder 1"/>
+          <p:cNvSpPr>
+            <a:spLocks noGrp="1" noRot="1" noChangeAspect="1"/>
+          </p:cNvSpPr>
+          <p:nvPr>
+            <p:ph type="sldImg"/>
+          </p:nvPr>
+        </p:nvSpPr>
+        <p:spPr/>
+      </p:sp>
+      <p:sp>
+        <p:nvSpPr>
+          <p:cNvPr id="3" name="Notes Placeholder 2"/>
+          <p:cNvSpPr>
+            <a:spLocks noGrp="1"/>
+          </p:cNvSpPr>
+          <p:nvPr>
+            <p:ph type="body" idx="1"/>
+          </p:nvPr>
+        </p:nvSpPr>
+        <p:spPr/>
+        <p:txBody>
+          <a:bodyPr/>
+          <a:lstStyle/>
+          <a:p>
+            <a:endParaRPr lang="en-GB" dirty="0"/>
+          </a:p>
+        </p:txBody>
+      </p:sp>
+      <p:sp>
+        <p:nvSpPr>
+          <p:cNvPr id="4" name="Slide Number Placeholder 3"/>
+          <p:cNvSpPr>
+            <a:spLocks noGrp="1"/>
+          </p:cNvSpPr>
+          <p:nvPr>
+            <p:ph type="sldNum" sz="quarter" idx="10"/>
+          </p:nvPr>
+        </p:nvSpPr>
+        <p:spPr/>
+        <p:txBody>
+          <a:bodyPr/>
+          <a:lstStyle/>
+          <a:p>
+            <a:fld id="{1C811BE7-51AF-BD41-88D3-08D74CFB37BF}" type="slidenum">
+              <a:rPr lang="en-GB" smtClean="0"/>
+              <a:pPr/>
+              <a:t>43</a:t>
+            </a:fld>
+            <a:endParaRPr lang="en-GB"/>
+          </a:p>
+        </p:txBody>
+      </p:sp>
+    </p:spTree>
+    <p:extLst>
+      <p:ext uri="{BB962C8B-B14F-4D97-AF65-F5344CB8AC3E}">
+        <p14:creationId xmlns:p14="http://schemas.microsoft.com/office/powerpoint/2010/main" val="259544647"/>
       </p:ext>
     </p:extLst>
   </p:cSld>
@@ -13104,7 +13187,7 @@
           <a:p>
             <a:r>
               <a:rPr lang="en-GB" sz="2600" dirty="0" smtClean="0"/>
-              <a:t>Can protects </a:t>
+              <a:t>Can protect </a:t>
             </a:r>
             <a:r>
               <a:rPr lang="en-GB" sz="2600" dirty="0" smtClean="0"/>
@@ -13351,7 +13434,7 @@
             </a:r>
             <a:r>
               <a:rPr lang="en-GB" dirty="0" smtClean="0"/>
-              <a:t> is the unknown vector</a:t>
+              <a:t> is the unknown vector that we wish to compute</a:t>
             </a:r>
             <a:endParaRPr lang="en-GB" dirty="0"/>
           </a:p>
@@ -18175,11 +18258,15 @@
             </a:r>
             <a:r>
               <a:rPr lang="en-GB" dirty="0" smtClean="0"/>
-              <a:t> (but not correct) two</a:t>
+              <a:t> (but not correct) </a:t>
+            </a:r>
+            <a:r>
+              <a:rPr lang="en-GB" dirty="0" smtClean="0"/>
+              <a:t>double-</a:t>
             </a:r>
             <a:r>
               <a:rPr lang="en-GB" dirty="0"/>
-              <a:t>-bit </a:t>
+              <a:t>bit </a:t>
             </a:r>
             <a:r>
               <a:rPr lang="en-GB" dirty="0" smtClean="0"/>
@@ -25310,7 +25397,7 @@
           <a:p>
             <a:r>
               <a:rPr lang="en-GB" dirty="0" smtClean="0"/>
-              <a:t>These systems will often involve extremely large matrices, that mostly contain non-zero values</a:t>
+              <a:t>These systems will often involve extremely large matrices, that contain mostly non-zero values</a:t>
             </a:r>
           </a:p>
           <a:p>
@@ -42884,7 +42971,7 @@
             <a:pPr lvl="1"/>
             <a:r>
               <a:rPr lang="en-GB" sz="2400" dirty="0" smtClean="0"/>
-              <a:t>0.1% of a 10M x 10M matrix is four orders of magnitude larger than a 10M element vector</a:t>
+              <a:t>0.01% of a 10M x 10M matrix is three orders of magnitude larger than a 10M element vector</a:t>
             </a:r>
           </a:p>
           <a:p>
@@ -43307,7 +43394,7 @@
 </file>
 
 <file path=ppt/slides/slide42.xml><?xml version="1.0" encoding="utf-8"?>
-<p:sld xmlns:a="http://schemas.openxmlformats.org/drawingml/2006/main" xmlns:r="http://schemas.openxmlformats.org/officeDocument/2006/relationships" xmlns:p="http://schemas.openxmlformats.org/presentationml/2006/main">
+<p:sld xmlns:a="http://schemas.openxmlformats.org/drawingml/2006/main" xmlns:r="http://schemas.openxmlformats.org/officeDocument/2006/relationships" xmlns:p="http://schemas.openxmlformats.org/presentationml/2006/main" show="0">
   <p:cSld>
     <p:spTree>
       <p:nvGrpSpPr>
@@ -43375,8 +43462,13 @@
           <a:p>
             <a:r>
               <a:rPr lang="en-GB" dirty="0" smtClean="0"/>
-              <a:t>TODO: Show some performance numbers?</a:t>
-            </a:r>
+              <a:t>TODO: Show some performance </a:t>
+            </a:r>
+            <a:r>
+              <a:rPr lang="en-GB" dirty="0" smtClean="0"/>
+              <a:t>numbers for the different schemes?</a:t>
+            </a:r>
+            <a:endParaRPr lang="en-GB" dirty="0" smtClean="0"/>
           </a:p>
         </p:txBody>
       </p:sp>
@@ -43414,11 +43506,11 @@
   <p:clrMapOvr>
     <a:masterClrMapping/>
   </p:clrMapOvr>
-  <mc:AlternateContent xmlns:mc="http://schemas.openxmlformats.org/markup-compatibility/2006" xmlns:p14="http://schemas.microsoft.com/office/powerpoint/2010/main">
-    <mc:Choice Requires="p14">
+  <mc:AlternateContent xmlns:mc="http://schemas.openxmlformats.org/markup-compatibility/2006">
+    <mc:Choice xmlns:p14="http://schemas.microsoft.com/office/powerpoint/2010/main" Requires="p14">
       <p:transition spd="slow" p14:dur="2000"/>
     </mc:Choice>
-    <mc:Fallback xmlns="">
+    <mc:Fallback>
       <p:transition xmlns:p14="http://schemas.microsoft.com/office/powerpoint/2010/main" spd="slow"/>
     </mc:Fallback>
   </mc:AlternateContent>
@@ -43489,9 +43581,51 @@
           <a:p>
             <a:r>
               <a:rPr lang="en-GB" dirty="0" smtClean="0"/>
-              <a:t>TODO: hands-on exercise – implement ECC in simple CG using some library routines</a:t>
-            </a:r>
-            <a:endParaRPr lang="en-GB" dirty="0"/>
+              <a:t>Using the provided CG code as a starting point, add ECC to make the code more tolerant to silent data corruption</a:t>
+            </a:r>
+          </a:p>
+          <a:p>
+            <a:r>
+              <a:rPr lang="en-GB" dirty="0" smtClean="0"/>
+              <a:t>There </a:t>
+            </a:r>
+            <a:r>
+              <a:rPr lang="en-GB" dirty="0"/>
+              <a:t>are two changes to make:</a:t>
+            </a:r>
+          </a:p>
+          <a:p>
+            <a:pPr marL="971550" lvl="1" indent="-514350">
+              <a:buFont typeface="+mj-lt"/>
+              <a:buAutoNum type="arabicPeriod"/>
+            </a:pPr>
+            <a:r>
+              <a:rPr lang="en-GB" dirty="0"/>
+              <a:t>Generate parity bits for each matrix element and store them in the high order bits of the column index</a:t>
+            </a:r>
+          </a:p>
+          <a:p>
+            <a:pPr marL="971550" lvl="1" indent="-514350">
+              <a:buFont typeface="+mj-lt"/>
+              <a:buAutoNum type="arabicPeriod"/>
+            </a:pPr>
+            <a:r>
+              <a:rPr lang="en-GB" dirty="0"/>
+              <a:t>Modify the </a:t>
+            </a:r>
+            <a:r>
+              <a:rPr lang="en-GB" dirty="0" err="1"/>
+              <a:t>SpMV</a:t>
+            </a:r>
+            <a:r>
+              <a:rPr lang="en-GB" dirty="0"/>
+              <a:t> function to check the parity bits and then correct any errors that are </a:t>
+            </a:r>
+            <a:r>
+              <a:rPr lang="en-GB" dirty="0" smtClean="0"/>
+              <a:t>found</a:t>
+            </a:r>
+            <a:endParaRPr lang="en-GB" dirty="0" smtClean="0"/>
           </a:p>
         </p:txBody>
       </p:sp>
@@ -43522,7 +43656,351 @@
     </p:spTree>
     <p:extLst>
       <p:ext uri="{BB962C8B-B14F-4D97-AF65-F5344CB8AC3E}">
+        <p14:creationId xmlns:p14="http://schemas.microsoft.com/office/powerpoint/2010/main" val="2089425383"/>
+      </p:ext>
+    </p:extLst>
+  </p:cSld>
+  <p:clrMapOvr>
+    <a:masterClrMapping/>
+  </p:clrMapOvr>
+  <mc:AlternateContent xmlns:mc="http://schemas.openxmlformats.org/markup-compatibility/2006" xmlns:p14="http://schemas.microsoft.com/office/powerpoint/2010/main">
+    <mc:Choice Requires="p14">
+      <p:transition spd="slow" p14:dur="2000"/>
+    </mc:Choice>
+    <mc:Fallback xmlns="">
+      <p:transition xmlns:p14="http://schemas.microsoft.com/office/powerpoint/2010/main" spd="slow"/>
+    </mc:Fallback>
+  </mc:AlternateContent>
+  <p:timing>
+    <p:tnLst>
+      <p:par>
+        <p:cTn xmlns:p14="http://schemas.microsoft.com/office/powerpoint/2010/main" id="1" dur="indefinite" restart="never" nodeType="tmRoot"/>
+      </p:par>
+    </p:tnLst>
+  </p:timing>
+</p:sld>
+</file>
+
+<file path=ppt/slides/slide44.xml><?xml version="1.0" encoding="utf-8"?>
+<p:sld xmlns:a="http://schemas.openxmlformats.org/drawingml/2006/main" xmlns:r="http://schemas.openxmlformats.org/officeDocument/2006/relationships" xmlns:p="http://schemas.openxmlformats.org/presentationml/2006/main">
+  <p:cSld>
+    <p:spTree>
+      <p:nvGrpSpPr>
+        <p:cNvPr id="1" name=""/>
+        <p:cNvGrpSpPr/>
+        <p:nvPr/>
+      </p:nvGrpSpPr>
+      <p:grpSpPr>
+        <a:xfrm>
+          <a:off x="0" y="0"/>
+          <a:ext cx="0" cy="0"/>
+          <a:chOff x="0" y="0"/>
+          <a:chExt cx="0" cy="0"/>
+        </a:xfrm>
+      </p:grpSpPr>
+      <p:sp>
+        <p:nvSpPr>
+          <p:cNvPr id="2" name="Title 1"/>
+          <p:cNvSpPr>
+            <a:spLocks noGrp="1"/>
+          </p:cNvSpPr>
+          <p:nvPr>
+            <p:ph type="title"/>
+          </p:nvPr>
+        </p:nvSpPr>
+        <p:spPr/>
+        <p:txBody>
+          <a:bodyPr/>
+          <a:lstStyle/>
+          <a:p>
+            <a:r>
+              <a:rPr lang="en-GB" dirty="0" smtClean="0"/>
+              <a:t>Software ECC exercise</a:t>
+            </a:r>
+            <a:endParaRPr lang="en-GB" dirty="0"/>
+          </a:p>
+        </p:txBody>
+      </p:sp>
+      <p:sp>
+        <p:nvSpPr>
+          <p:cNvPr id="3" name="Content Placeholder 2"/>
+          <p:cNvSpPr>
+            <a:spLocks noGrp="1"/>
+          </p:cNvSpPr>
+          <p:nvPr>
+            <p:ph idx="1"/>
+          </p:nvPr>
+        </p:nvSpPr>
+        <p:spPr/>
+        <p:txBody>
+          <a:bodyPr/>
+          <a:lstStyle/>
+          <a:p>
+            <a:r>
+              <a:rPr lang="en-GB" dirty="0" smtClean="0"/>
+              <a:t>Comments in the code will guide you</a:t>
+            </a:r>
+          </a:p>
+          <a:p>
+            <a:r>
+              <a:rPr lang="en-GB" dirty="0" smtClean="0"/>
+              <a:t>Two routines are provided to do the heavy lifting (see comments for descriptions):</a:t>
+            </a:r>
+          </a:p>
+          <a:p>
+            <a:pPr lvl="1"/>
+            <a:r>
+              <a:rPr lang="en-GB" b="1" dirty="0" smtClean="0">
+                <a:solidFill>
+                  <a:srgbClr val="3366FF"/>
+                </a:solidFill>
+                <a:latin typeface="Courier New"/>
+                <a:cs typeface="Courier New"/>
+              </a:rPr>
+              <a:t>ecc_compute_col8</a:t>
+            </a:r>
+          </a:p>
+          <a:p>
+            <a:pPr lvl="1"/>
+            <a:r>
+              <a:rPr lang="en-GB" b="1" dirty="0" smtClean="0">
+                <a:solidFill>
+                  <a:srgbClr val="3366FF"/>
+                </a:solidFill>
+                <a:latin typeface="Courier New"/>
+                <a:cs typeface="Courier New"/>
+              </a:rPr>
+              <a:t>ecc_correct_col8</a:t>
+            </a:r>
+          </a:p>
+          <a:p>
+            <a:r>
+              <a:rPr lang="en-GB" dirty="0"/>
+              <a:t>To test the code, pass the ‘</a:t>
+            </a:r>
+            <a:r>
+              <a:rPr lang="en-GB" dirty="0">
+                <a:latin typeface="Courier New"/>
+                <a:cs typeface="Courier New"/>
+              </a:rPr>
+              <a:t>-x</a:t>
+            </a:r>
+            <a:r>
+              <a:rPr lang="en-GB" dirty="0"/>
+              <a:t>’ parameter to the application to inject a random bit-</a:t>
+            </a:r>
+            <a:r>
+              <a:rPr lang="en-GB" dirty="0" smtClean="0"/>
+              <a:t>flip</a:t>
+            </a:r>
+          </a:p>
+          <a:p>
+            <a:r>
+              <a:rPr lang="en-GB" dirty="0" smtClean="0"/>
+              <a:t>Use ‘</a:t>
+            </a:r>
+            <a:r>
+              <a:rPr lang="en-GB" dirty="0" smtClean="0">
+                <a:latin typeface="Courier New"/>
+                <a:cs typeface="Courier New"/>
+              </a:rPr>
+              <a:t>--help</a:t>
+            </a:r>
+            <a:r>
+              <a:rPr lang="en-GB" dirty="0" smtClean="0"/>
+              <a:t>’ to see other options</a:t>
+            </a:r>
+            <a:endParaRPr lang="en-GB" dirty="0"/>
+          </a:p>
+        </p:txBody>
+      </p:sp>
+      <p:sp>
+        <p:nvSpPr>
+          <p:cNvPr id="4" name="Slide Number Placeholder 3"/>
+          <p:cNvSpPr>
+            <a:spLocks noGrp="1"/>
+          </p:cNvSpPr>
+          <p:nvPr>
+            <p:ph type="sldNum" sz="quarter" idx="10"/>
+          </p:nvPr>
+        </p:nvSpPr>
+        <p:spPr/>
+        <p:txBody>
+          <a:bodyPr/>
+          <a:lstStyle/>
+          <a:p>
+            <a:fld id="{D9B8CB04-7B95-2844-BD15-B133C35E4786}" type="slidenum">
+              <a:rPr lang="en-GB" smtClean="0"/>
+              <a:pPr/>
+              <a:t>44</a:t>
+            </a:fld>
+            <a:endParaRPr lang="en-GB"/>
+          </a:p>
+        </p:txBody>
+      </p:sp>
+    </p:spTree>
+    <p:extLst>
+      <p:ext uri="{BB962C8B-B14F-4D97-AF65-F5344CB8AC3E}">
         <p14:creationId xmlns:p14="http://schemas.microsoft.com/office/powerpoint/2010/main" val="1795682848"/>
+      </p:ext>
+    </p:extLst>
+  </p:cSld>
+  <p:clrMapOvr>
+    <a:masterClrMapping/>
+  </p:clrMapOvr>
+  <mc:AlternateContent xmlns:mc="http://schemas.openxmlformats.org/markup-compatibility/2006" xmlns:p14="http://schemas.microsoft.com/office/powerpoint/2010/main">
+    <mc:Choice Requires="p14">
+      <p:transition spd="slow" p14:dur="2000"/>
+    </mc:Choice>
+    <mc:Fallback xmlns="">
+      <p:transition xmlns:p14="http://schemas.microsoft.com/office/powerpoint/2010/main" spd="slow"/>
+    </mc:Fallback>
+  </mc:AlternateContent>
+  <p:timing>
+    <p:tnLst>
+      <p:par>
+        <p:cTn xmlns:p14="http://schemas.microsoft.com/office/powerpoint/2010/main" id="1" dur="indefinite" restart="never" nodeType="tmRoot"/>
+      </p:par>
+    </p:tnLst>
+  </p:timing>
+</p:sld>
+</file>
+
+<file path=ppt/slides/slide45.xml><?xml version="1.0" encoding="utf-8"?>
+<p:sld xmlns:a="http://schemas.openxmlformats.org/drawingml/2006/main" xmlns:r="http://schemas.openxmlformats.org/officeDocument/2006/relationships" xmlns:p="http://schemas.openxmlformats.org/presentationml/2006/main">
+  <p:cSld>
+    <p:spTree>
+      <p:nvGrpSpPr>
+        <p:cNvPr id="1" name=""/>
+        <p:cNvGrpSpPr/>
+        <p:nvPr/>
+      </p:nvGrpSpPr>
+      <p:grpSpPr>
+        <a:xfrm>
+          <a:off x="0" y="0"/>
+          <a:ext cx="0" cy="0"/>
+          <a:chOff x="0" y="0"/>
+          <a:chExt cx="0" cy="0"/>
+        </a:xfrm>
+      </p:grpSpPr>
+      <p:sp>
+        <p:nvSpPr>
+          <p:cNvPr id="2" name="Title 1"/>
+          <p:cNvSpPr>
+            <a:spLocks noGrp="1"/>
+          </p:cNvSpPr>
+          <p:nvPr>
+            <p:ph type="title"/>
+          </p:nvPr>
+        </p:nvSpPr>
+        <p:spPr/>
+        <p:txBody>
+          <a:bodyPr/>
+          <a:lstStyle/>
+          <a:p>
+            <a:r>
+              <a:rPr lang="en-GB" dirty="0" smtClean="0"/>
+              <a:t>Software ECC exercise</a:t>
+            </a:r>
+            <a:endParaRPr lang="en-GB" dirty="0"/>
+          </a:p>
+        </p:txBody>
+      </p:sp>
+      <p:sp>
+        <p:nvSpPr>
+          <p:cNvPr id="3" name="Content Placeholder 2"/>
+          <p:cNvSpPr>
+            <a:spLocks noGrp="1"/>
+          </p:cNvSpPr>
+          <p:nvPr>
+            <p:ph idx="1"/>
+          </p:nvPr>
+        </p:nvSpPr>
+        <p:spPr/>
+        <p:txBody>
+          <a:bodyPr/>
+          <a:lstStyle/>
+          <a:p>
+            <a:r>
+              <a:rPr lang="en-GB" b="1" dirty="0" smtClean="0">
+                <a:solidFill>
+                  <a:srgbClr val="008000"/>
+                </a:solidFill>
+              </a:rPr>
+              <a:t>Extras</a:t>
+            </a:r>
+            <a:r>
+              <a:rPr lang="en-GB" dirty="0" smtClean="0"/>
+              <a:t> (if you finish early!):</a:t>
+            </a:r>
+          </a:p>
+          <a:p>
+            <a:pPr lvl="1"/>
+            <a:r>
+              <a:rPr lang="en-GB" dirty="0" smtClean="0"/>
+              <a:t>Add an additional overall parity bit to improve the performance of the error checking code</a:t>
+            </a:r>
+          </a:p>
+          <a:p>
+            <a:pPr lvl="1"/>
+            <a:r>
+              <a:rPr lang="en-GB" dirty="0" smtClean="0"/>
+              <a:t>Or use the extra parity bit implement a SECDED scheme </a:t>
+            </a:r>
+            <a:r>
+              <a:rPr lang="en-GB" b="1" dirty="0" smtClean="0">
+                <a:solidFill>
+                  <a:srgbClr val="FF0000"/>
+                </a:solidFill>
+              </a:rPr>
+              <a:t>(TODO: add code to inject double bit-flips)</a:t>
+            </a:r>
+          </a:p>
+          <a:p>
+            <a:pPr lvl="1"/>
+            <a:r>
+              <a:rPr lang="en-GB" dirty="0" smtClean="0"/>
+              <a:t>Try other parity bit placement schemes (4 bits in row and 4 in column, or use the least significant bits of the value)</a:t>
+            </a:r>
+            <a:r>
+              <a:rPr lang="en-GB" b="1" dirty="0" smtClean="0">
+                <a:solidFill>
+                  <a:srgbClr val="FF0000"/>
+                </a:solidFill>
+              </a:rPr>
+              <a:t> (TODO: give them these ECC routines)</a:t>
+            </a:r>
+          </a:p>
+        </p:txBody>
+      </p:sp>
+      <p:sp>
+        <p:nvSpPr>
+          <p:cNvPr id="4" name="Slide Number Placeholder 3"/>
+          <p:cNvSpPr>
+            <a:spLocks noGrp="1"/>
+          </p:cNvSpPr>
+          <p:nvPr>
+            <p:ph type="sldNum" sz="quarter" idx="10"/>
+          </p:nvPr>
+        </p:nvSpPr>
+        <p:spPr/>
+        <p:txBody>
+          <a:bodyPr/>
+          <a:lstStyle/>
+          <a:p>
+            <a:fld id="{D9B8CB04-7B95-2844-BD15-B133C35E4786}" type="slidenum">
+              <a:rPr lang="en-GB" smtClean="0"/>
+              <a:pPr/>
+              <a:t>45</a:t>
+            </a:fld>
+            <a:endParaRPr lang="en-GB"/>
+          </a:p>
+        </p:txBody>
+      </p:sp>
+    </p:spTree>
+    <p:extLst>
+      <p:ext uri="{BB962C8B-B14F-4D97-AF65-F5344CB8AC3E}">
+        <p14:creationId xmlns:p14="http://schemas.microsoft.com/office/powerpoint/2010/main" val="1046053255"/>
       </p:ext>
     </p:extLst>
   </p:cSld>

</xml_diff>